<commit_message>
edit week 4 ppt
</commit_message>
<xml_diff>
--- a/Weekly Submissions/Week4/Week4.pptx
+++ b/Weekly Submissions/Week4/Week4.pptx
@@ -6,17 +6,16 @@
   </p:sldMasterIdLst>
   <p:sldIdLst>
     <p:sldId id="257" r:id="rId2"/>
-    <p:sldId id="256" r:id="rId3"/>
-    <p:sldId id="272" r:id="rId4"/>
-    <p:sldId id="259" r:id="rId5"/>
-    <p:sldId id="271" r:id="rId6"/>
-    <p:sldId id="258" r:id="rId7"/>
-    <p:sldId id="260" r:id="rId8"/>
-    <p:sldId id="261" r:id="rId9"/>
-    <p:sldId id="264" r:id="rId10"/>
-    <p:sldId id="268" r:id="rId11"/>
-    <p:sldId id="273" r:id="rId12"/>
-    <p:sldId id="267" r:id="rId13"/>
+    <p:sldId id="272" r:id="rId3"/>
+    <p:sldId id="259" r:id="rId4"/>
+    <p:sldId id="271" r:id="rId5"/>
+    <p:sldId id="258" r:id="rId6"/>
+    <p:sldId id="260" r:id="rId7"/>
+    <p:sldId id="261" r:id="rId8"/>
+    <p:sldId id="264" r:id="rId9"/>
+    <p:sldId id="268" r:id="rId10"/>
+    <p:sldId id="273" r:id="rId11"/>
+    <p:sldId id="267" r:id="rId12"/>
   </p:sldIdLst>
   <p:sldSz cx="9144000" cy="6858000" type="screen4x3"/>
   <p:notesSz cx="6858000" cy="9144000"/>
@@ -135,11 +134,11 @@
 </file>
 
 <file path=ppt/diagrams/colors1.xml><?xml version="1.0" encoding="utf-8"?>
-<dgm:colorsDef xmlns:dgm="http://schemas.openxmlformats.org/drawingml/2006/diagram" xmlns:a="http://schemas.openxmlformats.org/drawingml/2006/main" uniqueId="urn:microsoft.com/office/officeart/2018/5/colors/Iconchunking_neutralicon_colorful1">
+<dgm:colorsDef xmlns:dgm="http://schemas.openxmlformats.org/drawingml/2006/diagram" xmlns:a="http://schemas.openxmlformats.org/drawingml/2006/main" uniqueId="urn:microsoft.com/office/officeart/2005/8/colors/colorful2">
   <dgm:title val=""/>
   <dgm:desc val=""/>
   <dgm:catLst>
-    <dgm:cat type="colorful" pri="10100"/>
+    <dgm:cat type="colorful" pri="10200"/>
   </dgm:catLst>
   <dgm:styleLbl name="node0">
     <dgm:fillClrLst meth="repeat">
@@ -154,48 +153,36 @@
     <dgm:txEffectClrLst/>
   </dgm:styleLbl>
   <dgm:styleLbl name="node1">
-    <dgm:fillClrLst meth="repeat">
-      <a:schemeClr val="bg1"/>
-    </dgm:fillClrLst>
-    <dgm:linClrLst meth="repeat">
-      <a:schemeClr val="lt1">
-        <a:alpha val="0"/>
-      </a:schemeClr>
-    </dgm:linClrLst>
-    <dgm:effectClrLst/>
-    <dgm:txLinClrLst/>
-    <dgm:txFillClrLst meth="repeat">
-      <a:schemeClr val="dk1"/>
-    </dgm:txFillClrLst>
-    <dgm:txEffectClrLst/>
-  </dgm:styleLbl>
-  <dgm:styleLbl name="alignNode1">
-    <dgm:fillClrLst meth="repeat">
+    <dgm:fillClrLst>
       <a:schemeClr val="accent2"/>
       <a:schemeClr val="accent3"/>
-      <a:schemeClr val="accent4"/>
-      <a:schemeClr val="accent5"/>
-      <a:schemeClr val="accent6"/>
     </dgm:fillClrLst>
     <dgm:linClrLst meth="repeat">
+      <a:schemeClr val="lt1"/>
+    </dgm:linClrLst>
+    <dgm:effectClrLst/>
+    <dgm:txLinClrLst/>
+    <dgm:txFillClrLst/>
+    <dgm:txEffectClrLst/>
+  </dgm:styleLbl>
+  <dgm:styleLbl name="alignNode1">
+    <dgm:fillClrLst>
       <a:schemeClr val="accent2"/>
       <a:schemeClr val="accent3"/>
-      <a:schemeClr val="accent4"/>
-      <a:schemeClr val="accent5"/>
-      <a:schemeClr val="accent6"/>
-    </dgm:linClrLst>
-    <dgm:effectClrLst/>
-    <dgm:txLinClrLst/>
-    <dgm:txFillClrLst/>
-    <dgm:txEffectClrLst/>
-  </dgm:styleLbl>
-  <dgm:styleLbl name="lnNode1">
-    <dgm:fillClrLst meth="repeat">
+    </dgm:fillClrLst>
+    <dgm:linClrLst>
       <a:schemeClr val="accent2"/>
       <a:schemeClr val="accent3"/>
-      <a:schemeClr val="accent4"/>
-      <a:schemeClr val="accent5"/>
-      <a:schemeClr val="accent6"/>
+    </dgm:linClrLst>
+    <dgm:effectClrLst/>
+    <dgm:txLinClrLst/>
+    <dgm:txFillClrLst/>
+    <dgm:txEffectClrLst/>
+  </dgm:styleLbl>
+  <dgm:styleLbl name="lnNode1">
+    <dgm:fillClrLst>
+      <a:schemeClr val="accent2"/>
+      <a:schemeClr val="accent3"/>
     </dgm:fillClrLst>
     <dgm:linClrLst meth="repeat">
       <a:schemeClr val="lt1"/>
@@ -206,22 +193,13 @@
     <dgm:txEffectClrLst/>
   </dgm:styleLbl>
   <dgm:styleLbl name="vennNode1">
-    <dgm:fillClrLst meth="repeat">
+    <dgm:fillClrLst>
       <a:schemeClr val="accent2">
         <a:alpha val="50000"/>
       </a:schemeClr>
       <a:schemeClr val="accent3">
         <a:alpha val="50000"/>
       </a:schemeClr>
-      <a:schemeClr val="accent4">
-        <a:alpha val="50000"/>
-      </a:schemeClr>
-      <a:schemeClr val="accent5">
-        <a:alpha val="50000"/>
-      </a:schemeClr>
-      <a:schemeClr val="accent6">
-        <a:alpha val="50000"/>
-      </a:schemeClr>
     </dgm:fillClrLst>
     <dgm:linClrLst meth="repeat">
       <a:schemeClr val="lt1"/>
@@ -233,7 +211,7 @@
   </dgm:styleLbl>
   <dgm:styleLbl name="node2">
     <dgm:fillClrLst>
-      <a:schemeClr val="accent2"/>
+      <a:schemeClr val="accent3"/>
     </dgm:fillClrLst>
     <dgm:linClrLst meth="repeat">
       <a:schemeClr val="lt1"/>
@@ -245,7 +223,7 @@
   </dgm:styleLbl>
   <dgm:styleLbl name="node3">
     <dgm:fillClrLst>
-      <a:schemeClr val="accent3"/>
+      <a:schemeClr val="accent4"/>
     </dgm:fillClrLst>
     <dgm:linClrLst meth="repeat">
       <a:schemeClr val="lt1"/>
@@ -257,7 +235,7 @@
   </dgm:styleLbl>
   <dgm:styleLbl name="node4">
     <dgm:fillClrLst>
-      <a:schemeClr val="accent4"/>
+      <a:schemeClr val="accent5"/>
     </dgm:fillClrLst>
     <dgm:linClrLst meth="repeat">
       <a:schemeClr val="lt1"/>
@@ -268,22 +246,13 @@
     <dgm:txEffectClrLst/>
   </dgm:styleLbl>
   <dgm:styleLbl name="fgImgPlace1">
-    <dgm:fillClrLst meth="repeat">
+    <dgm:fillClrLst>
       <a:schemeClr val="accent2">
         <a:tint val="50000"/>
       </a:schemeClr>
       <a:schemeClr val="accent3">
         <a:tint val="50000"/>
       </a:schemeClr>
-      <a:schemeClr val="accent4">
-        <a:tint val="50000"/>
-      </a:schemeClr>
-      <a:schemeClr val="accent5">
-        <a:tint val="50000"/>
-      </a:schemeClr>
-      <a:schemeClr val="accent6">
-        <a:tint val="50000"/>
-      </a:schemeClr>
     </dgm:fillClrLst>
     <dgm:linClrLst meth="repeat">
       <a:schemeClr val="lt1"/>
@@ -297,10 +266,10 @@
   </dgm:styleLbl>
   <dgm:styleLbl name="alignImgPlace1">
     <dgm:fillClrLst>
-      <a:schemeClr val="accent1">
+      <a:schemeClr val="accent2">
         <a:tint val="50000"/>
       </a:schemeClr>
-      <a:schemeClr val="accent2">
+      <a:schemeClr val="accent3">
         <a:tint val="20000"/>
       </a:schemeClr>
     </dgm:fillClrLst>
@@ -316,10 +285,10 @@
   </dgm:styleLbl>
   <dgm:styleLbl name="bgImgPlace1">
     <dgm:fillClrLst>
-      <a:schemeClr val="accent1">
+      <a:schemeClr val="accent2">
         <a:tint val="50000"/>
       </a:schemeClr>
-      <a:schemeClr val="accent2">
+      <a:schemeClr val="accent3">
         <a:tint val="20000"/>
       </a:schemeClr>
     </dgm:fillClrLst>
@@ -334,14 +303,11 @@
     <dgm:txEffectClrLst/>
   </dgm:styleLbl>
   <dgm:styleLbl name="sibTrans2D1">
-    <dgm:fillClrLst meth="repeat">
+    <dgm:fillClrLst>
       <a:schemeClr val="accent2"/>
       <a:schemeClr val="accent3"/>
-      <a:schemeClr val="accent4"/>
-      <a:schemeClr val="accent5"/>
-      <a:schemeClr val="accent6"/>
-    </dgm:fillClrLst>
-    <dgm:linClrLst meth="cycle">
+    </dgm:fillClrLst>
+    <dgm:linClrLst meth="repeat">
       <a:schemeClr val="lt1"/>
     </dgm:linClrLst>
     <dgm:effectClrLst/>
@@ -350,14 +316,11 @@
     <dgm:txEffectClrLst/>
   </dgm:styleLbl>
   <dgm:styleLbl name="fgSibTrans2D1">
-    <dgm:fillClrLst meth="repeat">
+    <dgm:fillClrLst>
       <a:schemeClr val="accent2"/>
       <a:schemeClr val="accent3"/>
-      <a:schemeClr val="accent4"/>
-      <a:schemeClr val="accent5"/>
-      <a:schemeClr val="accent6"/>
-    </dgm:fillClrLst>
-    <dgm:linClrLst meth="cycle">
+    </dgm:fillClrLst>
+    <dgm:linClrLst meth="repeat">
       <a:schemeClr val="lt1"/>
     </dgm:linClrLst>
     <dgm:effectClrLst/>
@@ -368,14 +331,11 @@
     <dgm:txEffectClrLst/>
   </dgm:styleLbl>
   <dgm:styleLbl name="bgSibTrans2D1">
-    <dgm:fillClrLst meth="repeat">
+    <dgm:fillClrLst>
       <a:schemeClr val="accent2"/>
       <a:schemeClr val="accent3"/>
-      <a:schemeClr val="accent4"/>
-      <a:schemeClr val="accent5"/>
-      <a:schemeClr val="accent6"/>
-    </dgm:fillClrLst>
-    <dgm:linClrLst meth="cycle">
+    </dgm:fillClrLst>
+    <dgm:linClrLst meth="repeat">
       <a:schemeClr val="lt1"/>
     </dgm:linClrLst>
     <dgm:effectClrLst/>
@@ -386,19 +346,10 @@
     <dgm:txEffectClrLst/>
   </dgm:styleLbl>
   <dgm:styleLbl name="sibTrans1D1">
-    <dgm:fillClrLst meth="repeat">
+    <dgm:fillClrLst/>
+    <dgm:linClrLst>
       <a:schemeClr val="accent2"/>
       <a:schemeClr val="accent3"/>
-      <a:schemeClr val="accent4"/>
-      <a:schemeClr val="accent5"/>
-      <a:schemeClr val="accent6"/>
-    </dgm:fillClrLst>
-    <dgm:linClrLst meth="repeat">
-      <a:schemeClr val="accent2"/>
-      <a:schemeClr val="accent3"/>
-      <a:schemeClr val="accent4"/>
-      <a:schemeClr val="accent5"/>
-      <a:schemeClr val="accent6"/>
     </dgm:linClrLst>
     <dgm:effectClrLst/>
     <dgm:txLinClrLst/>
@@ -425,7 +376,35 @@
   </dgm:styleLbl>
   <dgm:styleLbl name="asst0">
     <dgm:fillClrLst meth="repeat">
-      <a:schemeClr val="accent1"/>
+      <a:schemeClr val="accent2"/>
+    </dgm:fillClrLst>
+    <dgm:linClrLst meth="repeat">
+      <a:schemeClr val="lt1">
+        <a:shade val="80000"/>
+      </a:schemeClr>
+    </dgm:linClrLst>
+    <dgm:effectClrLst/>
+    <dgm:txLinClrLst/>
+    <dgm:txFillClrLst/>
+    <dgm:txEffectClrLst/>
+  </dgm:styleLbl>
+  <dgm:styleLbl name="asst1">
+    <dgm:fillClrLst meth="repeat">
+      <a:schemeClr val="accent3"/>
+    </dgm:fillClrLst>
+    <dgm:linClrLst meth="repeat">
+      <a:schemeClr val="lt1">
+        <a:shade val="80000"/>
+      </a:schemeClr>
+    </dgm:linClrLst>
+    <dgm:effectClrLst/>
+    <dgm:txLinClrLst/>
+    <dgm:txFillClrLst/>
+    <dgm:txEffectClrLst/>
+  </dgm:styleLbl>
+  <dgm:styleLbl name="asst2">
+    <dgm:fillClrLst>
+      <a:schemeClr val="accent4"/>
     </dgm:fillClrLst>
     <dgm:linClrLst meth="repeat">
       <a:schemeClr val="lt1"/>
@@ -435,9 +414,9 @@
     <dgm:txFillClrLst/>
     <dgm:txEffectClrLst/>
   </dgm:styleLbl>
-  <dgm:styleLbl name="asst1">
-    <dgm:fillClrLst meth="repeat">
-      <a:schemeClr val="accent2"/>
+  <dgm:styleLbl name="asst3">
+    <dgm:fillClrLst>
+      <a:schemeClr val="accent5"/>
     </dgm:fillClrLst>
     <dgm:linClrLst meth="repeat">
       <a:schemeClr val="lt1"/>
@@ -447,33 +426,9 @@
     <dgm:txFillClrLst/>
     <dgm:txEffectClrLst/>
   </dgm:styleLbl>
-  <dgm:styleLbl name="asst2">
-    <dgm:fillClrLst>
-      <a:schemeClr val="accent3"/>
-    </dgm:fillClrLst>
-    <dgm:linClrLst meth="repeat">
-      <a:schemeClr val="lt1"/>
-    </dgm:linClrLst>
-    <dgm:effectClrLst/>
-    <dgm:txLinClrLst/>
-    <dgm:txFillClrLst/>
-    <dgm:txEffectClrLst/>
-  </dgm:styleLbl>
-  <dgm:styleLbl name="asst3">
-    <dgm:fillClrLst>
-      <a:schemeClr val="accent4"/>
-    </dgm:fillClrLst>
-    <dgm:linClrLst meth="repeat">
-      <a:schemeClr val="lt1"/>
-    </dgm:linClrLst>
-    <dgm:effectClrLst/>
-    <dgm:txLinClrLst/>
-    <dgm:txFillClrLst/>
-    <dgm:txEffectClrLst/>
-  </dgm:styleLbl>
   <dgm:styleLbl name="asst4">
     <dgm:fillClrLst>
-      <a:schemeClr val="accent5"/>
+      <a:schemeClr val="accent6"/>
     </dgm:fillClrLst>
     <dgm:linClrLst meth="repeat">
       <a:schemeClr val="lt1"/>
@@ -540,7 +495,7 @@
       <a:schemeClr val="accent2"/>
     </dgm:fillClrLst>
     <dgm:linClrLst meth="repeat">
-      <a:schemeClr val="accent1"/>
+      <a:schemeClr val="accent2"/>
     </dgm:linClrLst>
     <dgm:effectClrLst/>
     <dgm:txLinClrLst/>
@@ -551,12 +506,12 @@
   </dgm:styleLbl>
   <dgm:styleLbl name="parChTrans1D2">
     <dgm:fillClrLst meth="repeat">
-      <a:schemeClr val="accent3">
+      <a:schemeClr val="accent2">
         <a:tint val="90000"/>
       </a:schemeClr>
     </dgm:fillClrLst>
     <dgm:linClrLst meth="repeat">
-      <a:schemeClr val="accent2"/>
+      <a:schemeClr val="accent3"/>
     </dgm:linClrLst>
     <dgm:effectClrLst/>
     <dgm:txLinClrLst/>
@@ -567,12 +522,12 @@
   </dgm:styleLbl>
   <dgm:styleLbl name="parChTrans1D3">
     <dgm:fillClrLst meth="repeat">
-      <a:schemeClr val="accent4">
+      <a:schemeClr val="accent2">
         <a:tint val="70000"/>
       </a:schemeClr>
     </dgm:fillClrLst>
     <dgm:linClrLst meth="repeat">
-      <a:schemeClr val="accent3"/>
+      <a:schemeClr val="accent4"/>
     </dgm:linClrLst>
     <dgm:effectClrLst/>
     <dgm:txLinClrLst/>
@@ -583,12 +538,12 @@
   </dgm:styleLbl>
   <dgm:styleLbl name="parChTrans1D4">
     <dgm:fillClrLst meth="repeat">
-      <a:schemeClr val="accent5">
+      <a:schemeClr val="accent2">
         <a:tint val="50000"/>
       </a:schemeClr>
     </dgm:fillClrLst>
     <dgm:linClrLst meth="repeat">
-      <a:schemeClr val="accent4"/>
+      <a:schemeClr val="accent5"/>
     </dgm:linClrLst>
     <dgm:effectClrLst/>
     <dgm:txLinClrLst/>
@@ -603,12 +558,9 @@
         <a:alpha val="90000"/>
       </a:schemeClr>
     </dgm:fillClrLst>
-    <dgm:linClrLst meth="repeat">
+    <dgm:linClrLst>
       <a:schemeClr val="accent2"/>
       <a:schemeClr val="accent3"/>
-      <a:schemeClr val="accent4"/>
-      <a:schemeClr val="accent5"/>
-      <a:schemeClr val="accent6"/>
     </dgm:linClrLst>
     <dgm:effectClrLst/>
     <dgm:txLinClrLst/>
@@ -623,12 +575,9 @@
         <a:alpha val="90000"/>
       </a:schemeClr>
     </dgm:fillClrLst>
-    <dgm:linClrLst meth="repeat">
+    <dgm:linClrLst>
       <a:schemeClr val="accent2"/>
       <a:schemeClr val="accent3"/>
-      <a:schemeClr val="accent4"/>
-      <a:schemeClr val="accent5"/>
-      <a:schemeClr val="accent6"/>
     </dgm:linClrLst>
     <dgm:effectClrLst/>
     <dgm:txLinClrLst/>
@@ -643,12 +592,9 @@
         <a:alpha val="90000"/>
       </a:schemeClr>
     </dgm:fillClrLst>
-    <dgm:linClrLst meth="repeat">
+    <dgm:linClrLst>
       <a:schemeClr val="accent2"/>
       <a:schemeClr val="accent3"/>
-      <a:schemeClr val="accent4"/>
-      <a:schemeClr val="accent5"/>
-      <a:schemeClr val="accent6"/>
     </dgm:linClrLst>
     <dgm:effectClrLst/>
     <dgm:txLinClrLst/>
@@ -664,7 +610,7 @@
       </a:schemeClr>
     </dgm:fillClrLst>
     <dgm:linClrLst meth="repeat">
-      <a:schemeClr val="accent1"/>
+      <a:schemeClr val="accent2"/>
     </dgm:linClrLst>
     <dgm:effectClrLst/>
     <dgm:txLinClrLst/>
@@ -679,12 +625,9 @@
         <a:alpha val="90000"/>
       </a:schemeClr>
     </dgm:fillClrLst>
-    <dgm:linClrLst meth="repeat">
+    <dgm:linClrLst>
       <a:schemeClr val="accent2"/>
       <a:schemeClr val="accent3"/>
-      <a:schemeClr val="accent4"/>
-      <a:schemeClr val="accent5"/>
-      <a:schemeClr val="accent6"/>
     </dgm:linClrLst>
     <dgm:effectClrLst/>
     <dgm:txLinClrLst/>
@@ -697,12 +640,9 @@
     <dgm:fillClrLst meth="repeat">
       <a:schemeClr val="lt1"/>
     </dgm:fillClrLst>
-    <dgm:linClrLst meth="repeat">
+    <dgm:linClrLst>
       <a:schemeClr val="accent2"/>
       <a:schemeClr val="accent3"/>
-      <a:schemeClr val="accent4"/>
-      <a:schemeClr val="accent5"/>
-      <a:schemeClr val="accent6"/>
     </dgm:linClrLst>
     <dgm:effectClrLst/>
     <dgm:txLinClrLst/>
@@ -715,12 +655,9 @@
     <dgm:fillClrLst meth="repeat">
       <a:schemeClr val="lt1"/>
     </dgm:fillClrLst>
-    <dgm:linClrLst meth="repeat">
+    <dgm:linClrLst>
       <a:schemeClr val="accent2"/>
       <a:schemeClr val="accent3"/>
-      <a:schemeClr val="accent4"/>
-      <a:schemeClr val="accent5"/>
-      <a:schemeClr val="accent6"/>
     </dgm:linClrLst>
     <dgm:effectClrLst/>
     <dgm:txLinClrLst/>
@@ -733,12 +670,9 @@
     <dgm:fillClrLst meth="repeat">
       <a:schemeClr val="lt1"/>
     </dgm:fillClrLst>
-    <dgm:linClrLst meth="repeat">
+    <dgm:linClrLst>
       <a:schemeClr val="accent2"/>
       <a:schemeClr val="accent3"/>
-      <a:schemeClr val="accent4"/>
-      <a:schemeClr val="accent5"/>
-      <a:schemeClr val="accent6"/>
     </dgm:linClrLst>
     <dgm:effectClrLst/>
     <dgm:txLinClrLst/>
@@ -748,7 +682,7 @@
     <dgm:txEffectClrLst/>
   </dgm:styleLbl>
   <dgm:styleLbl name="fgAccFollowNode1">
-    <dgm:fillClrLst meth="repeat">
+    <dgm:fillClrLst>
       <a:schemeClr val="accent2">
         <a:tint val="40000"/>
         <a:alpha val="90000"/>
@@ -757,20 +691,8 @@
         <a:tint val="40000"/>
         <a:alpha val="90000"/>
       </a:schemeClr>
-      <a:schemeClr val="accent4">
-        <a:tint val="40000"/>
-        <a:alpha val="90000"/>
-      </a:schemeClr>
-      <a:schemeClr val="accent5">
-        <a:tint val="40000"/>
-        <a:alpha val="90000"/>
-      </a:schemeClr>
-      <a:schemeClr val="accent6">
-        <a:tint val="40000"/>
-        <a:alpha val="90000"/>
-      </a:schemeClr>
-    </dgm:fillClrLst>
-    <dgm:linClrLst meth="repeat">
+    </dgm:fillClrLst>
+    <dgm:linClrLst>
       <a:schemeClr val="accent2">
         <a:tint val="40000"/>
         <a:alpha val="90000"/>
@@ -779,18 +701,6 @@
         <a:tint val="40000"/>
         <a:alpha val="90000"/>
       </a:schemeClr>
-      <a:schemeClr val="accent4">
-        <a:tint val="40000"/>
-        <a:alpha val="90000"/>
-      </a:schemeClr>
-      <a:schemeClr val="accent5">
-        <a:tint val="40000"/>
-        <a:alpha val="90000"/>
-      </a:schemeClr>
-      <a:schemeClr val="accent6">
-        <a:tint val="40000"/>
-        <a:alpha val="90000"/>
-      </a:schemeClr>
     </dgm:linClrLst>
     <dgm:effectClrLst/>
     <dgm:txLinClrLst/>
@@ -800,7 +710,7 @@
     <dgm:txEffectClrLst/>
   </dgm:styleLbl>
   <dgm:styleLbl name="alignAccFollowNode1">
-    <dgm:fillClrLst meth="repeat">
+    <dgm:fillClrLst>
       <a:schemeClr val="accent2">
         <a:tint val="40000"/>
         <a:alpha val="90000"/>
@@ -809,20 +719,8 @@
         <a:tint val="40000"/>
         <a:alpha val="90000"/>
       </a:schemeClr>
-      <a:schemeClr val="accent4">
-        <a:tint val="40000"/>
-        <a:alpha val="90000"/>
-      </a:schemeClr>
-      <a:schemeClr val="accent5">
-        <a:tint val="40000"/>
-        <a:alpha val="90000"/>
-      </a:schemeClr>
-      <a:schemeClr val="accent6">
-        <a:tint val="40000"/>
-        <a:alpha val="90000"/>
-      </a:schemeClr>
-    </dgm:fillClrLst>
-    <dgm:linClrLst meth="repeat">
+    </dgm:fillClrLst>
+    <dgm:linClrLst>
       <a:schemeClr val="accent2">
         <a:tint val="40000"/>
         <a:alpha val="90000"/>
@@ -831,18 +729,6 @@
         <a:tint val="40000"/>
         <a:alpha val="90000"/>
       </a:schemeClr>
-      <a:schemeClr val="accent4">
-        <a:tint val="40000"/>
-        <a:alpha val="90000"/>
-      </a:schemeClr>
-      <a:schemeClr val="accent5">
-        <a:tint val="40000"/>
-        <a:alpha val="90000"/>
-      </a:schemeClr>
-      <a:schemeClr val="accent6">
-        <a:tint val="40000"/>
-        <a:alpha val="90000"/>
-      </a:schemeClr>
     </dgm:linClrLst>
     <dgm:effectClrLst/>
     <dgm:txLinClrLst/>
@@ -852,7 +738,7 @@
     <dgm:txEffectClrLst/>
   </dgm:styleLbl>
   <dgm:styleLbl name="bgAccFollowNode1">
-    <dgm:fillClrLst meth="repeat">
+    <dgm:fillClrLst>
       <a:schemeClr val="accent2">
         <a:tint val="40000"/>
         <a:alpha val="90000"/>
@@ -861,20 +747,8 @@
         <a:tint val="40000"/>
         <a:alpha val="90000"/>
       </a:schemeClr>
-      <a:schemeClr val="accent4">
-        <a:tint val="40000"/>
-        <a:alpha val="90000"/>
-      </a:schemeClr>
-      <a:schemeClr val="accent5">
-        <a:tint val="40000"/>
-        <a:alpha val="90000"/>
-      </a:schemeClr>
-      <a:schemeClr val="accent6">
-        <a:tint val="40000"/>
-        <a:alpha val="90000"/>
-      </a:schemeClr>
-    </dgm:fillClrLst>
-    <dgm:linClrLst meth="repeat">
+    </dgm:fillClrLst>
+    <dgm:linClrLst>
       <a:schemeClr val="accent2">
         <a:tint val="40000"/>
         <a:alpha val="90000"/>
@@ -883,18 +757,6 @@
         <a:tint val="40000"/>
         <a:alpha val="90000"/>
       </a:schemeClr>
-      <a:schemeClr val="accent4">
-        <a:tint val="40000"/>
-        <a:alpha val="90000"/>
-      </a:schemeClr>
-      <a:schemeClr val="accent5">
-        <a:tint val="40000"/>
-        <a:alpha val="90000"/>
-      </a:schemeClr>
-      <a:schemeClr val="accent6">
-        <a:tint val="40000"/>
-        <a:alpha val="90000"/>
-      </a:schemeClr>
     </dgm:linClrLst>
     <dgm:effectClrLst/>
     <dgm:txLinClrLst/>
@@ -926,7 +788,7 @@
       </a:schemeClr>
     </dgm:fillClrLst>
     <dgm:linClrLst>
-      <a:schemeClr val="accent2"/>
+      <a:schemeClr val="accent3"/>
     </dgm:linClrLst>
     <dgm:effectClrLst/>
     <dgm:txLinClrLst/>
@@ -942,7 +804,7 @@
       </a:schemeClr>
     </dgm:fillClrLst>
     <dgm:linClrLst>
-      <a:schemeClr val="accent3"/>
+      <a:schemeClr val="accent4"/>
     </dgm:linClrLst>
     <dgm:effectClrLst/>
     <dgm:txLinClrLst/>
@@ -958,7 +820,7 @@
       </a:schemeClr>
     </dgm:fillClrLst>
     <dgm:linClrLst>
-      <a:schemeClr val="accent4"/>
+      <a:schemeClr val="accent5"/>
     </dgm:linClrLst>
     <dgm:effectClrLst/>
     <dgm:txLinClrLst/>
@@ -969,20 +831,18 @@
   </dgm:styleLbl>
   <dgm:styleLbl name="bgShp">
     <dgm:fillClrLst meth="repeat">
-      <a:schemeClr val="accent2"/>
-      <a:schemeClr val="accent3"/>
-      <a:schemeClr val="accent4"/>
-      <a:schemeClr val="accent5"/>
-      <a:schemeClr val="accent6"/>
+      <a:schemeClr val="accent2">
+        <a:tint val="40000"/>
+      </a:schemeClr>
     </dgm:fillClrLst>
     <dgm:linClrLst meth="repeat">
-      <a:schemeClr val="lt1">
-        <a:alpha val="0"/>
-      </a:schemeClr>
-    </dgm:linClrLst>
-    <dgm:effectClrLst/>
-    <dgm:txLinClrLst/>
-    <dgm:txFillClrLst/>
+      <a:schemeClr val="dk1"/>
+    </dgm:linClrLst>
+    <dgm:effectClrLst/>
+    <dgm:txLinClrLst/>
+    <dgm:txFillClrLst meth="repeat">
+      <a:schemeClr val="dk1"/>
+    </dgm:txFillClrLst>
     <dgm:txEffectClrLst/>
   </dgm:styleLbl>
   <dgm:styleLbl name="dkBgShp">
@@ -1003,7 +863,7 @@
   </dgm:styleLbl>
   <dgm:styleLbl name="trBgShp">
     <dgm:fillClrLst meth="repeat">
-      <a:schemeClr val="accent1">
+      <a:schemeClr val="accent2">
         <a:tint val="50000"/>
         <a:alpha val="40000"/>
       </a:schemeClr>
@@ -4899,7 +4759,7 @@
 <dgm:dataModel xmlns:dgm="http://schemas.openxmlformats.org/drawingml/2006/diagram" xmlns:a="http://schemas.openxmlformats.org/drawingml/2006/main">
   <dgm:ptLst>
     <dgm:pt modelId="{DE898547-EB52-49C9-A05D-76F796BFFB8B}" type="doc">
-      <dgm:prSet loTypeId="urn:microsoft.com/office/officeart/2018/2/layout/IconCircleList" loCatId="icon" qsTypeId="urn:microsoft.com/office/officeart/2005/8/quickstyle/simple1" qsCatId="simple" csTypeId="urn:microsoft.com/office/officeart/2018/5/colors/Iconchunking_neutralicon_colorful1" csCatId="colorful" phldr="1"/>
+      <dgm:prSet loTypeId="urn:microsoft.com/office/officeart/2005/8/layout/vProcess5" loCatId="process" qsTypeId="urn:microsoft.com/office/officeart/2005/8/quickstyle/simple1" qsCatId="simple" csTypeId="urn:microsoft.com/office/officeart/2005/8/colors/colorful2" csCatId="colorful" phldr="1"/>
       <dgm:spPr/>
       <dgm:t>
         <a:bodyPr/>
@@ -4916,16 +4776,10 @@
         <a:bodyPr/>
         <a:lstStyle/>
         <a:p>
-          <a:pPr>
-            <a:lnSpc>
-              <a:spcPct val="100000"/>
-            </a:lnSpc>
-          </a:pPr>
           <a:r>
             <a:rPr lang="en-US"/>
             <a:t>Figma — Design Evaluation and Evolution</a:t>
           </a:r>
-          <a:endParaRPr lang="en-US" dirty="0"/>
         </a:p>
       </dgm:t>
     </dgm:pt>
@@ -4947,11 +4801,6 @@
         <a:bodyPr/>
         <a:lstStyle/>
         <a:p>
-          <a:pPr>
-            <a:lnSpc>
-              <a:spcPct val="100000"/>
-            </a:lnSpc>
-          </a:pPr>
           <a:endParaRPr lang="en-US"/>
         </a:p>
       </dgm:t>
@@ -4963,13 +4812,8 @@
         <a:bodyPr/>
         <a:lstStyle/>
         <a:p>
-          <a:pPr>
-            <a:lnSpc>
-              <a:spcPct val="100000"/>
-            </a:lnSpc>
-          </a:pPr>
           <a:r>
-            <a:rPr lang="en-US" dirty="0"/>
+            <a:rPr lang="en-US"/>
             <a:t>LLM Research</a:t>
           </a:r>
         </a:p>
@@ -4993,57 +4837,6 @@
         <a:bodyPr/>
         <a:lstStyle/>
         <a:p>
-          <a:pPr>
-            <a:lnSpc>
-              <a:spcPct val="100000"/>
-            </a:lnSpc>
-          </a:pPr>
-          <a:endParaRPr lang="en-US"/>
-        </a:p>
-      </dgm:t>
-    </dgm:pt>
-    <dgm:pt modelId="{6C7B2E10-DF7C-41A7-A306-BF921450F685}">
-      <dgm:prSet/>
-      <dgm:spPr/>
-      <dgm:t>
-        <a:bodyPr/>
-        <a:lstStyle/>
-        <a:p>
-          <a:pPr>
-            <a:lnSpc>
-              <a:spcPct val="100000"/>
-            </a:lnSpc>
-          </a:pPr>
-          <a:r>
-            <a:rPr lang="en-US" dirty="0"/>
-            <a:t>Database Setup — Prisma/Postgres/pgVector</a:t>
-          </a:r>
-        </a:p>
-      </dgm:t>
-    </dgm:pt>
-    <dgm:pt modelId="{88DA7153-81D9-4AB7-B2B8-85763FBE7956}" type="parTrans" cxnId="{563E70B5-7424-488D-84B0-D5BD5EFDBE50}">
-      <dgm:prSet/>
-      <dgm:spPr/>
-      <dgm:t>
-        <a:bodyPr/>
-        <a:lstStyle/>
-        <a:p>
-          <a:endParaRPr lang="en-US"/>
-        </a:p>
-      </dgm:t>
-    </dgm:pt>
-    <dgm:pt modelId="{EF64C0EF-A44F-4793-8F80-8EEB2AE5177C}" type="sibTrans" cxnId="{563E70B5-7424-488D-84B0-D5BD5EFDBE50}">
-      <dgm:prSet/>
-      <dgm:spPr/>
-      <dgm:t>
-        <a:bodyPr/>
-        <a:lstStyle/>
-        <a:p>
-          <a:pPr>
-            <a:lnSpc>
-              <a:spcPct val="100000"/>
-            </a:lnSpc>
-          </a:pPr>
           <a:endParaRPr lang="en-US"/>
         </a:p>
       </dgm:t>
@@ -5055,13 +4848,8 @@
         <a:bodyPr/>
         <a:lstStyle/>
         <a:p>
-          <a:pPr>
-            <a:lnSpc>
-              <a:spcPct val="100000"/>
-            </a:lnSpc>
-          </a:pPr>
           <a:r>
-            <a:rPr lang="en-US" dirty="0"/>
+            <a:rPr lang="en-US"/>
             <a:t>Weekly Retrospective</a:t>
           </a:r>
         </a:p>
@@ -5089,270 +4877,109 @@
         </a:p>
       </dgm:t>
     </dgm:pt>
-    <dgm:pt modelId="{5D5461DB-9A91-4CCA-BD32-8943BF94888D}" type="pres">
-      <dgm:prSet presAssocID="{DE898547-EB52-49C9-A05D-76F796BFFB8B}" presName="root" presStyleCnt="0">
+    <dgm:pt modelId="{B5FC21FC-6719-491D-ADD0-A9F772F23856}" type="pres">
+      <dgm:prSet presAssocID="{DE898547-EB52-49C9-A05D-76F796BFFB8B}" presName="outerComposite" presStyleCnt="0">
         <dgm:presLayoutVars>
+          <dgm:chMax val="5"/>
           <dgm:dir/>
           <dgm:resizeHandles val="exact"/>
         </dgm:presLayoutVars>
       </dgm:prSet>
       <dgm:spPr/>
     </dgm:pt>
-    <dgm:pt modelId="{2893EF6B-EA27-4B66-9B65-6565E5EC51EB}" type="pres">
-      <dgm:prSet presAssocID="{DE898547-EB52-49C9-A05D-76F796BFFB8B}" presName="container" presStyleCnt="0">
+    <dgm:pt modelId="{02330A90-0F94-4C6E-A77E-6EAAB9F692EE}" type="pres">
+      <dgm:prSet presAssocID="{DE898547-EB52-49C9-A05D-76F796BFFB8B}" presName="dummyMaxCanvas" presStyleCnt="0">
+        <dgm:presLayoutVars/>
+      </dgm:prSet>
+      <dgm:spPr/>
+    </dgm:pt>
+    <dgm:pt modelId="{F9AF8FCF-2BDA-47DC-A99E-C3684C8F99ED}" type="pres">
+      <dgm:prSet presAssocID="{DE898547-EB52-49C9-A05D-76F796BFFB8B}" presName="ThreeNodes_1" presStyleLbl="node1" presStyleIdx="0" presStyleCnt="3">
         <dgm:presLayoutVars>
-          <dgm:dir/>
-          <dgm:resizeHandles val="exact"/>
+          <dgm:bulletEnabled val="1"/>
         </dgm:presLayoutVars>
       </dgm:prSet>
       <dgm:spPr/>
     </dgm:pt>
-    <dgm:pt modelId="{A22285CE-0285-4204-82C9-97949629AA32}" type="pres">
-      <dgm:prSet presAssocID="{1D643182-5F6D-4B71-BD96-DE2054D94CE4}" presName="compNode" presStyleCnt="0"/>
-      <dgm:spPr/>
-    </dgm:pt>
-    <dgm:pt modelId="{164868A9-DE1D-4991-BAE9-4316C3A423A2}" type="pres">
-      <dgm:prSet presAssocID="{1D643182-5F6D-4B71-BD96-DE2054D94CE4}" presName="iconBgRect" presStyleLbl="bgShp" presStyleIdx="0" presStyleCnt="4"/>
-      <dgm:spPr/>
-    </dgm:pt>
-    <dgm:pt modelId="{9D941A9D-4D8E-4591-A607-135EE0F088A4}" type="pres">
-      <dgm:prSet presAssocID="{1D643182-5F6D-4B71-BD96-DE2054D94CE4}" presName="iconRect" presStyleLbl="node1" presStyleIdx="0" presStyleCnt="4"/>
-      <dgm:spPr>
-        <a:blipFill>
-          <a:blip xmlns:r="http://schemas.openxmlformats.org/officeDocument/2006/relationships" r:embed="rId1">
-            <a:extLst>
-              <a:ext uri="{28A0092B-C50C-407E-A947-70E740481C1C}">
-                <a14:useLocalDpi xmlns:a14="http://schemas.microsoft.com/office/drawing/2010/main" val="0"/>
-              </a:ext>
-              <a:ext uri="{96DAC541-7B7A-43D3-8B79-37D633B846F1}">
-                <asvg:svgBlip xmlns:asvg="http://schemas.microsoft.com/office/drawing/2016/SVG/main" r:embed="rId2"/>
-              </a:ext>
-            </a:extLst>
-          </a:blip>
-          <a:stretch>
-            <a:fillRect/>
-          </a:stretch>
-        </a:blipFill>
-        <a:ln>
-          <a:noFill/>
-        </a:ln>
-      </dgm:spPr>
-      <dgm:extLst>
-        <a:ext uri="{E40237B7-FDA0-4F09-8148-C483321AD2D9}">
-          <dgm14:cNvPr xmlns:dgm14="http://schemas.microsoft.com/office/drawing/2010/diagram" id="0" name="" descr="Arrow Circle"/>
-        </a:ext>
-      </dgm:extLst>
-    </dgm:pt>
-    <dgm:pt modelId="{52237ECA-E770-4818-A071-5983A6A477F6}" type="pres">
-      <dgm:prSet presAssocID="{1D643182-5F6D-4B71-BD96-DE2054D94CE4}" presName="spaceRect" presStyleCnt="0"/>
-      <dgm:spPr/>
-    </dgm:pt>
-    <dgm:pt modelId="{734AFF22-091E-4826-8D11-A08D4D668D97}" type="pres">
-      <dgm:prSet presAssocID="{1D643182-5F6D-4B71-BD96-DE2054D94CE4}" presName="textRect" presStyleLbl="revTx" presStyleIdx="0" presStyleCnt="4">
+    <dgm:pt modelId="{4EF9F24F-C4B5-4B6A-88EB-A363873A0AD6}" type="pres">
+      <dgm:prSet presAssocID="{DE898547-EB52-49C9-A05D-76F796BFFB8B}" presName="ThreeNodes_2" presStyleLbl="node1" presStyleIdx="1" presStyleCnt="3">
         <dgm:presLayoutVars>
-          <dgm:chMax val="1"/>
-          <dgm:chPref val="1"/>
+          <dgm:bulletEnabled val="1"/>
         </dgm:presLayoutVars>
       </dgm:prSet>
       <dgm:spPr/>
     </dgm:pt>
-    <dgm:pt modelId="{CB63D625-7F9A-4A21-92D8-DEF580EE30BF}" type="pres">
-      <dgm:prSet presAssocID="{24DD1C01-EC1C-4AAD-9BF9-9FBFDCEE6DF8}" presName="sibTrans" presStyleLbl="sibTrans2D1" presStyleIdx="0" presStyleCnt="0"/>
-      <dgm:spPr/>
-    </dgm:pt>
-    <dgm:pt modelId="{79D867EA-EE75-492A-A534-A3F86F938B7F}" type="pres">
-      <dgm:prSet presAssocID="{706EDF45-2E91-49E3-B175-E225C3BE37B8}" presName="compNode" presStyleCnt="0"/>
-      <dgm:spPr/>
-    </dgm:pt>
-    <dgm:pt modelId="{4F7CCBC8-B0ED-49EA-9F3D-6D95330A5B30}" type="pres">
-      <dgm:prSet presAssocID="{706EDF45-2E91-49E3-B175-E225C3BE37B8}" presName="iconBgRect" presStyleLbl="bgShp" presStyleIdx="1" presStyleCnt="4"/>
-      <dgm:spPr/>
-    </dgm:pt>
-    <dgm:pt modelId="{4FBF2E08-9E4D-407B-A310-244E57BBFCD4}" type="pres">
-      <dgm:prSet presAssocID="{706EDF45-2E91-49E3-B175-E225C3BE37B8}" presName="iconRect" presStyleLbl="node1" presStyleIdx="1" presStyleCnt="4"/>
-      <dgm:spPr>
-        <a:blipFill>
-          <a:blip xmlns:r="http://schemas.openxmlformats.org/officeDocument/2006/relationships" r:embed="rId3">
-            <a:extLst>
-              <a:ext uri="{28A0092B-C50C-407E-A947-70E740481C1C}">
-                <a14:useLocalDpi xmlns:a14="http://schemas.microsoft.com/office/drawing/2010/main" val="0"/>
-              </a:ext>
-              <a:ext uri="{96DAC541-7B7A-43D3-8B79-37D633B846F1}">
-                <asvg:svgBlip xmlns:asvg="http://schemas.microsoft.com/office/drawing/2016/SVG/main" r:embed="rId4"/>
-              </a:ext>
-            </a:extLst>
-          </a:blip>
-          <a:stretch>
-            <a:fillRect/>
-          </a:stretch>
-        </a:blipFill>
-        <a:ln>
-          <a:noFill/>
-        </a:ln>
-      </dgm:spPr>
-      <dgm:extLst>
-        <a:ext uri="{E40237B7-FDA0-4F09-8148-C483321AD2D9}">
-          <dgm14:cNvPr xmlns:dgm14="http://schemas.microsoft.com/office/drawing/2010/diagram" id="0" name="" descr="Magnifying glass"/>
-        </a:ext>
-      </dgm:extLst>
-    </dgm:pt>
-    <dgm:pt modelId="{1F524B1E-B64A-47F0-B290-8C2CD9F2B071}" type="pres">
-      <dgm:prSet presAssocID="{706EDF45-2E91-49E3-B175-E225C3BE37B8}" presName="spaceRect" presStyleCnt="0"/>
-      <dgm:spPr/>
-    </dgm:pt>
-    <dgm:pt modelId="{D6C27012-16E7-4AEE-9638-F2B9EB8E9D23}" type="pres">
-      <dgm:prSet presAssocID="{706EDF45-2E91-49E3-B175-E225C3BE37B8}" presName="textRect" presStyleLbl="revTx" presStyleIdx="1" presStyleCnt="4">
+    <dgm:pt modelId="{2A1064DC-ED59-474C-A69B-227ED46BC78E}" type="pres">
+      <dgm:prSet presAssocID="{DE898547-EB52-49C9-A05D-76F796BFFB8B}" presName="ThreeNodes_3" presStyleLbl="node1" presStyleIdx="2" presStyleCnt="3">
         <dgm:presLayoutVars>
-          <dgm:chMax val="1"/>
-          <dgm:chPref val="1"/>
+          <dgm:bulletEnabled val="1"/>
         </dgm:presLayoutVars>
       </dgm:prSet>
       <dgm:spPr/>
     </dgm:pt>
-    <dgm:pt modelId="{306F98DB-A648-4526-8AB4-6D41FB1F3A6A}" type="pres">
-      <dgm:prSet presAssocID="{A2BC753C-F228-4382-AEC2-266EDCB5A08D}" presName="sibTrans" presStyleLbl="sibTrans2D1" presStyleIdx="0" presStyleCnt="0"/>
-      <dgm:spPr/>
-    </dgm:pt>
-    <dgm:pt modelId="{4504DF8F-99BE-4A2C-9F73-4B7C8F18366C}" type="pres">
-      <dgm:prSet presAssocID="{6C7B2E10-DF7C-41A7-A306-BF921450F685}" presName="compNode" presStyleCnt="0"/>
-      <dgm:spPr/>
-    </dgm:pt>
-    <dgm:pt modelId="{66639A5C-196D-4C2E-BD20-5A1BB7C54C2D}" type="pres">
-      <dgm:prSet presAssocID="{6C7B2E10-DF7C-41A7-A306-BF921450F685}" presName="iconBgRect" presStyleLbl="bgShp" presStyleIdx="2" presStyleCnt="4"/>
-      <dgm:spPr/>
-    </dgm:pt>
-    <dgm:pt modelId="{AC121446-9C5D-446F-818D-8FB186BEFF9A}" type="pres">
-      <dgm:prSet presAssocID="{6C7B2E10-DF7C-41A7-A306-BF921450F685}" presName="iconRect" presStyleLbl="node1" presStyleIdx="2" presStyleCnt="4"/>
-      <dgm:spPr>
-        <a:blipFill>
-          <a:blip xmlns:r="http://schemas.openxmlformats.org/officeDocument/2006/relationships" r:embed="rId5">
-            <a:extLst>
-              <a:ext uri="{28A0092B-C50C-407E-A947-70E740481C1C}">
-                <a14:useLocalDpi xmlns:a14="http://schemas.microsoft.com/office/drawing/2010/main" val="0"/>
-              </a:ext>
-              <a:ext uri="{96DAC541-7B7A-43D3-8B79-37D633B846F1}">
-                <asvg:svgBlip xmlns:asvg="http://schemas.microsoft.com/office/drawing/2016/SVG/main" r:embed="rId6"/>
-              </a:ext>
-            </a:extLst>
-          </a:blip>
-          <a:stretch>
-            <a:fillRect/>
-          </a:stretch>
-        </a:blipFill>
-        <a:ln>
-          <a:noFill/>
-        </a:ln>
-      </dgm:spPr>
-      <dgm:extLst>
-        <a:ext uri="{E40237B7-FDA0-4F09-8148-C483321AD2D9}">
-          <dgm14:cNvPr xmlns:dgm14="http://schemas.microsoft.com/office/drawing/2010/diagram" id="0" name="" descr="Database"/>
-        </a:ext>
-      </dgm:extLst>
-    </dgm:pt>
-    <dgm:pt modelId="{77309F65-5E08-457B-8166-2836A5031721}" type="pres">
-      <dgm:prSet presAssocID="{6C7B2E10-DF7C-41A7-A306-BF921450F685}" presName="spaceRect" presStyleCnt="0"/>
-      <dgm:spPr/>
-    </dgm:pt>
-    <dgm:pt modelId="{B578413A-FD81-49D3-B259-19312FAF6D8A}" type="pres">
-      <dgm:prSet presAssocID="{6C7B2E10-DF7C-41A7-A306-BF921450F685}" presName="textRect" presStyleLbl="revTx" presStyleIdx="2" presStyleCnt="4">
+    <dgm:pt modelId="{5E0FE94D-8923-4F31-93D7-D71DBAFE2D1F}" type="pres">
+      <dgm:prSet presAssocID="{DE898547-EB52-49C9-A05D-76F796BFFB8B}" presName="ThreeConn_1-2" presStyleLbl="fgAccFollowNode1" presStyleIdx="0" presStyleCnt="2">
         <dgm:presLayoutVars>
-          <dgm:chMax val="1"/>
-          <dgm:chPref val="1"/>
+          <dgm:bulletEnabled val="1"/>
         </dgm:presLayoutVars>
       </dgm:prSet>
       <dgm:spPr/>
     </dgm:pt>
-    <dgm:pt modelId="{137FE1A7-3668-40A1-9471-64F72388BC8E}" type="pres">
-      <dgm:prSet presAssocID="{EF64C0EF-A44F-4793-8F80-8EEB2AE5177C}" presName="sibTrans" presStyleLbl="sibTrans2D1" presStyleIdx="0" presStyleCnt="0"/>
+    <dgm:pt modelId="{29930797-768A-4676-A15F-D20780479AFE}" type="pres">
+      <dgm:prSet presAssocID="{DE898547-EB52-49C9-A05D-76F796BFFB8B}" presName="ThreeConn_2-3" presStyleLbl="fgAccFollowNode1" presStyleIdx="1" presStyleCnt="2">
+        <dgm:presLayoutVars>
+          <dgm:bulletEnabled val="1"/>
+        </dgm:presLayoutVars>
+      </dgm:prSet>
       <dgm:spPr/>
     </dgm:pt>
-    <dgm:pt modelId="{91BA8B46-D367-443E-BCB1-605916AA7EB5}" type="pres">
-      <dgm:prSet presAssocID="{E32E48CE-8521-42F7-9AF3-731F567625F6}" presName="compNode" presStyleCnt="0"/>
+    <dgm:pt modelId="{4181481A-F755-463E-B9C8-C37A8F4DBBAE}" type="pres">
+      <dgm:prSet presAssocID="{DE898547-EB52-49C9-A05D-76F796BFFB8B}" presName="ThreeNodes_1_text" presStyleLbl="node1" presStyleIdx="2" presStyleCnt="3">
+        <dgm:presLayoutVars>
+          <dgm:bulletEnabled val="1"/>
+        </dgm:presLayoutVars>
+      </dgm:prSet>
       <dgm:spPr/>
     </dgm:pt>
-    <dgm:pt modelId="{A8D75A76-07A5-4D34-85C4-01BE597479DA}" type="pres">
-      <dgm:prSet presAssocID="{E32E48CE-8521-42F7-9AF3-731F567625F6}" presName="iconBgRect" presStyleLbl="bgShp" presStyleIdx="3" presStyleCnt="4"/>
+    <dgm:pt modelId="{C4389AFD-0EAA-469F-9C20-AFC65A2E2202}" type="pres">
+      <dgm:prSet presAssocID="{DE898547-EB52-49C9-A05D-76F796BFFB8B}" presName="ThreeNodes_2_text" presStyleLbl="node1" presStyleIdx="2" presStyleCnt="3">
+        <dgm:presLayoutVars>
+          <dgm:bulletEnabled val="1"/>
+        </dgm:presLayoutVars>
+      </dgm:prSet>
       <dgm:spPr/>
     </dgm:pt>
-    <dgm:pt modelId="{76AD349D-C22B-4CE4-9819-52F09FD44B3A}" type="pres">
-      <dgm:prSet presAssocID="{E32E48CE-8521-42F7-9AF3-731F567625F6}" presName="iconRect" presStyleLbl="node1" presStyleIdx="3" presStyleCnt="4"/>
-      <dgm:spPr>
-        <a:blipFill>
-          <a:blip xmlns:r="http://schemas.openxmlformats.org/officeDocument/2006/relationships" r:embed="rId7">
-            <a:extLst>
-              <a:ext uri="{28A0092B-C50C-407E-A947-70E740481C1C}">
-                <a14:useLocalDpi xmlns:a14="http://schemas.microsoft.com/office/drawing/2010/main" val="0"/>
-              </a:ext>
-              <a:ext uri="{96DAC541-7B7A-43D3-8B79-37D633B846F1}">
-                <asvg:svgBlip xmlns:asvg="http://schemas.microsoft.com/office/drawing/2016/SVG/main" r:embed="rId8"/>
-              </a:ext>
-            </a:extLst>
-          </a:blip>
-          <a:stretch>
-            <a:fillRect/>
-          </a:stretch>
-        </a:blipFill>
-        <a:ln>
-          <a:noFill/>
-        </a:ln>
-      </dgm:spPr>
-      <dgm:extLst>
-        <a:ext uri="{E40237B7-FDA0-4F09-8148-C483321AD2D9}">
-          <dgm14:cNvPr xmlns:dgm14="http://schemas.microsoft.com/office/drawing/2010/diagram" id="0" name="" descr="Checkmark"/>
-        </a:ext>
-      </dgm:extLst>
-    </dgm:pt>
-    <dgm:pt modelId="{C6CC6B88-C140-4EBE-A50D-92EE8A8ECC75}" type="pres">
-      <dgm:prSet presAssocID="{E32E48CE-8521-42F7-9AF3-731F567625F6}" presName="spaceRect" presStyleCnt="0"/>
-      <dgm:spPr/>
-    </dgm:pt>
-    <dgm:pt modelId="{2F7D5AC7-FAFA-4CCA-A49A-C2CA0D812C7B}" type="pres">
-      <dgm:prSet presAssocID="{E32E48CE-8521-42F7-9AF3-731F567625F6}" presName="textRect" presStyleLbl="revTx" presStyleIdx="3" presStyleCnt="4">
+    <dgm:pt modelId="{19517AE1-F42B-4A36-B367-0F1D28B4FE12}" type="pres">
+      <dgm:prSet presAssocID="{DE898547-EB52-49C9-A05D-76F796BFFB8B}" presName="ThreeNodes_3_text" presStyleLbl="node1" presStyleIdx="2" presStyleCnt="3">
         <dgm:presLayoutVars>
-          <dgm:chMax val="1"/>
-          <dgm:chPref val="1"/>
+          <dgm:bulletEnabled val="1"/>
         </dgm:presLayoutVars>
       </dgm:prSet>
       <dgm:spPr/>
     </dgm:pt>
   </dgm:ptLst>
   <dgm:cxnLst>
-    <dgm:cxn modelId="{DA25A85D-A7F7-455A-899D-A90F959BC1B9}" type="presOf" srcId="{A2BC753C-F228-4382-AEC2-266EDCB5A08D}" destId="{306F98DB-A648-4526-8AB4-6D41FB1F3A6A}" srcOrd="0" destOrd="0" presId="urn:microsoft.com/office/officeart/2018/2/layout/IconCircleList"/>
-    <dgm:cxn modelId="{3F7E5B76-D253-40E0-BBB7-DAF3D75AFA74}" type="presOf" srcId="{6C7B2E10-DF7C-41A7-A306-BF921450F685}" destId="{B578413A-FD81-49D3-B259-19312FAF6D8A}" srcOrd="0" destOrd="0" presId="urn:microsoft.com/office/officeart/2018/2/layout/IconCircleList"/>
-    <dgm:cxn modelId="{3D8FCF9D-BA47-4AAC-B679-EA7F95494B7F}" type="presOf" srcId="{DE898547-EB52-49C9-A05D-76F796BFFB8B}" destId="{5D5461DB-9A91-4CCA-BD32-8943BF94888D}" srcOrd="0" destOrd="0" presId="urn:microsoft.com/office/officeart/2018/2/layout/IconCircleList"/>
-    <dgm:cxn modelId="{E2390CA1-2354-4F01-8C9B-C8EEC6CD2ECC}" type="presOf" srcId="{706EDF45-2E91-49E3-B175-E225C3BE37B8}" destId="{D6C27012-16E7-4AEE-9638-F2B9EB8E9D23}" srcOrd="0" destOrd="0" presId="urn:microsoft.com/office/officeart/2018/2/layout/IconCircleList"/>
-    <dgm:cxn modelId="{58AE9AA5-9363-47E3-B448-ADABE3AFD577}" type="presOf" srcId="{EF64C0EF-A44F-4793-8F80-8EEB2AE5177C}" destId="{137FE1A7-3668-40A1-9471-64F72388BC8E}" srcOrd="0" destOrd="0" presId="urn:microsoft.com/office/officeart/2018/2/layout/IconCircleList"/>
-    <dgm:cxn modelId="{563E70B5-7424-488D-84B0-D5BD5EFDBE50}" srcId="{DE898547-EB52-49C9-A05D-76F796BFFB8B}" destId="{6C7B2E10-DF7C-41A7-A306-BF921450F685}" srcOrd="2" destOrd="0" parTransId="{88DA7153-81D9-4AB7-B2B8-85763FBE7956}" sibTransId="{EF64C0EF-A44F-4793-8F80-8EEB2AE5177C}"/>
+    <dgm:cxn modelId="{47A40809-6986-499F-B262-EA45EA7CDDF4}" type="presOf" srcId="{706EDF45-2E91-49E3-B175-E225C3BE37B8}" destId="{C4389AFD-0EAA-469F-9C20-AFC65A2E2202}" srcOrd="1" destOrd="0" presId="urn:microsoft.com/office/officeart/2005/8/layout/vProcess5"/>
+    <dgm:cxn modelId="{26A0B539-5AB7-4342-8594-8DBC73C4FE75}" type="presOf" srcId="{E32E48CE-8521-42F7-9AF3-731F567625F6}" destId="{2A1064DC-ED59-474C-A69B-227ED46BC78E}" srcOrd="0" destOrd="0" presId="urn:microsoft.com/office/officeart/2005/8/layout/vProcess5"/>
+    <dgm:cxn modelId="{E08A2C49-B9A3-44F5-A788-BD600F1D2405}" type="presOf" srcId="{706EDF45-2E91-49E3-B175-E225C3BE37B8}" destId="{4EF9F24F-C4B5-4B6A-88EB-A363873A0AD6}" srcOrd="0" destOrd="0" presId="urn:microsoft.com/office/officeart/2005/8/layout/vProcess5"/>
+    <dgm:cxn modelId="{A7D98669-F2A0-4F41-AED9-7CF0C97DC6AF}" type="presOf" srcId="{1D643182-5F6D-4B71-BD96-DE2054D94CE4}" destId="{4181481A-F755-463E-B9C8-C37A8F4DBBAE}" srcOrd="1" destOrd="0" presId="urn:microsoft.com/office/officeart/2005/8/layout/vProcess5"/>
+    <dgm:cxn modelId="{38ABC951-7635-4E8C-88B8-BDF85F39A2F9}" type="presOf" srcId="{24DD1C01-EC1C-4AAD-9BF9-9FBFDCEE6DF8}" destId="{5E0FE94D-8923-4F31-93D7-D71DBAFE2D1F}" srcOrd="0" destOrd="0" presId="urn:microsoft.com/office/officeart/2005/8/layout/vProcess5"/>
+    <dgm:cxn modelId="{B973B181-E5B2-4245-B071-2D761A9874E4}" type="presOf" srcId="{A2BC753C-F228-4382-AEC2-266EDCB5A08D}" destId="{29930797-768A-4676-A15F-D20780479AFE}" srcOrd="0" destOrd="0" presId="urn:microsoft.com/office/officeart/2005/8/layout/vProcess5"/>
+    <dgm:cxn modelId="{77E5468B-B5AB-4E5F-A139-F7C118E65BA9}" type="presOf" srcId="{E32E48CE-8521-42F7-9AF3-731F567625F6}" destId="{19517AE1-F42B-4A36-B367-0F1D28B4FE12}" srcOrd="1" destOrd="0" presId="urn:microsoft.com/office/officeart/2005/8/layout/vProcess5"/>
+    <dgm:cxn modelId="{23CA44BD-769B-4729-88AA-687350931805}" type="presOf" srcId="{DE898547-EB52-49C9-A05D-76F796BFFB8B}" destId="{B5FC21FC-6719-491D-ADD0-A9F772F23856}" srcOrd="0" destOrd="0" presId="urn:microsoft.com/office/officeart/2005/8/layout/vProcess5"/>
     <dgm:cxn modelId="{6EF678C7-5EF2-4FDF-8785-31779A9EA8C4}" srcId="{DE898547-EB52-49C9-A05D-76F796BFFB8B}" destId="{706EDF45-2E91-49E3-B175-E225C3BE37B8}" srcOrd="1" destOrd="0" parTransId="{B8936CF1-0B7E-4890-AE88-AF0BC0A13315}" sibTransId="{A2BC753C-F228-4382-AEC2-266EDCB5A08D}"/>
-    <dgm:cxn modelId="{B03BECD4-09F4-450B-9D59-7291B6577041}" type="presOf" srcId="{1D643182-5F6D-4B71-BD96-DE2054D94CE4}" destId="{734AFF22-091E-4826-8D11-A08D4D668D97}" srcOrd="0" destOrd="0" presId="urn:microsoft.com/office/officeart/2018/2/layout/IconCircleList"/>
-    <dgm:cxn modelId="{DD5E95D5-A81F-48AC-9205-00B6A272D6AA}" type="presOf" srcId="{E32E48CE-8521-42F7-9AF3-731F567625F6}" destId="{2F7D5AC7-FAFA-4CCA-A49A-C2CA0D812C7B}" srcOrd="0" destOrd="0" presId="urn:microsoft.com/office/officeart/2018/2/layout/IconCircleList"/>
-    <dgm:cxn modelId="{6C9E4CFD-76D3-4F63-8E45-DFAE682F8D13}" srcId="{DE898547-EB52-49C9-A05D-76F796BFFB8B}" destId="{E32E48CE-8521-42F7-9AF3-731F567625F6}" srcOrd="3" destOrd="0" parTransId="{F68CF254-3BDB-4BA3-8D74-CE47CFCB1EA0}" sibTransId="{5C8F66A4-718D-48D8-A427-368483C4387E}"/>
-    <dgm:cxn modelId="{2322BCFD-732F-49C6-B877-FDE9DA59A1AD}" type="presOf" srcId="{24DD1C01-EC1C-4AAD-9BF9-9FBFDCEE6DF8}" destId="{CB63D625-7F9A-4A21-92D8-DEF580EE30BF}" srcOrd="0" destOrd="0" presId="urn:microsoft.com/office/officeart/2018/2/layout/IconCircleList"/>
+    <dgm:cxn modelId="{0C4CB9DC-63F1-4070-8D7E-FFBC31646122}" type="presOf" srcId="{1D643182-5F6D-4B71-BD96-DE2054D94CE4}" destId="{F9AF8FCF-2BDA-47DC-A99E-C3684C8F99ED}" srcOrd="0" destOrd="0" presId="urn:microsoft.com/office/officeart/2005/8/layout/vProcess5"/>
+    <dgm:cxn modelId="{6C9E4CFD-76D3-4F63-8E45-DFAE682F8D13}" srcId="{DE898547-EB52-49C9-A05D-76F796BFFB8B}" destId="{E32E48CE-8521-42F7-9AF3-731F567625F6}" srcOrd="2" destOrd="0" parTransId="{F68CF254-3BDB-4BA3-8D74-CE47CFCB1EA0}" sibTransId="{5C8F66A4-718D-48D8-A427-368483C4387E}"/>
     <dgm:cxn modelId="{6822B2FE-B0BA-47E5-8DDF-1ED7DC3695F2}" srcId="{DE898547-EB52-49C9-A05D-76F796BFFB8B}" destId="{1D643182-5F6D-4B71-BD96-DE2054D94CE4}" srcOrd="0" destOrd="0" parTransId="{DC28A25F-1B91-4B02-8198-C63E31E193FD}" sibTransId="{24DD1C01-EC1C-4AAD-9BF9-9FBFDCEE6DF8}"/>
-    <dgm:cxn modelId="{BB40B7E3-BB1A-41EA-B8EF-75D542831EC5}" type="presParOf" srcId="{5D5461DB-9A91-4CCA-BD32-8943BF94888D}" destId="{2893EF6B-EA27-4B66-9B65-6565E5EC51EB}" srcOrd="0" destOrd="0" presId="urn:microsoft.com/office/officeart/2018/2/layout/IconCircleList"/>
-    <dgm:cxn modelId="{F65F0C2D-7CF3-4462-B178-C040AEF0C642}" type="presParOf" srcId="{2893EF6B-EA27-4B66-9B65-6565E5EC51EB}" destId="{A22285CE-0285-4204-82C9-97949629AA32}" srcOrd="0" destOrd="0" presId="urn:microsoft.com/office/officeart/2018/2/layout/IconCircleList"/>
-    <dgm:cxn modelId="{3401075D-EEC3-4CBE-8D44-777A4D74EAC8}" type="presParOf" srcId="{A22285CE-0285-4204-82C9-97949629AA32}" destId="{164868A9-DE1D-4991-BAE9-4316C3A423A2}" srcOrd="0" destOrd="0" presId="urn:microsoft.com/office/officeart/2018/2/layout/IconCircleList"/>
-    <dgm:cxn modelId="{04F13F0B-D6E0-460D-8869-9D0B8097AC41}" type="presParOf" srcId="{A22285CE-0285-4204-82C9-97949629AA32}" destId="{9D941A9D-4D8E-4591-A607-135EE0F088A4}" srcOrd="1" destOrd="0" presId="urn:microsoft.com/office/officeart/2018/2/layout/IconCircleList"/>
-    <dgm:cxn modelId="{45B0191D-B608-4346-AEC8-C378D7C7B998}" type="presParOf" srcId="{A22285CE-0285-4204-82C9-97949629AA32}" destId="{52237ECA-E770-4818-A071-5983A6A477F6}" srcOrd="2" destOrd="0" presId="urn:microsoft.com/office/officeart/2018/2/layout/IconCircleList"/>
-    <dgm:cxn modelId="{6FA3EA33-BA24-404A-93F0-CFCD2B4922A1}" type="presParOf" srcId="{A22285CE-0285-4204-82C9-97949629AA32}" destId="{734AFF22-091E-4826-8D11-A08D4D668D97}" srcOrd="3" destOrd="0" presId="urn:microsoft.com/office/officeart/2018/2/layout/IconCircleList"/>
-    <dgm:cxn modelId="{39E3E282-0E75-476E-85D6-4FAFE8E95951}" type="presParOf" srcId="{2893EF6B-EA27-4B66-9B65-6565E5EC51EB}" destId="{CB63D625-7F9A-4A21-92D8-DEF580EE30BF}" srcOrd="1" destOrd="0" presId="urn:microsoft.com/office/officeart/2018/2/layout/IconCircleList"/>
-    <dgm:cxn modelId="{4924EEB1-2E24-443B-8B62-F26E94883721}" type="presParOf" srcId="{2893EF6B-EA27-4B66-9B65-6565E5EC51EB}" destId="{79D867EA-EE75-492A-A534-A3F86F938B7F}" srcOrd="2" destOrd="0" presId="urn:microsoft.com/office/officeart/2018/2/layout/IconCircleList"/>
-    <dgm:cxn modelId="{3FAA6E68-971F-4F90-9D75-88E54046677A}" type="presParOf" srcId="{79D867EA-EE75-492A-A534-A3F86F938B7F}" destId="{4F7CCBC8-B0ED-49EA-9F3D-6D95330A5B30}" srcOrd="0" destOrd="0" presId="urn:microsoft.com/office/officeart/2018/2/layout/IconCircleList"/>
-    <dgm:cxn modelId="{C2C6E539-91A6-4ABE-849D-B0181DE58907}" type="presParOf" srcId="{79D867EA-EE75-492A-A534-A3F86F938B7F}" destId="{4FBF2E08-9E4D-407B-A310-244E57BBFCD4}" srcOrd="1" destOrd="0" presId="urn:microsoft.com/office/officeart/2018/2/layout/IconCircleList"/>
-    <dgm:cxn modelId="{9532A8C2-3832-4EE8-A667-2FAC9C16D563}" type="presParOf" srcId="{79D867EA-EE75-492A-A534-A3F86F938B7F}" destId="{1F524B1E-B64A-47F0-B290-8C2CD9F2B071}" srcOrd="2" destOrd="0" presId="urn:microsoft.com/office/officeart/2018/2/layout/IconCircleList"/>
-    <dgm:cxn modelId="{9941692F-6331-451E-BE35-48BA586BB923}" type="presParOf" srcId="{79D867EA-EE75-492A-A534-A3F86F938B7F}" destId="{D6C27012-16E7-4AEE-9638-F2B9EB8E9D23}" srcOrd="3" destOrd="0" presId="urn:microsoft.com/office/officeart/2018/2/layout/IconCircleList"/>
-    <dgm:cxn modelId="{CE750570-7E58-4DC9-AC0F-3382E58526E3}" type="presParOf" srcId="{2893EF6B-EA27-4B66-9B65-6565E5EC51EB}" destId="{306F98DB-A648-4526-8AB4-6D41FB1F3A6A}" srcOrd="3" destOrd="0" presId="urn:microsoft.com/office/officeart/2018/2/layout/IconCircleList"/>
-    <dgm:cxn modelId="{2C1C7EE5-7A6D-41F4-9CED-38EB0F1CA311}" type="presParOf" srcId="{2893EF6B-EA27-4B66-9B65-6565E5EC51EB}" destId="{4504DF8F-99BE-4A2C-9F73-4B7C8F18366C}" srcOrd="4" destOrd="0" presId="urn:microsoft.com/office/officeart/2018/2/layout/IconCircleList"/>
-    <dgm:cxn modelId="{789622E3-5C89-4024-A347-E6D5A63499C7}" type="presParOf" srcId="{4504DF8F-99BE-4A2C-9F73-4B7C8F18366C}" destId="{66639A5C-196D-4C2E-BD20-5A1BB7C54C2D}" srcOrd="0" destOrd="0" presId="urn:microsoft.com/office/officeart/2018/2/layout/IconCircleList"/>
-    <dgm:cxn modelId="{8689A16D-6758-4BC4-A3BC-911D9C8EC906}" type="presParOf" srcId="{4504DF8F-99BE-4A2C-9F73-4B7C8F18366C}" destId="{AC121446-9C5D-446F-818D-8FB186BEFF9A}" srcOrd="1" destOrd="0" presId="urn:microsoft.com/office/officeart/2018/2/layout/IconCircleList"/>
-    <dgm:cxn modelId="{272548F1-39E6-4CCC-BE9D-F2E6C35B463D}" type="presParOf" srcId="{4504DF8F-99BE-4A2C-9F73-4B7C8F18366C}" destId="{77309F65-5E08-457B-8166-2836A5031721}" srcOrd="2" destOrd="0" presId="urn:microsoft.com/office/officeart/2018/2/layout/IconCircleList"/>
-    <dgm:cxn modelId="{1A47484E-4D17-4966-A9CE-111F4CD84031}" type="presParOf" srcId="{4504DF8F-99BE-4A2C-9F73-4B7C8F18366C}" destId="{B578413A-FD81-49D3-B259-19312FAF6D8A}" srcOrd="3" destOrd="0" presId="urn:microsoft.com/office/officeart/2018/2/layout/IconCircleList"/>
-    <dgm:cxn modelId="{6C538392-3EAC-4992-A79E-B9FEB626DE7A}" type="presParOf" srcId="{2893EF6B-EA27-4B66-9B65-6565E5EC51EB}" destId="{137FE1A7-3668-40A1-9471-64F72388BC8E}" srcOrd="5" destOrd="0" presId="urn:microsoft.com/office/officeart/2018/2/layout/IconCircleList"/>
-    <dgm:cxn modelId="{8E863F00-DEA6-491E-9F61-7C409F126486}" type="presParOf" srcId="{2893EF6B-EA27-4B66-9B65-6565E5EC51EB}" destId="{91BA8B46-D367-443E-BCB1-605916AA7EB5}" srcOrd="6" destOrd="0" presId="urn:microsoft.com/office/officeart/2018/2/layout/IconCircleList"/>
-    <dgm:cxn modelId="{62FEDA19-7C5A-45AE-B3A1-515C2F6CF85D}" type="presParOf" srcId="{91BA8B46-D367-443E-BCB1-605916AA7EB5}" destId="{A8D75A76-07A5-4D34-85C4-01BE597479DA}" srcOrd="0" destOrd="0" presId="urn:microsoft.com/office/officeart/2018/2/layout/IconCircleList"/>
-    <dgm:cxn modelId="{DA30C582-05EF-4964-93BD-ED3E3ECF5285}" type="presParOf" srcId="{91BA8B46-D367-443E-BCB1-605916AA7EB5}" destId="{76AD349D-C22B-4CE4-9819-52F09FD44B3A}" srcOrd="1" destOrd="0" presId="urn:microsoft.com/office/officeart/2018/2/layout/IconCircleList"/>
-    <dgm:cxn modelId="{0ED433CB-79F4-4D4F-920B-3BD5949161D4}" type="presParOf" srcId="{91BA8B46-D367-443E-BCB1-605916AA7EB5}" destId="{C6CC6B88-C140-4EBE-A50D-92EE8A8ECC75}" srcOrd="2" destOrd="0" presId="urn:microsoft.com/office/officeart/2018/2/layout/IconCircleList"/>
-    <dgm:cxn modelId="{87330D81-8D7C-42F9-84D1-1998E1C7D802}" type="presParOf" srcId="{91BA8B46-D367-443E-BCB1-605916AA7EB5}" destId="{2F7D5AC7-FAFA-4CCA-A49A-C2CA0D812C7B}" srcOrd="3" destOrd="0" presId="urn:microsoft.com/office/officeart/2018/2/layout/IconCircleList"/>
+    <dgm:cxn modelId="{CC26697C-BB89-489B-AF80-9075D7F36ACC}" type="presParOf" srcId="{B5FC21FC-6719-491D-ADD0-A9F772F23856}" destId="{02330A90-0F94-4C6E-A77E-6EAAB9F692EE}" srcOrd="0" destOrd="0" presId="urn:microsoft.com/office/officeart/2005/8/layout/vProcess5"/>
+    <dgm:cxn modelId="{95A64561-B85A-4A33-A470-FEFB1651B634}" type="presParOf" srcId="{B5FC21FC-6719-491D-ADD0-A9F772F23856}" destId="{F9AF8FCF-2BDA-47DC-A99E-C3684C8F99ED}" srcOrd="1" destOrd="0" presId="urn:microsoft.com/office/officeart/2005/8/layout/vProcess5"/>
+    <dgm:cxn modelId="{B9AE4749-9FFC-4E25-B4DB-4AB6B2A3B79E}" type="presParOf" srcId="{B5FC21FC-6719-491D-ADD0-A9F772F23856}" destId="{4EF9F24F-C4B5-4B6A-88EB-A363873A0AD6}" srcOrd="2" destOrd="0" presId="urn:microsoft.com/office/officeart/2005/8/layout/vProcess5"/>
+    <dgm:cxn modelId="{2E4F5F83-7957-40DC-81B5-3527BDD78D66}" type="presParOf" srcId="{B5FC21FC-6719-491D-ADD0-A9F772F23856}" destId="{2A1064DC-ED59-474C-A69B-227ED46BC78E}" srcOrd="3" destOrd="0" presId="urn:microsoft.com/office/officeart/2005/8/layout/vProcess5"/>
+    <dgm:cxn modelId="{E433425D-1E85-475F-A430-1E0AE83211F0}" type="presParOf" srcId="{B5FC21FC-6719-491D-ADD0-A9F772F23856}" destId="{5E0FE94D-8923-4F31-93D7-D71DBAFE2D1F}" srcOrd="4" destOrd="0" presId="urn:microsoft.com/office/officeart/2005/8/layout/vProcess5"/>
+    <dgm:cxn modelId="{A3FE8BD3-A9BE-4B07-8DD7-03D04169E89E}" type="presParOf" srcId="{B5FC21FC-6719-491D-ADD0-A9F772F23856}" destId="{29930797-768A-4676-A15F-D20780479AFE}" srcOrd="5" destOrd="0" presId="urn:microsoft.com/office/officeart/2005/8/layout/vProcess5"/>
+    <dgm:cxn modelId="{977D3B92-88D5-4398-A2AF-09A6B8EF9508}" type="presParOf" srcId="{B5FC21FC-6719-491D-ADD0-A9F772F23856}" destId="{4181481A-F755-463E-B9C8-C37A8F4DBBAE}" srcOrd="6" destOrd="0" presId="urn:microsoft.com/office/officeart/2005/8/layout/vProcess5"/>
+    <dgm:cxn modelId="{A8995823-1257-4291-BB67-66CE437CE9AD}" type="presParOf" srcId="{B5FC21FC-6719-491D-ADD0-A9F772F23856}" destId="{C4389AFD-0EAA-469F-9C20-AFC65A2E2202}" srcOrd="7" destOrd="0" presId="urn:microsoft.com/office/officeart/2005/8/layout/vProcess5"/>
+    <dgm:cxn modelId="{DE4B9ADF-02E6-4AB2-9941-7F00722C71AF}" type="presParOf" srcId="{B5FC21FC-6719-491D-ADD0-A9F772F23856}" destId="{19517AE1-F42B-4A36-B367-0F1D28B4FE12}" srcOrd="8" destOrd="0" presId="urn:microsoft.com/office/officeart/2005/8/layout/vProcess5"/>
   </dgm:cxnLst>
   <dgm:bg/>
   <dgm:whole/>
@@ -7403,18 +7030,20 @@
       <dsp:cNvGrpSpPr/>
     </dsp:nvGrpSpPr>
     <dsp:grpSpPr/>
-    <dsp:sp modelId="{164868A9-DE1D-4991-BAE9-4316C3A423A2}">
+    <dsp:sp modelId="{F9AF8FCF-2BDA-47DC-A99E-C3684C8F99ED}">
       <dsp:nvSpPr>
         <dsp:cNvPr id="0" name=""/>
         <dsp:cNvSpPr/>
       </dsp:nvSpPr>
       <dsp:spPr>
         <a:xfrm>
-          <a:off x="18535" y="450978"/>
-          <a:ext cx="1080124" cy="1080124"/>
+          <a:off x="0" y="0"/>
+          <a:ext cx="6966490" cy="1257841"/>
         </a:xfrm>
-        <a:prstGeom prst="ellipse">
-          <a:avLst/>
+        <a:prstGeom prst="roundRect">
+          <a:avLst>
+            <a:gd name="adj" fmla="val 10000"/>
+          </a:avLst>
         </a:prstGeom>
         <a:solidFill>
           <a:schemeClr val="accent2">
@@ -7424,54 +7053,15 @@
             <a:alphaOff val="0"/>
           </a:schemeClr>
         </a:solidFill>
-        <a:ln>
-          <a:noFill/>
-        </a:ln>
-        <a:effectLst/>
-      </dsp:spPr>
-      <dsp:style>
-        <a:lnRef idx="0">
-          <a:scrgbClr r="0" g="0" b="0"/>
-        </a:lnRef>
-        <a:fillRef idx="1">
-          <a:scrgbClr r="0" g="0" b="0"/>
-        </a:fillRef>
-        <a:effectRef idx="0">
-          <a:scrgbClr r="0" g="0" b="0"/>
-        </a:effectRef>
-        <a:fontRef idx="minor"/>
-      </dsp:style>
-    </dsp:sp>
-    <dsp:sp modelId="{9D941A9D-4D8E-4591-A607-135EE0F088A4}">
-      <dsp:nvSpPr>
-        <dsp:cNvPr id="0" name=""/>
-        <dsp:cNvSpPr/>
-      </dsp:nvSpPr>
-      <dsp:spPr>
-        <a:xfrm>
-          <a:off x="245361" y="677804"/>
-          <a:ext cx="626472" cy="626472"/>
-        </a:xfrm>
-        <a:prstGeom prst="rect">
-          <a:avLst/>
-        </a:prstGeom>
-        <a:blipFill>
-          <a:blip xmlns:r="http://schemas.openxmlformats.org/officeDocument/2006/relationships" r:embed="rId1">
-            <a:extLst>
-              <a:ext uri="{28A0092B-C50C-407E-A947-70E740481C1C}">
-                <a14:useLocalDpi xmlns:a14="http://schemas.microsoft.com/office/drawing/2010/main" val="0"/>
-              </a:ext>
-              <a:ext uri="{96DAC541-7B7A-43D3-8B79-37D633B846F1}">
-                <asvg:svgBlip xmlns:asvg="http://schemas.microsoft.com/office/drawing/2016/SVG/main" r:embed="rId2"/>
-              </a:ext>
-            </a:extLst>
-          </a:blip>
-          <a:stretch>
-            <a:fillRect/>
-          </a:stretch>
-        </a:blipFill>
         <a:ln w="25400" cap="flat" cmpd="sng" algn="ctr">
-          <a:noFill/>
+          <a:solidFill>
+            <a:schemeClr val="lt1">
+              <a:hueOff val="0"/>
+              <a:satOff val="0"/>
+              <a:lumOff val="0"/>
+              <a:alphaOff val="0"/>
+            </a:schemeClr>
+          </a:solidFill>
           <a:prstDash val="solid"/>
         </a:ln>
         <a:effectLst/>
@@ -7490,47 +7080,15 @@
           <a:schemeClr val="lt1"/>
         </a:fontRef>
       </dsp:style>
-    </dsp:sp>
-    <dsp:sp modelId="{734AFF22-091E-4826-8D11-A08D4D668D97}">
-      <dsp:nvSpPr>
-        <dsp:cNvPr id="0" name=""/>
-        <dsp:cNvSpPr/>
-      </dsp:nvSpPr>
-      <dsp:spPr>
-        <a:xfrm>
-          <a:off x="1330115" y="450978"/>
-          <a:ext cx="2546008" cy="1080124"/>
-        </a:xfrm>
-        <a:prstGeom prst="rect">
-          <a:avLst/>
-        </a:prstGeom>
-        <a:noFill/>
-        <a:ln>
-          <a:noFill/>
-        </a:ln>
-        <a:effectLst/>
-      </dsp:spPr>
-      <dsp:style>
-        <a:lnRef idx="0">
-          <a:scrgbClr r="0" g="0" b="0"/>
-        </a:lnRef>
-        <a:fillRef idx="0">
-          <a:scrgbClr r="0" g="0" b="0"/>
-        </a:fillRef>
-        <a:effectRef idx="0">
-          <a:scrgbClr r="0" g="0" b="0"/>
-        </a:effectRef>
-        <a:fontRef idx="minor"/>
-      </dsp:style>
       <dsp:txBody>
-        <a:bodyPr spcFirstLastPara="0" vert="horz" wrap="square" lIns="0" tIns="0" rIns="0" bIns="0" numCol="1" spcCol="1270" anchor="ctr" anchorCtr="0">
+        <a:bodyPr spcFirstLastPara="0" vert="horz" wrap="square" lIns="125730" tIns="125730" rIns="125730" bIns="125730" numCol="1" spcCol="1270" anchor="ctr" anchorCtr="0">
           <a:noAutofit/>
         </a:bodyPr>
         <a:lstStyle/>
         <a:p>
-          <a:pPr marL="0" lvl="0" indent="0" algn="l" defTabSz="800100">
+          <a:pPr marL="0" lvl="0" indent="0" algn="l" defTabSz="1466850">
             <a:lnSpc>
-              <a:spcPct val="100000"/>
+              <a:spcPct val="90000"/>
             </a:lnSpc>
             <a:spcBef>
               <a:spcPct val="0"/>
@@ -7541,86 +7099,48 @@
             <a:buNone/>
           </a:pPr>
           <a:r>
-            <a:rPr lang="en-US" sz="1800" kern="1200"/>
+            <a:rPr lang="en-US" sz="3300" kern="1200"/>
             <a:t>Figma — Design Evaluation and Evolution</a:t>
           </a:r>
-          <a:endParaRPr lang="en-US" sz="1800" kern="1200" dirty="0"/>
         </a:p>
       </dsp:txBody>
       <dsp:txXfrm>
-        <a:off x="1330115" y="450978"/>
-        <a:ext cx="2546008" cy="1080124"/>
+        <a:off x="36841" y="36841"/>
+        <a:ext cx="5609181" cy="1184159"/>
       </dsp:txXfrm>
     </dsp:sp>
-    <dsp:sp modelId="{4F7CCBC8-B0ED-49EA-9F3D-6D95330A5B30}">
+    <dsp:sp modelId="{4EF9F24F-C4B5-4B6A-88EB-A363873A0AD6}">
       <dsp:nvSpPr>
         <dsp:cNvPr id="0" name=""/>
         <dsp:cNvSpPr/>
       </dsp:nvSpPr>
       <dsp:spPr>
         <a:xfrm>
-          <a:off x="4319746" y="450978"/>
-          <a:ext cx="1080124" cy="1080124"/>
+          <a:off x="614690" y="1467481"/>
+          <a:ext cx="6966490" cy="1257841"/>
         </a:xfrm>
-        <a:prstGeom prst="ellipse">
-          <a:avLst/>
+        <a:prstGeom prst="roundRect">
+          <a:avLst>
+            <a:gd name="adj" fmla="val 10000"/>
+          </a:avLst>
         </a:prstGeom>
         <a:solidFill>
-          <a:schemeClr val="accent3">
-            <a:hueOff val="0"/>
-            <a:satOff val="0"/>
-            <a:lumOff val="0"/>
+          <a:schemeClr val="accent2">
+            <a:hueOff val="2340759"/>
+            <a:satOff val="-2919"/>
+            <a:lumOff val="686"/>
             <a:alphaOff val="0"/>
           </a:schemeClr>
         </a:solidFill>
-        <a:ln>
-          <a:noFill/>
-        </a:ln>
-        <a:effectLst/>
-      </dsp:spPr>
-      <dsp:style>
-        <a:lnRef idx="0">
-          <a:scrgbClr r="0" g="0" b="0"/>
-        </a:lnRef>
-        <a:fillRef idx="1">
-          <a:scrgbClr r="0" g="0" b="0"/>
-        </a:fillRef>
-        <a:effectRef idx="0">
-          <a:scrgbClr r="0" g="0" b="0"/>
-        </a:effectRef>
-        <a:fontRef idx="minor"/>
-      </dsp:style>
-    </dsp:sp>
-    <dsp:sp modelId="{4FBF2E08-9E4D-407B-A310-244E57BBFCD4}">
-      <dsp:nvSpPr>
-        <dsp:cNvPr id="0" name=""/>
-        <dsp:cNvSpPr/>
-      </dsp:nvSpPr>
-      <dsp:spPr>
-        <a:xfrm>
-          <a:off x="4546573" y="677804"/>
-          <a:ext cx="626472" cy="626472"/>
-        </a:xfrm>
-        <a:prstGeom prst="rect">
-          <a:avLst/>
-        </a:prstGeom>
-        <a:blipFill>
-          <a:blip xmlns:r="http://schemas.openxmlformats.org/officeDocument/2006/relationships" r:embed="rId3">
-            <a:extLst>
-              <a:ext uri="{28A0092B-C50C-407E-A947-70E740481C1C}">
-                <a14:useLocalDpi xmlns:a14="http://schemas.microsoft.com/office/drawing/2010/main" val="0"/>
-              </a:ext>
-              <a:ext uri="{96DAC541-7B7A-43D3-8B79-37D633B846F1}">
-                <asvg:svgBlip xmlns:asvg="http://schemas.microsoft.com/office/drawing/2016/SVG/main" r:embed="rId4"/>
-              </a:ext>
-            </a:extLst>
-          </a:blip>
-          <a:stretch>
-            <a:fillRect/>
-          </a:stretch>
-        </a:blipFill>
         <a:ln w="25400" cap="flat" cmpd="sng" algn="ctr">
-          <a:noFill/>
+          <a:solidFill>
+            <a:schemeClr val="lt1">
+              <a:hueOff val="0"/>
+              <a:satOff val="0"/>
+              <a:lumOff val="0"/>
+              <a:alphaOff val="0"/>
+            </a:schemeClr>
+          </a:solidFill>
           <a:prstDash val="solid"/>
         </a:ln>
         <a:effectLst/>
@@ -7639,47 +7159,15 @@
           <a:schemeClr val="lt1"/>
         </a:fontRef>
       </dsp:style>
-    </dsp:sp>
-    <dsp:sp modelId="{D6C27012-16E7-4AEE-9638-F2B9EB8E9D23}">
-      <dsp:nvSpPr>
-        <dsp:cNvPr id="0" name=""/>
-        <dsp:cNvSpPr/>
-      </dsp:nvSpPr>
-      <dsp:spPr>
-        <a:xfrm>
-          <a:off x="5631327" y="450978"/>
-          <a:ext cx="2546008" cy="1080124"/>
-        </a:xfrm>
-        <a:prstGeom prst="rect">
-          <a:avLst/>
-        </a:prstGeom>
-        <a:noFill/>
-        <a:ln>
-          <a:noFill/>
-        </a:ln>
-        <a:effectLst/>
-      </dsp:spPr>
-      <dsp:style>
-        <a:lnRef idx="0">
-          <a:scrgbClr r="0" g="0" b="0"/>
-        </a:lnRef>
-        <a:fillRef idx="0">
-          <a:scrgbClr r="0" g="0" b="0"/>
-        </a:fillRef>
-        <a:effectRef idx="0">
-          <a:scrgbClr r="0" g="0" b="0"/>
-        </a:effectRef>
-        <a:fontRef idx="minor"/>
-      </dsp:style>
       <dsp:txBody>
-        <a:bodyPr spcFirstLastPara="0" vert="horz" wrap="square" lIns="0" tIns="0" rIns="0" bIns="0" numCol="1" spcCol="1270" anchor="ctr" anchorCtr="0">
+        <a:bodyPr spcFirstLastPara="0" vert="horz" wrap="square" lIns="125730" tIns="125730" rIns="125730" bIns="125730" numCol="1" spcCol="1270" anchor="ctr" anchorCtr="0">
           <a:noAutofit/>
         </a:bodyPr>
         <a:lstStyle/>
         <a:p>
-          <a:pPr marL="0" lvl="0" indent="0" algn="l" defTabSz="800100">
+          <a:pPr marL="0" lvl="0" indent="0" algn="l" defTabSz="1466850">
             <a:lnSpc>
-              <a:spcPct val="100000"/>
+              <a:spcPct val="90000"/>
             </a:lnSpc>
             <a:spcBef>
               <a:spcPct val="0"/>
@@ -7690,85 +7178,48 @@
             <a:buNone/>
           </a:pPr>
           <a:r>
-            <a:rPr lang="en-US" sz="1800" kern="1200" dirty="0"/>
+            <a:rPr lang="en-US" sz="3300" kern="1200"/>
             <a:t>LLM Research</a:t>
           </a:r>
         </a:p>
       </dsp:txBody>
       <dsp:txXfrm>
-        <a:off x="5631327" y="450978"/>
-        <a:ext cx="2546008" cy="1080124"/>
+        <a:off x="651531" y="1504322"/>
+        <a:ext cx="5460521" cy="1184159"/>
       </dsp:txXfrm>
     </dsp:sp>
-    <dsp:sp modelId="{66639A5C-196D-4C2E-BD20-5A1BB7C54C2D}">
+    <dsp:sp modelId="{2A1064DC-ED59-474C-A69B-227ED46BC78E}">
       <dsp:nvSpPr>
         <dsp:cNvPr id="0" name=""/>
         <dsp:cNvSpPr/>
       </dsp:nvSpPr>
       <dsp:spPr>
         <a:xfrm>
-          <a:off x="18535" y="2158301"/>
-          <a:ext cx="1080124" cy="1080124"/>
+          <a:off x="1229380" y="2934963"/>
+          <a:ext cx="6966490" cy="1257841"/>
         </a:xfrm>
-        <a:prstGeom prst="ellipse">
-          <a:avLst/>
+        <a:prstGeom prst="roundRect">
+          <a:avLst>
+            <a:gd name="adj" fmla="val 10000"/>
+          </a:avLst>
         </a:prstGeom>
         <a:solidFill>
-          <a:schemeClr val="accent4">
-            <a:hueOff val="0"/>
-            <a:satOff val="0"/>
-            <a:lumOff val="0"/>
+          <a:schemeClr val="accent2">
+            <a:hueOff val="4681519"/>
+            <a:satOff val="-5839"/>
+            <a:lumOff val="1373"/>
             <a:alphaOff val="0"/>
           </a:schemeClr>
         </a:solidFill>
-        <a:ln>
-          <a:noFill/>
-        </a:ln>
-        <a:effectLst/>
-      </dsp:spPr>
-      <dsp:style>
-        <a:lnRef idx="0">
-          <a:scrgbClr r="0" g="0" b="0"/>
-        </a:lnRef>
-        <a:fillRef idx="1">
-          <a:scrgbClr r="0" g="0" b="0"/>
-        </a:fillRef>
-        <a:effectRef idx="0">
-          <a:scrgbClr r="0" g="0" b="0"/>
-        </a:effectRef>
-        <a:fontRef idx="minor"/>
-      </dsp:style>
-    </dsp:sp>
-    <dsp:sp modelId="{AC121446-9C5D-446F-818D-8FB186BEFF9A}">
-      <dsp:nvSpPr>
-        <dsp:cNvPr id="0" name=""/>
-        <dsp:cNvSpPr/>
-      </dsp:nvSpPr>
-      <dsp:spPr>
-        <a:xfrm>
-          <a:off x="245361" y="2385128"/>
-          <a:ext cx="626472" cy="626472"/>
-        </a:xfrm>
-        <a:prstGeom prst="rect">
-          <a:avLst/>
-        </a:prstGeom>
-        <a:blipFill>
-          <a:blip xmlns:r="http://schemas.openxmlformats.org/officeDocument/2006/relationships" r:embed="rId5">
-            <a:extLst>
-              <a:ext uri="{28A0092B-C50C-407E-A947-70E740481C1C}">
-                <a14:useLocalDpi xmlns:a14="http://schemas.microsoft.com/office/drawing/2010/main" val="0"/>
-              </a:ext>
-              <a:ext uri="{96DAC541-7B7A-43D3-8B79-37D633B846F1}">
-                <asvg:svgBlip xmlns:asvg="http://schemas.microsoft.com/office/drawing/2016/SVG/main" r:embed="rId6"/>
-              </a:ext>
-            </a:extLst>
-          </a:blip>
-          <a:stretch>
-            <a:fillRect/>
-          </a:stretch>
-        </a:blipFill>
         <a:ln w="25400" cap="flat" cmpd="sng" algn="ctr">
-          <a:noFill/>
+          <a:solidFill>
+            <a:schemeClr val="lt1">
+              <a:hueOff val="0"/>
+              <a:satOff val="0"/>
+              <a:lumOff val="0"/>
+              <a:alphaOff val="0"/>
+            </a:schemeClr>
+          </a:solidFill>
           <a:prstDash val="solid"/>
         </a:ln>
         <a:effectLst/>
@@ -7787,47 +7238,15 @@
           <a:schemeClr val="lt1"/>
         </a:fontRef>
       </dsp:style>
-    </dsp:sp>
-    <dsp:sp modelId="{B578413A-FD81-49D3-B259-19312FAF6D8A}">
-      <dsp:nvSpPr>
-        <dsp:cNvPr id="0" name=""/>
-        <dsp:cNvSpPr/>
-      </dsp:nvSpPr>
-      <dsp:spPr>
-        <a:xfrm>
-          <a:off x="1330115" y="2158301"/>
-          <a:ext cx="2546008" cy="1080124"/>
-        </a:xfrm>
-        <a:prstGeom prst="rect">
-          <a:avLst/>
-        </a:prstGeom>
-        <a:noFill/>
-        <a:ln>
-          <a:noFill/>
-        </a:ln>
-        <a:effectLst/>
-      </dsp:spPr>
-      <dsp:style>
-        <a:lnRef idx="0">
-          <a:scrgbClr r="0" g="0" b="0"/>
-        </a:lnRef>
-        <a:fillRef idx="0">
-          <a:scrgbClr r="0" g="0" b="0"/>
-        </a:fillRef>
-        <a:effectRef idx="0">
-          <a:scrgbClr r="0" g="0" b="0"/>
-        </a:effectRef>
-        <a:fontRef idx="minor"/>
-      </dsp:style>
       <dsp:txBody>
-        <a:bodyPr spcFirstLastPara="0" vert="horz" wrap="square" lIns="0" tIns="0" rIns="0" bIns="0" numCol="1" spcCol="1270" anchor="ctr" anchorCtr="0">
+        <a:bodyPr spcFirstLastPara="0" vert="horz" wrap="square" lIns="125730" tIns="125730" rIns="125730" bIns="125730" numCol="1" spcCol="1270" anchor="ctr" anchorCtr="0">
           <a:noAutofit/>
         </a:bodyPr>
         <a:lstStyle/>
         <a:p>
-          <a:pPr marL="0" lvl="0" indent="0" algn="l" defTabSz="800100">
+          <a:pPr marL="0" lvl="0" indent="0" algn="l" defTabSz="1466850">
             <a:lnSpc>
-              <a:spcPct val="100000"/>
+              <a:spcPct val="90000"/>
             </a:lnSpc>
             <a:spcBef>
               <a:spcPct val="0"/>
@@ -7838,85 +7257,53 @@
             <a:buNone/>
           </a:pPr>
           <a:r>
-            <a:rPr lang="en-US" sz="1800" kern="1200" dirty="0"/>
-            <a:t>Database Setup — Prisma/Postgres/pgVector</a:t>
+            <a:rPr lang="en-US" sz="3300" kern="1200"/>
+            <a:t>Weekly Retrospective</a:t>
           </a:r>
         </a:p>
       </dsp:txBody>
       <dsp:txXfrm>
-        <a:off x="1330115" y="2158301"/>
-        <a:ext cx="2546008" cy="1080124"/>
+        <a:off x="1266221" y="2971804"/>
+        <a:ext cx="5460521" cy="1184159"/>
       </dsp:txXfrm>
     </dsp:sp>
-    <dsp:sp modelId="{A8D75A76-07A5-4D34-85C4-01BE597479DA}">
+    <dsp:sp modelId="{5E0FE94D-8923-4F31-93D7-D71DBAFE2D1F}">
       <dsp:nvSpPr>
         <dsp:cNvPr id="0" name=""/>
         <dsp:cNvSpPr/>
       </dsp:nvSpPr>
       <dsp:spPr>
         <a:xfrm>
-          <a:off x="4319746" y="2158301"/>
-          <a:ext cx="1080124" cy="1080124"/>
+          <a:off x="6148893" y="953863"/>
+          <a:ext cx="817596" cy="817596"/>
         </a:xfrm>
-        <a:prstGeom prst="ellipse">
-          <a:avLst/>
+        <a:prstGeom prst="downArrow">
+          <a:avLst>
+            <a:gd name="adj1" fmla="val 55000"/>
+            <a:gd name="adj2" fmla="val 45000"/>
+          </a:avLst>
         </a:prstGeom>
         <a:solidFill>
-          <a:schemeClr val="accent5">
+          <a:schemeClr val="accent2">
+            <a:tint val="40000"/>
+            <a:alpha val="90000"/>
             <a:hueOff val="0"/>
             <a:satOff val="0"/>
             <a:lumOff val="0"/>
             <a:alphaOff val="0"/>
           </a:schemeClr>
         </a:solidFill>
-        <a:ln>
-          <a:noFill/>
-        </a:ln>
-        <a:effectLst/>
-      </dsp:spPr>
-      <dsp:style>
-        <a:lnRef idx="0">
-          <a:scrgbClr r="0" g="0" b="0"/>
-        </a:lnRef>
-        <a:fillRef idx="1">
-          <a:scrgbClr r="0" g="0" b="0"/>
-        </a:fillRef>
-        <a:effectRef idx="0">
-          <a:scrgbClr r="0" g="0" b="0"/>
-        </a:effectRef>
-        <a:fontRef idx="minor"/>
-      </dsp:style>
-    </dsp:sp>
-    <dsp:sp modelId="{76AD349D-C22B-4CE4-9819-52F09FD44B3A}">
-      <dsp:nvSpPr>
-        <dsp:cNvPr id="0" name=""/>
-        <dsp:cNvSpPr/>
-      </dsp:nvSpPr>
-      <dsp:spPr>
-        <a:xfrm>
-          <a:off x="4546573" y="2385128"/>
-          <a:ext cx="626472" cy="626472"/>
-        </a:xfrm>
-        <a:prstGeom prst="rect">
-          <a:avLst/>
-        </a:prstGeom>
-        <a:blipFill>
-          <a:blip xmlns:r="http://schemas.openxmlformats.org/officeDocument/2006/relationships" r:embed="rId7">
-            <a:extLst>
-              <a:ext uri="{28A0092B-C50C-407E-A947-70E740481C1C}">
-                <a14:useLocalDpi xmlns:a14="http://schemas.microsoft.com/office/drawing/2010/main" val="0"/>
-              </a:ext>
-              <a:ext uri="{96DAC541-7B7A-43D3-8B79-37D633B846F1}">
-                <asvg:svgBlip xmlns:asvg="http://schemas.microsoft.com/office/drawing/2016/SVG/main" r:embed="rId8"/>
-              </a:ext>
-            </a:extLst>
-          </a:blip>
-          <a:stretch>
-            <a:fillRect/>
-          </a:stretch>
-        </a:blipFill>
         <a:ln w="25400" cap="flat" cmpd="sng" algn="ctr">
-          <a:noFill/>
+          <a:solidFill>
+            <a:schemeClr val="accent2">
+              <a:tint val="40000"/>
+              <a:alpha val="90000"/>
+              <a:hueOff val="0"/>
+              <a:satOff val="0"/>
+              <a:lumOff val="0"/>
+              <a:alphaOff val="0"/>
+            </a:schemeClr>
+          </a:solidFill>
           <a:prstDash val="solid"/>
         </a:ln>
         <a:effectLst/>
@@ -7931,51 +7318,17 @@
         <a:effectRef idx="0">
           <a:scrgbClr r="0" g="0" b="0"/>
         </a:effectRef>
-        <a:fontRef idx="minor">
-          <a:schemeClr val="lt1"/>
-        </a:fontRef>
-      </dsp:style>
-    </dsp:sp>
-    <dsp:sp modelId="{2F7D5AC7-FAFA-4CCA-A49A-C2CA0D812C7B}">
-      <dsp:nvSpPr>
-        <dsp:cNvPr id="0" name=""/>
-        <dsp:cNvSpPr/>
-      </dsp:nvSpPr>
-      <dsp:spPr>
-        <a:xfrm>
-          <a:off x="5631327" y="2158301"/>
-          <a:ext cx="2546008" cy="1080124"/>
-        </a:xfrm>
-        <a:prstGeom prst="rect">
-          <a:avLst/>
-        </a:prstGeom>
-        <a:noFill/>
-        <a:ln>
-          <a:noFill/>
-        </a:ln>
-        <a:effectLst/>
-      </dsp:spPr>
-      <dsp:style>
-        <a:lnRef idx="0">
-          <a:scrgbClr r="0" g="0" b="0"/>
-        </a:lnRef>
-        <a:fillRef idx="0">
-          <a:scrgbClr r="0" g="0" b="0"/>
-        </a:fillRef>
-        <a:effectRef idx="0">
-          <a:scrgbClr r="0" g="0" b="0"/>
-        </a:effectRef>
         <a:fontRef idx="minor"/>
       </dsp:style>
       <dsp:txBody>
-        <a:bodyPr spcFirstLastPara="0" vert="horz" wrap="square" lIns="0" tIns="0" rIns="0" bIns="0" numCol="1" spcCol="1270" anchor="ctr" anchorCtr="0">
+        <a:bodyPr spcFirstLastPara="0" vert="horz" wrap="square" lIns="45720" tIns="45720" rIns="45720" bIns="45720" numCol="1" spcCol="1270" anchor="ctr" anchorCtr="0">
           <a:noAutofit/>
         </a:bodyPr>
         <a:lstStyle/>
         <a:p>
-          <a:pPr marL="0" lvl="0" indent="0" algn="l" defTabSz="800100">
+          <a:pPr marL="0" lvl="0" indent="0" algn="ctr" defTabSz="1600200">
             <a:lnSpc>
-              <a:spcPct val="100000"/>
+              <a:spcPct val="90000"/>
             </a:lnSpc>
             <a:spcBef>
               <a:spcPct val="0"/>
@@ -7985,15 +7338,91 @@
             </a:spcAft>
             <a:buNone/>
           </a:pPr>
-          <a:r>
-            <a:rPr lang="en-US" sz="1800" kern="1200" dirty="0"/>
-            <a:t>Weekly Retrospective</a:t>
-          </a:r>
+          <a:endParaRPr lang="en-US" sz="3600" kern="1200"/>
         </a:p>
       </dsp:txBody>
       <dsp:txXfrm>
-        <a:off x="5631327" y="2158301"/>
-        <a:ext cx="2546008" cy="1080124"/>
+        <a:off x="6332852" y="953863"/>
+        <a:ext cx="449678" cy="615241"/>
+      </dsp:txXfrm>
+    </dsp:sp>
+    <dsp:sp modelId="{29930797-768A-4676-A15F-D20780479AFE}">
+      <dsp:nvSpPr>
+        <dsp:cNvPr id="0" name=""/>
+        <dsp:cNvSpPr/>
+      </dsp:nvSpPr>
+      <dsp:spPr>
+        <a:xfrm>
+          <a:off x="6763583" y="2412959"/>
+          <a:ext cx="817596" cy="817596"/>
+        </a:xfrm>
+        <a:prstGeom prst="downArrow">
+          <a:avLst>
+            <a:gd name="adj1" fmla="val 55000"/>
+            <a:gd name="adj2" fmla="val 45000"/>
+          </a:avLst>
+        </a:prstGeom>
+        <a:solidFill>
+          <a:schemeClr val="accent2">
+            <a:tint val="40000"/>
+            <a:alpha val="90000"/>
+            <a:hueOff val="5025821"/>
+            <a:satOff val="-4378"/>
+            <a:lumOff val="-6"/>
+            <a:alphaOff val="0"/>
+          </a:schemeClr>
+        </a:solidFill>
+        <a:ln w="25400" cap="flat" cmpd="sng" algn="ctr">
+          <a:solidFill>
+            <a:schemeClr val="accent2">
+              <a:tint val="40000"/>
+              <a:alpha val="90000"/>
+              <a:hueOff val="5025821"/>
+              <a:satOff val="-4378"/>
+              <a:lumOff val="-6"/>
+              <a:alphaOff val="0"/>
+            </a:schemeClr>
+          </a:solidFill>
+          <a:prstDash val="solid"/>
+        </a:ln>
+        <a:effectLst/>
+      </dsp:spPr>
+      <dsp:style>
+        <a:lnRef idx="2">
+          <a:scrgbClr r="0" g="0" b="0"/>
+        </a:lnRef>
+        <a:fillRef idx="1">
+          <a:scrgbClr r="0" g="0" b="0"/>
+        </a:fillRef>
+        <a:effectRef idx="0">
+          <a:scrgbClr r="0" g="0" b="0"/>
+        </a:effectRef>
+        <a:fontRef idx="minor"/>
+      </dsp:style>
+      <dsp:txBody>
+        <a:bodyPr spcFirstLastPara="0" vert="horz" wrap="square" lIns="45720" tIns="45720" rIns="45720" bIns="45720" numCol="1" spcCol="1270" anchor="ctr" anchorCtr="0">
+          <a:noAutofit/>
+        </a:bodyPr>
+        <a:lstStyle/>
+        <a:p>
+          <a:pPr marL="0" lvl="0" indent="0" algn="ctr" defTabSz="1600200">
+            <a:lnSpc>
+              <a:spcPct val="90000"/>
+            </a:lnSpc>
+            <a:spcBef>
+              <a:spcPct val="0"/>
+            </a:spcBef>
+            <a:spcAft>
+              <a:spcPct val="35000"/>
+            </a:spcAft>
+            <a:buNone/>
+          </a:pPr>
+          <a:endParaRPr lang="en-US" sz="3600" kern="1200"/>
+        </a:p>
+      </dsp:txBody>
+      <dsp:txXfrm>
+        <a:off x="6947542" y="2412959"/>
+        <a:ext cx="449678" cy="615241"/>
       </dsp:txXfrm>
     </dsp:sp>
   </dsp:spTree>
@@ -11257,214 +10686,1228 @@
 </file>
 
 <file path=ppt/diagrams/layout1.xml><?xml version="1.0" encoding="utf-8"?>
-<dgm:layoutDef xmlns:dgm="http://schemas.openxmlformats.org/drawingml/2006/diagram" xmlns:a="http://schemas.openxmlformats.org/drawingml/2006/main" uniqueId="urn:microsoft.com/office/officeart/2018/2/layout/IconCircleList">
-  <dgm:title val="Icon Circle List"/>
-  <dgm:desc val="Use to show non-sequential or grouped chunks of information accompanied by related visuals. Circular shapes can hold an icon or small picture and corresponding text box shows Level 1 text. Works best for icons or small pictures with medium-length descriptions."/>
+<dgm:layoutDef xmlns:dgm="http://schemas.openxmlformats.org/drawingml/2006/diagram" xmlns:a="http://schemas.openxmlformats.org/drawingml/2006/main" uniqueId="urn:microsoft.com/office/officeart/2005/8/layout/vProcess5">
+  <dgm:title val=""/>
+  <dgm:desc val=""/>
   <dgm:catLst>
-    <dgm:cat type="icon" pri="500"/>
+    <dgm:cat type="process" pri="14000"/>
   </dgm:catLst>
-  <dgm:sampData useDef="1">
+  <dgm:sampData>
     <dgm:dataModel>
-      <dgm:ptLst/>
+      <dgm:ptLst>
+        <dgm:pt modelId="0" type="doc"/>
+        <dgm:pt modelId="1">
+          <dgm:prSet phldr="1"/>
+        </dgm:pt>
+        <dgm:pt modelId="2">
+          <dgm:prSet phldr="1"/>
+        </dgm:pt>
+        <dgm:pt modelId="3">
+          <dgm:prSet phldr="1"/>
+        </dgm:pt>
+      </dgm:ptLst>
+      <dgm:cxnLst>
+        <dgm:cxn modelId="5" srcId="0" destId="1" srcOrd="0" destOrd="0"/>
+        <dgm:cxn modelId="6" srcId="0" destId="2" srcOrd="1" destOrd="0"/>
+        <dgm:cxn modelId="7" srcId="0" destId="3" srcOrd="2" destOrd="0"/>
+      </dgm:cxnLst>
       <dgm:bg/>
       <dgm:whole/>
     </dgm:dataModel>
   </dgm:sampData>
-  <dgm:styleData useDef="1">
+  <dgm:styleData>
     <dgm:dataModel>
-      <dgm:ptLst/>
+      <dgm:ptLst>
+        <dgm:pt modelId="0" type="doc"/>
+        <dgm:pt modelId="1"/>
+        <dgm:pt modelId="2"/>
+      </dgm:ptLst>
+      <dgm:cxnLst>
+        <dgm:cxn modelId="3" srcId="0" destId="1" srcOrd="0" destOrd="0"/>
+        <dgm:cxn modelId="4" srcId="0" destId="2" srcOrd="1" destOrd="0"/>
+      </dgm:cxnLst>
       <dgm:bg/>
       <dgm:whole/>
     </dgm:dataModel>
   </dgm:styleData>
-  <dgm:clrData useDef="1">
+  <dgm:clrData>
     <dgm:dataModel>
-      <dgm:ptLst/>
+      <dgm:ptLst>
+        <dgm:pt modelId="0" type="doc"/>
+        <dgm:pt modelId="1"/>
+        <dgm:pt modelId="2"/>
+        <dgm:pt modelId="3"/>
+        <dgm:pt modelId="4"/>
+      </dgm:ptLst>
+      <dgm:cxnLst>
+        <dgm:cxn modelId="6" srcId="0" destId="1" srcOrd="0" destOrd="0"/>
+        <dgm:cxn modelId="7" srcId="0" destId="2" srcOrd="1" destOrd="0"/>
+        <dgm:cxn modelId="8" srcId="0" destId="3" srcOrd="2" destOrd="0"/>
+        <dgm:cxn modelId="9" srcId="0" destId="4" srcOrd="3" destOrd="0"/>
+      </dgm:cxnLst>
       <dgm:bg/>
       <dgm:whole/>
     </dgm:dataModel>
   </dgm:clrData>
-  <dgm:layoutNode name="root">
+  <dgm:layoutNode name="outerComposite">
     <dgm:varLst>
+      <dgm:chMax val="5"/>
       <dgm:dir/>
       <dgm:resizeHandles val="exact"/>
     </dgm:varLst>
-    <dgm:alg type="sp"/>
+    <dgm:alg type="composite"/>
     <dgm:shape xmlns:r="http://schemas.openxmlformats.org/officeDocument/2006/relationships" r:blip="">
       <dgm:adjLst/>
     </dgm:shape>
     <dgm:presOf/>
     <dgm:choose name="Name0">
-      <dgm:if name="Name1" axis="ch" ptType="node" func="cnt" op="lte" val="3">
+      <dgm:if name="Name1" func="var" arg="dir" op="equ" val="norm">
         <dgm:constrLst>
-          <dgm:constr type="w" for="ch" forName="container" refType="w"/>
-          <dgm:constr type="h" for="ch" forName="container" refType="h" fact="0.4"/>
+          <dgm:constr type="primFontSz" for="ch" ptType="node" op="equ" val="65"/>
+          <dgm:constr type="w" for="ch" forName="dummyMaxCanvas" refType="w"/>
+          <dgm:constr type="h" for="ch" forName="dummyMaxCanvas" refType="h"/>
+          <dgm:constr type="w" for="ch" forName="OneNode_1" refType="w"/>
+          <dgm:constr type="h" for="ch" forName="OneNode_1" refType="h" fact="0.5"/>
+          <dgm:constr type="ctrY" for="ch" forName="OneNode_1" refType="h" fact="0.5"/>
+          <dgm:constr type="w" for="ch" forName="TwoNodes_1" refType="w" fact="0.85"/>
+          <dgm:constr type="h" for="ch" forName="TwoNodes_1" refType="h" fact="0.45"/>
+          <dgm:constr type="t" for="ch" forName="TwoNodes_1"/>
+          <dgm:constr type="l" for="ch" forName="TwoNodes_1"/>
+          <dgm:constr type="w" for="ch" forName="TwoNodes_2" refType="w" fact="0.85"/>
+          <dgm:constr type="h" for="ch" forName="TwoNodes_2" refType="h" fact="0.45"/>
+          <dgm:constr type="b" for="ch" forName="TwoNodes_2" refType="h"/>
+          <dgm:constr type="r" for="ch" forName="TwoNodes_2" refType="w"/>
+          <dgm:constr type="w" for="ch" forName="TwoConn_1-2" refType="h" refFor="ch" refForName="TwoNodes_1" fact="0.65"/>
+          <dgm:constr type="h" for="ch" forName="TwoConn_1-2" refType="h" refFor="ch" refForName="TwoNodes_1" fact="0.65"/>
+          <dgm:constr type="ctrY" for="ch" forName="TwoConn_1-2" refType="h" fact="0.5"/>
+          <dgm:constr type="r" for="ch" forName="TwoConn_1-2" refType="r" refFor="ch" refForName="TwoNodes_1"/>
+          <dgm:constr type="r" for="ch" forName="TwoNodes_1_text" refType="l" refFor="ch" refForName="TwoConn_1-2"/>
+          <dgm:constr type="rOff" for="ch" forName="TwoNodes_1_text" refType="w" refFor="ch" refForName="TwoConn_1-2" fact="-0.5"/>
+          <dgm:constr type="t" for="ch" forName="TwoNodes_1_text" refType="t" refFor="ch" refForName="TwoNodes_1"/>
+          <dgm:constr type="b" for="ch" forName="TwoNodes_1_text" refType="b" refFor="ch" refForName="TwoNodes_1"/>
+          <dgm:constr type="l" for="ch" forName="TwoNodes_1_text" refType="l" refFor="ch" refForName="TwoNodes_1"/>
+          <dgm:constr type="r" for="ch" forName="TwoNodes_2_text" refType="l" refFor="ch" refForName="TwoConn_1-2"/>
+          <dgm:constr type="t" for="ch" forName="TwoNodes_2_text" refType="t" refFor="ch" refForName="TwoNodes_2"/>
+          <dgm:constr type="b" for="ch" forName="TwoNodes_2_text" refType="b" refFor="ch" refForName="TwoNodes_2"/>
+          <dgm:constr type="l" for="ch" forName="TwoNodes_2_text" refType="l" refFor="ch" refForName="TwoNodes_2"/>
+          <dgm:constr type="w" for="ch" forName="ThreeNodes_1" refType="w" fact="0.85"/>
+          <dgm:constr type="h" for="ch" forName="ThreeNodes_1" refType="h" fact="0.3"/>
+          <dgm:constr type="t" for="ch" forName="ThreeNodes_1"/>
+          <dgm:constr type="l" for="ch" forName="ThreeNodes_1"/>
+          <dgm:constr type="w" for="ch" forName="ThreeNodes_2" refType="w" fact="0.85"/>
+          <dgm:constr type="h" for="ch" forName="ThreeNodes_2" refType="h" fact="0.3"/>
+          <dgm:constr type="ctrY" for="ch" forName="ThreeNodes_2" refType="h" fact="0.5"/>
+          <dgm:constr type="ctrX" for="ch" forName="ThreeNodes_2" refType="w" fact="0.5"/>
+          <dgm:constr type="w" for="ch" forName="ThreeNodes_3" refType="w" fact="0.85"/>
+          <dgm:constr type="h" for="ch" forName="ThreeNodes_3" refType="h" fact="0.3"/>
+          <dgm:constr type="b" for="ch" forName="ThreeNodes_3" refType="h"/>
+          <dgm:constr type="r" for="ch" forName="ThreeNodes_3" refType="w"/>
+          <dgm:constr type="w" for="ch" forName="ThreeConn_1-2" refType="h" refFor="ch" refForName="ThreeNodes_1" fact="0.65"/>
+          <dgm:constr type="h" for="ch" forName="ThreeConn_1-2" refType="h" refFor="ch" refForName="ThreeNodes_1" fact="0.65"/>
+          <dgm:constr type="ctrY" for="ch" forName="ThreeConn_1-2" refType="h" fact="0.325"/>
+          <dgm:constr type="r" for="ch" forName="ThreeConn_1-2" refType="r" refFor="ch" refForName="ThreeNodes_1"/>
+          <dgm:constr type="w" for="ch" forName="ThreeConn_2-3" refType="h" refFor="ch" refForName="ThreeNodes_2" fact="0.65"/>
+          <dgm:constr type="h" for="ch" forName="ThreeConn_2-3" refType="h" refFor="ch" refForName="ThreeNodes_2" fact="0.65"/>
+          <dgm:constr type="ctrY" for="ch" forName="ThreeConn_2-3" refType="h" fact="0.673"/>
+          <dgm:constr type="r" for="ch" forName="ThreeConn_2-3" refType="r" refFor="ch" refForName="ThreeNodes_2"/>
+          <dgm:constr type="r" for="ch" forName="ThreeNodes_1_text" refType="l" refFor="ch" refForName="ThreeConn_1-2"/>
+          <dgm:constr type="rOff" for="ch" forName="ThreeNodes_1_text" refType="w" refFor="ch" refForName="ThreeConn_1-2" fact="-0.57"/>
+          <dgm:constr type="t" for="ch" forName="ThreeNodes_1_text" refType="t" refFor="ch" refForName="ThreeNodes_1"/>
+          <dgm:constr type="b" for="ch" forName="ThreeNodes_1_text" refType="b" refFor="ch" refForName="ThreeNodes_1"/>
+          <dgm:constr type="l" for="ch" forName="ThreeNodes_1_text" refType="l" refFor="ch" refForName="ThreeNodes_1"/>
+          <dgm:constr type="r" for="ch" forName="ThreeNodes_2_text" refType="l" refFor="ch" refForName="ThreeConn_1-2"/>
+          <dgm:constr type="t" for="ch" forName="ThreeNodes_2_text" refType="t" refFor="ch" refForName="ThreeNodes_2"/>
+          <dgm:constr type="b" for="ch" forName="ThreeNodes_2_text" refType="b" refFor="ch" refForName="ThreeNodes_2"/>
+          <dgm:constr type="l" for="ch" forName="ThreeNodes_2_text" refType="l" refFor="ch" refForName="ThreeNodes_2"/>
+          <dgm:constr type="r" for="ch" forName="ThreeNodes_3_text" refType="l" refFor="ch" refForName="ThreeConn_2-3"/>
+          <dgm:constr type="t" for="ch" forName="ThreeNodes_3_text" refType="t" refFor="ch" refForName="ThreeNodes_3"/>
+          <dgm:constr type="b" for="ch" forName="ThreeNodes_3_text" refType="b" refFor="ch" refForName="ThreeNodes_3"/>
+          <dgm:constr type="l" for="ch" forName="ThreeNodes_3_text" refType="l" refFor="ch" refForName="ThreeNodes_3"/>
+          <dgm:constr type="w" for="ch" forName="FourNodes_1" refType="w" fact="0.8"/>
+          <dgm:constr type="h" for="ch" forName="FourNodes_1" refType="h" fact="0.22"/>
+          <dgm:constr type="t" for="ch" forName="FourNodes_1"/>
+          <dgm:constr type="l" for="ch" forName="FourNodes_1"/>
+          <dgm:constr type="w" for="ch" forName="FourNodes_2" refType="w" fact="0.8"/>
+          <dgm:constr type="h" for="ch" forName="FourNodes_2" refType="h" fact="0.22"/>
+          <dgm:constr type="ctrY" for="ch" forName="FourNodes_2" refType="h" fact="0.37"/>
+          <dgm:constr type="ctrX" for="ch" forName="FourNodes_2" refType="w" fact="0.467"/>
+          <dgm:constr type="w" for="ch" forName="FourNodes_3" refType="w" fact="0.8"/>
+          <dgm:constr type="h" for="ch" forName="FourNodes_3" refType="h" fact="0.22"/>
+          <dgm:constr type="ctrY" for="ch" forName="FourNodes_3" refType="h" fact="0.63"/>
+          <dgm:constr type="ctrX" for="ch" forName="FourNodes_3" refType="w" fact="0.533"/>
+          <dgm:constr type="w" for="ch" forName="FourNodes_4" refType="w" fact="0.8"/>
+          <dgm:constr type="h" for="ch" forName="FourNodes_4" refType="h" fact="0.22"/>
+          <dgm:constr type="b" for="ch" forName="FourNodes_4" refType="h"/>
+          <dgm:constr type="r" for="ch" forName="FourNodes_4" refType="w"/>
+          <dgm:constr type="w" for="ch" forName="FourConn_1-2" refType="h" refFor="ch" refForName="FourNodes_1" fact="0.65"/>
+          <dgm:constr type="h" for="ch" forName="FourConn_1-2" refType="h" refFor="ch" refForName="FourNodes_1" fact="0.65"/>
+          <dgm:constr type="ctrY" for="ch" forName="FourConn_1-2" refType="h" fact="0.24"/>
+          <dgm:constr type="r" for="ch" forName="FourConn_1-2" refType="r" refFor="ch" refForName="FourNodes_1"/>
+          <dgm:constr type="w" for="ch" forName="FourConn_2-3" refType="h" refFor="ch" refForName="FourNodes_2" fact="0.65"/>
+          <dgm:constr type="h" for="ch" forName="FourConn_2-3" refType="h" refFor="ch" refForName="FourNodes_2" fact="0.65"/>
+          <dgm:constr type="ctrY" for="ch" forName="FourConn_2-3" refType="h" fact="0.5"/>
+          <dgm:constr type="r" for="ch" forName="FourConn_2-3" refType="r" refFor="ch" refForName="FourNodes_2"/>
+          <dgm:constr type="w" for="ch" forName="FourConn_3-4" refType="h" refFor="ch" refForName="FourNodes_3" fact="0.65"/>
+          <dgm:constr type="h" for="ch" forName="FourConn_3-4" refType="h" refFor="ch" refForName="FourNodes_3" fact="0.65"/>
+          <dgm:constr type="ctrY" for="ch" forName="FourConn_3-4" refType="h" fact="0.76"/>
+          <dgm:constr type="r" for="ch" forName="FourConn_3-4" refType="r" refFor="ch" refForName="FourNodes_3"/>
+          <dgm:constr type="r" for="ch" forName="FourNodes_1_text" refType="l" refFor="ch" refForName="FourConn_1-2"/>
+          <dgm:constr type="rOff" for="ch" forName="FourNodes_1_text" refType="w" refFor="ch" refForName="FourConn_1-2" fact="-0.7"/>
+          <dgm:constr type="t" for="ch" forName="FourNodes_1_text" refType="t" refFor="ch" refForName="FourNodes_1"/>
+          <dgm:constr type="b" for="ch" forName="FourNodes_1_text" refType="b" refFor="ch" refForName="FourNodes_1"/>
+          <dgm:constr type="l" for="ch" forName="FourNodes_1_text" refType="l" refFor="ch" refForName="FourNodes_1"/>
+          <dgm:constr type="r" for="ch" forName="FourNodes_2_text" refType="l" refFor="ch" refForName="FourConn_1-2"/>
+          <dgm:constr type="t" for="ch" forName="FourNodes_2_text" refType="t" refFor="ch" refForName="FourNodes_2"/>
+          <dgm:constr type="b" for="ch" forName="FourNodes_2_text" refType="b" refFor="ch" refForName="FourNodes_2"/>
+          <dgm:constr type="l" for="ch" forName="FourNodes_2_text" refType="l" refFor="ch" refForName="FourNodes_2"/>
+          <dgm:constr type="r" for="ch" forName="FourNodes_3_text" refType="l" refFor="ch" refForName="FourConn_2-3"/>
+          <dgm:constr type="t" for="ch" forName="FourNodes_3_text" refType="t" refFor="ch" refForName="FourNodes_3"/>
+          <dgm:constr type="b" for="ch" forName="FourNodes_3_text" refType="b" refFor="ch" refForName="FourNodes_3"/>
+          <dgm:constr type="l" for="ch" forName="FourNodes_3_text" refType="l" refFor="ch" refForName="FourNodes_3"/>
+          <dgm:constr type="r" for="ch" forName="FourNodes_4_text" refType="l" refFor="ch" refForName="FourConn_3-4"/>
+          <dgm:constr type="t" for="ch" forName="FourNodes_4_text" refType="t" refFor="ch" refForName="FourNodes_4"/>
+          <dgm:constr type="b" for="ch" forName="FourNodes_4_text" refType="b" refFor="ch" refForName="FourNodes_4"/>
+          <dgm:constr type="l" for="ch" forName="FourNodes_4_text" refType="l" refFor="ch" refForName="FourNodes_4"/>
+          <dgm:constr type="w" for="ch" forName="FiveNodes_1" refType="w" fact="0.77"/>
+          <dgm:constr type="h" for="ch" forName="FiveNodes_1" refType="h" fact="0.18"/>
+          <dgm:constr type="t" for="ch" forName="FiveNodes_1"/>
+          <dgm:constr type="l" for="ch" forName="FiveNodes_1"/>
+          <dgm:constr type="w" for="ch" forName="FiveNodes_2" refType="w" fact="0.77"/>
+          <dgm:constr type="h" for="ch" forName="FiveNodes_2" refType="h" fact="0.18"/>
+          <dgm:constr type="ctrY" for="ch" forName="FiveNodes_2" refType="h" fact="0.295"/>
+          <dgm:constr type="ctrX" for="ch" forName="FiveNodes_2" refType="w" fact="0.4425"/>
+          <dgm:constr type="w" for="ch" forName="FiveNodes_3" refType="w" fact="0.77"/>
+          <dgm:constr type="h" for="ch" forName="FiveNodes_3" refType="h" fact="0.18"/>
+          <dgm:constr type="ctrY" for="ch" forName="FiveNodes_3" refType="h" fact="0.5"/>
+          <dgm:constr type="ctrX" for="ch" forName="FiveNodes_3" refType="w" fact="0.5"/>
+          <dgm:constr type="w" for="ch" forName="FiveNodes_4" refType="w" fact="0.77"/>
+          <dgm:constr type="h" for="ch" forName="FiveNodes_4" refType="h" fact="0.18"/>
+          <dgm:constr type="ctrY" for="ch" forName="FiveNodes_4" refType="h" fact="0.705"/>
+          <dgm:constr type="ctrX" for="ch" forName="FiveNodes_4" refType="w" fact="0.5575"/>
+          <dgm:constr type="w" for="ch" forName="FiveNodes_5" refType="w" fact="0.77"/>
+          <dgm:constr type="h" for="ch" forName="FiveNodes_5" refType="h" fact="0.18"/>
+          <dgm:constr type="b" for="ch" forName="FiveNodes_5" refType="h"/>
+          <dgm:constr type="r" for="ch" forName="FiveNodes_5" refType="w"/>
+          <dgm:constr type="w" for="ch" forName="FiveConn_1-2" refType="h" refFor="ch" refForName="FiveNodes_1" fact="0.65"/>
+          <dgm:constr type="h" for="ch" forName="FiveConn_1-2" refType="h" refFor="ch" refForName="FiveNodes_1" fact="0.65"/>
+          <dgm:constr type="ctrY" for="ch" forName="FiveConn_1-2" refType="h" fact="0.19"/>
+          <dgm:constr type="r" for="ch" forName="FiveConn_1-2" refType="r" refFor="ch" refForName="FiveNodes_1"/>
+          <dgm:constr type="w" for="ch" forName="FiveConn_2-3" refType="h" refFor="ch" refForName="FiveNodes_2" fact="0.65"/>
+          <dgm:constr type="h" for="ch" forName="FiveConn_2-3" refType="h" refFor="ch" refForName="FiveNodes_2" fact="0.65"/>
+          <dgm:constr type="ctrY" for="ch" forName="FiveConn_2-3" refType="h" fact="0.395"/>
+          <dgm:constr type="r" for="ch" forName="FiveConn_2-3" refType="r" refFor="ch" refForName="FiveNodes_2"/>
+          <dgm:constr type="w" for="ch" forName="FiveConn_3-4" refType="h" refFor="ch" refForName="FiveNodes_3" fact="0.65"/>
+          <dgm:constr type="h" for="ch" forName="FiveConn_3-4" refType="h" refFor="ch" refForName="FiveNodes_3" fact="0.65"/>
+          <dgm:constr type="ctrY" for="ch" forName="FiveConn_3-4" refType="h" fact="0.597"/>
+          <dgm:constr type="r" for="ch" forName="FiveConn_3-4" refType="r" refFor="ch" refForName="FiveNodes_3"/>
+          <dgm:constr type="w" for="ch" forName="FiveConn_4-5" refType="h" refFor="ch" refForName="FiveNodes_4" fact="0.65"/>
+          <dgm:constr type="h" for="ch" forName="FiveConn_4-5" refType="h" refFor="ch" refForName="FiveNodes_4" fact="0.65"/>
+          <dgm:constr type="ctrY" for="ch" forName="FiveConn_4-5" refType="h" fact="0.804"/>
+          <dgm:constr type="r" for="ch" forName="FiveConn_4-5" refType="r" refFor="ch" refForName="FiveNodes_4"/>
+          <dgm:constr type="r" for="ch" forName="FiveNodes_1_text" refType="l" refFor="ch" refForName="FiveConn_1-2"/>
+          <dgm:constr type="rOff" for="ch" forName="FiveNodes_1_text" refType="w" refFor="ch" refForName="FiveConn_1-2" fact="-0.75"/>
+          <dgm:constr type="t" for="ch" forName="FiveNodes_1_text" refType="t" refFor="ch" refForName="FiveNodes_1"/>
+          <dgm:constr type="b" for="ch" forName="FiveNodes_1_text" refType="b" refFor="ch" refForName="FiveNodes_1"/>
+          <dgm:constr type="l" for="ch" forName="FiveNodes_1_text" refType="l" refFor="ch" refForName="FiveNodes_1"/>
+          <dgm:constr type="r" for="ch" forName="FiveNodes_2_text" refType="l" refFor="ch" refForName="FiveConn_1-2"/>
+          <dgm:constr type="t" for="ch" forName="FiveNodes_2_text" refType="t" refFor="ch" refForName="FiveNodes_2"/>
+          <dgm:constr type="b" for="ch" forName="FiveNodes_2_text" refType="b" refFor="ch" refForName="FiveNodes_2"/>
+          <dgm:constr type="l" for="ch" forName="FiveNodes_2_text" refType="l" refFor="ch" refForName="FiveNodes_2"/>
+          <dgm:constr type="r" for="ch" forName="FiveNodes_3_text" refType="l" refFor="ch" refForName="FiveConn_2-3"/>
+          <dgm:constr type="t" for="ch" forName="FiveNodes_3_text" refType="t" refFor="ch" refForName="FiveNodes_3"/>
+          <dgm:constr type="b" for="ch" forName="FiveNodes_3_text" refType="b" refFor="ch" refForName="FiveNodes_3"/>
+          <dgm:constr type="l" for="ch" forName="FiveNodes_3_text" refType="l" refFor="ch" refForName="FiveNodes_3"/>
+          <dgm:constr type="r" for="ch" forName="FiveNodes_4_text" refType="l" refFor="ch" refForName="FiveConn_3-4"/>
+          <dgm:constr type="t" for="ch" forName="FiveNodes_4_text" refType="t" refFor="ch" refForName="FiveNodes_4"/>
+          <dgm:constr type="b" for="ch" forName="FiveNodes_4_text" refType="b" refFor="ch" refForName="FiveNodes_4"/>
+          <dgm:constr type="l" for="ch" forName="FiveNodes_4_text" refType="l" refFor="ch" refForName="FiveNodes_4"/>
+          <dgm:constr type="r" for="ch" forName="FiveNodes_5_text" refType="l" refFor="ch" refForName="FiveConn_4-5"/>
+          <dgm:constr type="t" for="ch" forName="FiveNodes_5_text" refType="t" refFor="ch" refForName="FiveNodes_5"/>
+          <dgm:constr type="b" for="ch" forName="FiveNodes_5_text" refType="b" refFor="ch" refForName="FiveNodes_5"/>
+          <dgm:constr type="l" for="ch" forName="FiveNodes_5_text" refType="l" refFor="ch" refForName="FiveNodes_5"/>
         </dgm:constrLst>
       </dgm:if>
       <dgm:else name="Name2">
         <dgm:constrLst>
-          <dgm:constr type="w" for="ch" forName="container" refType="w"/>
-          <dgm:constr type="h" for="ch" forName="container" refType="h"/>
+          <dgm:constr type="primFontSz" for="ch" ptType="node" op="equ" val="65"/>
+          <dgm:constr type="w" for="ch" forName="dummyMaxCanvas" refType="w"/>
+          <dgm:constr type="h" for="ch" forName="dummyMaxCanvas" refType="h"/>
+          <dgm:constr type="w" for="ch" forName="OneNode_1" refType="w"/>
+          <dgm:constr type="h" for="ch" forName="OneNode_1" refType="h" fact="0.5"/>
+          <dgm:constr type="ctrY" for="ch" forName="OneNode_1" refType="h" fact="0.5"/>
+          <dgm:constr type="w" for="ch" forName="TwoNodes_1" refType="w" fact="0.85"/>
+          <dgm:constr type="h" for="ch" forName="TwoNodes_1" refType="h" fact="0.45"/>
+          <dgm:constr type="t" for="ch" forName="TwoNodes_1"/>
+          <dgm:constr type="r" for="ch" forName="TwoNodes_1" refType="w"/>
+          <dgm:constr type="w" for="ch" forName="TwoNodes_2" refType="w" fact="0.85"/>
+          <dgm:constr type="h" for="ch" forName="TwoNodes_2" refType="h" fact="0.45"/>
+          <dgm:constr type="b" for="ch" forName="TwoNodes_2" refType="h"/>
+          <dgm:constr type="l" for="ch" forName="TwoNodes_2"/>
+          <dgm:constr type="w" for="ch" forName="TwoConn_1-2" refType="h" refFor="ch" refForName="TwoNodes_1" fact="0.65"/>
+          <dgm:constr type="h" for="ch" forName="TwoConn_1-2" refType="h" refFor="ch" refForName="TwoNodes_1" fact="0.65"/>
+          <dgm:constr type="ctrY" for="ch" forName="TwoConn_1-2" refType="h" fact="0.5"/>
+          <dgm:constr type="l" for="ch" forName="TwoConn_1-2" refType="l" refFor="ch" refForName="TwoNodes_1"/>
+          <dgm:constr type="l" for="ch" forName="TwoNodes_1_text" refType="r" refFor="ch" refForName="TwoConn_1-2"/>
+          <dgm:constr type="lOff" for="ch" forName="TwoNodes_1_text" refType="w" refFor="ch" refForName="TwoConn_1-2" fact="0.5"/>
+          <dgm:constr type="t" for="ch" forName="TwoNodes_1_text" refType="t" refFor="ch" refForName="TwoNodes_1"/>
+          <dgm:constr type="b" for="ch" forName="TwoNodes_1_text" refType="b" refFor="ch" refForName="TwoNodes_1"/>
+          <dgm:constr type="r" for="ch" forName="TwoNodes_1_text" refType="r" refFor="ch" refForName="TwoNodes_1"/>
+          <dgm:constr type="l" for="ch" forName="TwoNodes_2_text" refType="r" refFor="ch" refForName="TwoConn_1-2"/>
+          <dgm:constr type="t" for="ch" forName="TwoNodes_2_text" refType="t" refFor="ch" refForName="TwoNodes_2"/>
+          <dgm:constr type="b" for="ch" forName="TwoNodes_2_text" refType="b" refFor="ch" refForName="TwoNodes_2"/>
+          <dgm:constr type="r" for="ch" forName="TwoNodes_2_text" refType="r" refFor="ch" refForName="TwoNodes_2"/>
+          <dgm:constr type="w" for="ch" forName="ThreeNodes_1" refType="w" fact="0.85"/>
+          <dgm:constr type="h" for="ch" forName="ThreeNodes_1" refType="h" fact="0.3"/>
+          <dgm:constr type="t" for="ch" forName="ThreeNodes_1"/>
+          <dgm:constr type="r" for="ch" forName="ThreeNodes_1" refType="w"/>
+          <dgm:constr type="w" for="ch" forName="ThreeNodes_2" refType="w" fact="0.85"/>
+          <dgm:constr type="h" for="ch" forName="ThreeNodes_2" refType="h" fact="0.3"/>
+          <dgm:constr type="ctrY" for="ch" forName="ThreeNodes_2" refType="h" fact="0.5"/>
+          <dgm:constr type="ctrX" for="ch" forName="ThreeNodes_2" refType="w" fact="0.5"/>
+          <dgm:constr type="w" for="ch" forName="ThreeNodes_3" refType="w" fact="0.85"/>
+          <dgm:constr type="h" for="ch" forName="ThreeNodes_3" refType="h" fact="0.3"/>
+          <dgm:constr type="b" for="ch" forName="ThreeNodes_3" refType="h"/>
+          <dgm:constr type="l" for="ch" forName="ThreeNodes_3"/>
+          <dgm:constr type="w" for="ch" forName="ThreeConn_1-2" refType="h" refFor="ch" refForName="ThreeNodes_1" fact="0.65"/>
+          <dgm:constr type="h" for="ch" forName="ThreeConn_1-2" refType="h" refFor="ch" refForName="ThreeNodes_1" fact="0.65"/>
+          <dgm:constr type="ctrY" for="ch" forName="ThreeConn_1-2" refType="h" fact="0.325"/>
+          <dgm:constr type="l" for="ch" forName="ThreeConn_1-2" refType="l" refFor="ch" refForName="ThreeNodes_1"/>
+          <dgm:constr type="w" for="ch" forName="ThreeConn_2-3" refType="h" refFor="ch" refForName="ThreeNodes_2" fact="0.65"/>
+          <dgm:constr type="h" for="ch" forName="ThreeConn_2-3" refType="h" refFor="ch" refForName="ThreeNodes_2" fact="0.65"/>
+          <dgm:constr type="ctrY" for="ch" forName="ThreeConn_2-3" refType="h" fact="0.673"/>
+          <dgm:constr type="l" for="ch" forName="ThreeConn_2-3" refType="l" refFor="ch" refForName="ThreeNodes_2"/>
+          <dgm:constr type="l" for="ch" forName="ThreeNodes_1_text" refType="r" refFor="ch" refForName="ThreeConn_1-2"/>
+          <dgm:constr type="lOff" for="ch" forName="ThreeNodes_1_text" refType="w" refFor="ch" refForName="ThreeConn_1-2" fact="0.55"/>
+          <dgm:constr type="t" for="ch" forName="ThreeNodes_1_text" refType="t" refFor="ch" refForName="ThreeNodes_1"/>
+          <dgm:constr type="b" for="ch" forName="ThreeNodes_1_text" refType="b" refFor="ch" refForName="ThreeNodes_1"/>
+          <dgm:constr type="r" for="ch" forName="ThreeNodes_1_text" refType="r" refFor="ch" refForName="ThreeNodes_1"/>
+          <dgm:constr type="l" for="ch" forName="ThreeNodes_2_text" refType="r" refFor="ch" refForName="ThreeConn_1-2"/>
+          <dgm:constr type="t" for="ch" forName="ThreeNodes_2_text" refType="t" refFor="ch" refForName="ThreeNodes_2"/>
+          <dgm:constr type="b" for="ch" forName="ThreeNodes_2_text" refType="b" refFor="ch" refForName="ThreeNodes_2"/>
+          <dgm:constr type="r" for="ch" forName="ThreeNodes_2_text" refType="r" refFor="ch" refForName="ThreeNodes_2"/>
+          <dgm:constr type="l" for="ch" forName="ThreeNodes_3_text" refType="r" refFor="ch" refForName="ThreeConn_2-3"/>
+          <dgm:constr type="t" for="ch" forName="ThreeNodes_3_text" refType="t" refFor="ch" refForName="ThreeNodes_3"/>
+          <dgm:constr type="b" for="ch" forName="ThreeNodes_3_text" refType="b" refFor="ch" refForName="ThreeNodes_3"/>
+          <dgm:constr type="r" for="ch" forName="ThreeNodes_3_text" refType="r" refFor="ch" refForName="ThreeNodes_3"/>
+          <dgm:constr type="w" for="ch" forName="FourNodes_1" refType="w" fact="0.8"/>
+          <dgm:constr type="h" for="ch" forName="FourNodes_1" refType="h" fact="0.22"/>
+          <dgm:constr type="t" for="ch" forName="FourNodes_1"/>
+          <dgm:constr type="r" for="ch" forName="FourNodes_1" refType="w"/>
+          <dgm:constr type="w" for="ch" forName="FourNodes_2" refType="w" fact="0.8"/>
+          <dgm:constr type="h" for="ch" forName="FourNodes_2" refType="h" fact="0.22"/>
+          <dgm:constr type="ctrY" for="ch" forName="FourNodes_2" refType="h" fact="0.37"/>
+          <dgm:constr type="ctrX" for="ch" forName="FourNodes_2" refType="w" fact="0.533"/>
+          <dgm:constr type="w" for="ch" forName="FourNodes_3" refType="w" fact="0.8"/>
+          <dgm:constr type="h" for="ch" forName="FourNodes_3" refType="h" fact="0.22"/>
+          <dgm:constr type="ctrY" for="ch" forName="FourNodes_3" refType="h" fact="0.63"/>
+          <dgm:constr type="ctrX" for="ch" forName="FourNodes_3" refType="w" fact="0.467"/>
+          <dgm:constr type="w" for="ch" forName="FourNodes_4" refType="w" fact="0.8"/>
+          <dgm:constr type="h" for="ch" forName="FourNodes_4" refType="h" fact="0.22"/>
+          <dgm:constr type="b" for="ch" forName="FourNodes_4" refType="h"/>
+          <dgm:constr type="l" for="ch" forName="FourNodes_4"/>
+          <dgm:constr type="w" for="ch" forName="FourConn_1-2" refType="h" refFor="ch" refForName="FourNodes_1" fact="0.65"/>
+          <dgm:constr type="h" for="ch" forName="FourConn_1-2" refType="h" refFor="ch" refForName="FourNodes_1" fact="0.65"/>
+          <dgm:constr type="ctrY" for="ch" forName="FourConn_1-2" refType="h" fact="0.24"/>
+          <dgm:constr type="l" for="ch" forName="FourConn_1-2" refType="l" refFor="ch" refForName="FourNodes_1"/>
+          <dgm:constr type="w" for="ch" forName="FourConn_2-3" refType="h" refFor="ch" refForName="FourNodes_2" fact="0.65"/>
+          <dgm:constr type="h" for="ch" forName="FourConn_2-3" refType="h" refFor="ch" refForName="FourNodes_2" fact="0.65"/>
+          <dgm:constr type="ctrY" for="ch" forName="FourConn_2-3" refType="h" fact="0.5"/>
+          <dgm:constr type="l" for="ch" forName="FourConn_2-3" refType="l" refFor="ch" refForName="FourNodes_2"/>
+          <dgm:constr type="w" for="ch" forName="FourConn_3-4" refType="h" refFor="ch" refForName="FourNodes_3" fact="0.65"/>
+          <dgm:constr type="h" for="ch" forName="FourConn_3-4" refType="h" refFor="ch" refForName="FourNodes_3" fact="0.65"/>
+          <dgm:constr type="ctrY" for="ch" forName="FourConn_3-4" refType="h" fact="0.76"/>
+          <dgm:constr type="l" for="ch" forName="FourConn_3-4" refType="l" refFor="ch" refForName="FourNodes_3"/>
+          <dgm:constr type="l" for="ch" forName="FourNodes_1_text" refType="r" refFor="ch" refForName="FourConn_1-2"/>
+          <dgm:constr type="lOff" for="ch" forName="FourNodes_1_text" refType="w" refFor="ch" refForName="FourConn_1-2" fact="0.69"/>
+          <dgm:constr type="t" for="ch" forName="FourNodes_1_text" refType="t" refFor="ch" refForName="FourNodes_1"/>
+          <dgm:constr type="b" for="ch" forName="FourNodes_1_text" refType="b" refFor="ch" refForName="FourNodes_1"/>
+          <dgm:constr type="r" for="ch" forName="FourNodes_1_text" refType="r" refFor="ch" refForName="FourNodes_1"/>
+          <dgm:constr type="l" for="ch" forName="FourNodes_2_text" refType="r" refFor="ch" refForName="FourConn_1-2"/>
+          <dgm:constr type="t" for="ch" forName="FourNodes_2_text" refType="t" refFor="ch" refForName="FourNodes_2"/>
+          <dgm:constr type="b" for="ch" forName="FourNodes_2_text" refType="b" refFor="ch" refForName="FourNodes_2"/>
+          <dgm:constr type="r" for="ch" forName="FourNodes_2_text" refType="r" refFor="ch" refForName="FourNodes_2"/>
+          <dgm:constr type="l" for="ch" forName="FourNodes_3_text" refType="r" refFor="ch" refForName="FourConn_2-3"/>
+          <dgm:constr type="t" for="ch" forName="FourNodes_3_text" refType="t" refFor="ch" refForName="FourNodes_3"/>
+          <dgm:constr type="b" for="ch" forName="FourNodes_3_text" refType="b" refFor="ch" refForName="FourNodes_3"/>
+          <dgm:constr type="r" for="ch" forName="FourNodes_3_text" refType="r" refFor="ch" refForName="FourNodes_3"/>
+          <dgm:constr type="l" for="ch" forName="FourNodes_4_text" refType="r" refFor="ch" refForName="FourConn_3-4"/>
+          <dgm:constr type="t" for="ch" forName="FourNodes_4_text" refType="t" refFor="ch" refForName="FourNodes_4"/>
+          <dgm:constr type="b" for="ch" forName="FourNodes_4_text" refType="b" refFor="ch" refForName="FourNodes_4"/>
+          <dgm:constr type="r" for="ch" forName="FourNodes_4_text" refType="r" refFor="ch" refForName="FourNodes_4"/>
+          <dgm:constr type="w" for="ch" forName="FiveNodes_1" refType="w" fact="0.77"/>
+          <dgm:constr type="h" for="ch" forName="FiveNodes_1" refType="h" fact="0.18"/>
+          <dgm:constr type="t" for="ch" forName="FiveNodes_1"/>
+          <dgm:constr type="r" for="ch" forName="FiveNodes_1" refType="w"/>
+          <dgm:constr type="w" for="ch" forName="FiveNodes_2" refType="w" fact="0.77"/>
+          <dgm:constr type="h" for="ch" forName="FiveNodes_2" refType="h" fact="0.18"/>
+          <dgm:constr type="ctrY" for="ch" forName="FiveNodes_2" refType="h" fact="0.295"/>
+          <dgm:constr type="ctrX" for="ch" forName="FiveNodes_2" refType="w" fact="0.5575"/>
+          <dgm:constr type="w" for="ch" forName="FiveNodes_3" refType="w" fact="0.77"/>
+          <dgm:constr type="h" for="ch" forName="FiveNodes_3" refType="h" fact="0.18"/>
+          <dgm:constr type="ctrY" for="ch" forName="FiveNodes_3" refType="h" fact="0.5"/>
+          <dgm:constr type="ctrX" for="ch" forName="FiveNodes_3" refType="w" fact="0.5"/>
+          <dgm:constr type="w" for="ch" forName="FiveNodes_4" refType="w" fact="0.77"/>
+          <dgm:constr type="h" for="ch" forName="FiveNodes_4" refType="h" fact="0.18"/>
+          <dgm:constr type="ctrY" for="ch" forName="FiveNodes_4" refType="h" fact="0.705"/>
+          <dgm:constr type="ctrX" for="ch" forName="FiveNodes_4" refType="w" fact="0.4425"/>
+          <dgm:constr type="w" for="ch" forName="FiveNodes_5" refType="w" fact="0.77"/>
+          <dgm:constr type="h" for="ch" forName="FiveNodes_5" refType="h" fact="0.18"/>
+          <dgm:constr type="b" for="ch" forName="FiveNodes_5" refType="h"/>
+          <dgm:constr type="l" for="ch" forName="FiveNodes_5"/>
+          <dgm:constr type="w" for="ch" forName="FiveConn_1-2" refType="h" refFor="ch" refForName="FiveNodes_1" fact="0.65"/>
+          <dgm:constr type="h" for="ch" forName="FiveConn_1-2" refType="h" refFor="ch" refForName="FiveNodes_1" fact="0.65"/>
+          <dgm:constr type="ctrY" for="ch" forName="FiveConn_1-2" refType="h" fact="0.19"/>
+          <dgm:constr type="l" for="ch" forName="FiveConn_1-2" refType="l" refFor="ch" refForName="FiveNodes_1"/>
+          <dgm:constr type="w" for="ch" forName="FiveConn_2-3" refType="h" refFor="ch" refForName="FiveNodes_2" fact="0.65"/>
+          <dgm:constr type="h" for="ch" forName="FiveConn_2-3" refType="h" refFor="ch" refForName="FiveNodes_2" fact="0.65"/>
+          <dgm:constr type="ctrY" for="ch" forName="FiveConn_2-3" refType="h" fact="0.395"/>
+          <dgm:constr type="l" for="ch" forName="FiveConn_2-3" refType="l" refFor="ch" refForName="FiveNodes_2"/>
+          <dgm:constr type="w" for="ch" forName="FiveConn_3-4" refType="h" refFor="ch" refForName="FiveNodes_3" fact="0.65"/>
+          <dgm:constr type="h" for="ch" forName="FiveConn_3-4" refType="h" refFor="ch" refForName="FiveNodes_3" fact="0.65"/>
+          <dgm:constr type="ctrY" for="ch" forName="FiveConn_3-4" refType="h" fact="0.597"/>
+          <dgm:constr type="l" for="ch" forName="FiveConn_3-4" refType="l" refFor="ch" refForName="FiveNodes_3"/>
+          <dgm:constr type="w" for="ch" forName="FiveConn_4-5" refType="h" refFor="ch" refForName="FiveNodes_4" fact="0.65"/>
+          <dgm:constr type="h" for="ch" forName="FiveConn_4-5" refType="h" refFor="ch" refForName="FiveNodes_4" fact="0.65"/>
+          <dgm:constr type="ctrY" for="ch" forName="FiveConn_4-5" refType="h" fact="0.804"/>
+          <dgm:constr type="l" for="ch" forName="FiveConn_4-5" refType="l" refFor="ch" refForName="FiveNodes_4"/>
+          <dgm:constr type="l" for="ch" forName="FiveNodes_1_text" refType="r" refFor="ch" refForName="FiveConn_1-2"/>
+          <dgm:constr type="lOff" for="ch" forName="FiveNodes_1_text" refType="w" refFor="ch" refForName="FiveConn_1-2" fact="0.73"/>
+          <dgm:constr type="t" for="ch" forName="FiveNodes_1_text" refType="t" refFor="ch" refForName="FiveNodes_1"/>
+          <dgm:constr type="b" for="ch" forName="FiveNodes_1_text" refType="b" refFor="ch" refForName="FiveNodes_1"/>
+          <dgm:constr type="r" for="ch" forName="FiveNodes_1_text" refType="r" refFor="ch" refForName="FiveNodes_1"/>
+          <dgm:constr type="l" for="ch" forName="FiveNodes_2_text" refType="r" refFor="ch" refForName="FiveConn_1-2"/>
+          <dgm:constr type="t" for="ch" forName="FiveNodes_2_text" refType="t" refFor="ch" refForName="FiveNodes_2"/>
+          <dgm:constr type="b" for="ch" forName="FiveNodes_2_text" refType="b" refFor="ch" refForName="FiveNodes_2"/>
+          <dgm:constr type="r" for="ch" forName="FiveNodes_2_text" refType="r" refFor="ch" refForName="FiveNodes_2"/>
+          <dgm:constr type="l" for="ch" forName="FiveNodes_3_text" refType="r" refFor="ch" refForName="FiveConn_2-3"/>
+          <dgm:constr type="t" for="ch" forName="FiveNodes_3_text" refType="t" refFor="ch" refForName="FiveNodes_3"/>
+          <dgm:constr type="b" for="ch" forName="FiveNodes_3_text" refType="b" refFor="ch" refForName="FiveNodes_3"/>
+          <dgm:constr type="r" for="ch" forName="FiveNodes_3_text" refType="r" refFor="ch" refForName="FiveNodes_3"/>
+          <dgm:constr type="l" for="ch" forName="FiveNodes_4_text" refType="r" refFor="ch" refForName="FiveConn_3-4"/>
+          <dgm:constr type="t" for="ch" forName="FiveNodes_4_text" refType="t" refFor="ch" refForName="FiveNodes_4"/>
+          <dgm:constr type="b" for="ch" forName="FiveNodes_4_text" refType="b" refFor="ch" refForName="FiveNodes_4"/>
+          <dgm:constr type="r" for="ch" forName="FiveNodes_4_text" refType="r" refFor="ch" refForName="FiveNodes_4"/>
+          <dgm:constr type="l" for="ch" forName="FiveNodes_5_text" refType="r" refFor="ch" refForName="FiveConn_4-5"/>
+          <dgm:constr type="t" for="ch" forName="FiveNodes_5_text" refType="t" refFor="ch" refForName="FiveNodes_5"/>
+          <dgm:constr type="b" for="ch" forName="FiveNodes_5_text" refType="b" refFor="ch" refForName="FiveNodes_5"/>
+          <dgm:constr type="r" for="ch" forName="FiveNodes_5_text" refType="r" refFor="ch" refForName="FiveNodes_5"/>
         </dgm:constrLst>
       </dgm:else>
     </dgm:choose>
-    <dgm:ruleLst>
-      <dgm:rule type="h" for="ch" forName="container" val="INF" fact="NaN" max="NaN"/>
-    </dgm:ruleLst>
-    <dgm:layoutNode name="container">
-      <dgm:varLst>
-        <dgm:dir/>
-        <dgm:resizeHandles val="exact"/>
-      </dgm:varLst>
-      <dgm:choose name="Name3">
-        <dgm:if name="Name4" axis="self" func="var" arg="dir" op="equ" val="norm">
-          <dgm:alg type="snake">
-            <dgm:param type="grDir" val="tL"/>
-            <dgm:param type="flowDir" val="row"/>
-            <dgm:param type="contDir" val="sameDir"/>
-          </dgm:alg>
-        </dgm:if>
-        <dgm:else name="Name5">
-          <dgm:alg type="snake">
-            <dgm:param type="grDir" val="tR"/>
-            <dgm:param type="flowDir" val="row"/>
-            <dgm:param type="contDir" val="sameDir"/>
-          </dgm:alg>
-        </dgm:else>
-      </dgm:choose>
+    <dgm:ruleLst/>
+    <dgm:layoutNode name="dummyMaxCanvas">
+      <dgm:varLst/>
+      <dgm:alg type="sp"/>
       <dgm:shape xmlns:r="http://schemas.openxmlformats.org/officeDocument/2006/relationships" r:blip="">
         <dgm:adjLst/>
       </dgm:shape>
       <dgm:presOf/>
-      <dgm:constrLst>
-        <dgm:constr type="w" for="ch" forName="compNode" refType="w"/>
-        <dgm:constr type="h" for="ch" forName="compNode" refType="w" fact="0.28"/>
-        <dgm:constr type="w" for="ch" forName="sibTrans" refType="w" refFor="ch" refForName="compNode" fact="0.115"/>
-        <dgm:constr type="sp" refType="h" op="equ" fact="0.17"/>
-        <dgm:constr type="primFontSz" for="des" ptType="node" op="equ" val="24"/>
-        <dgm:constr type="h" for="des" forName="compNode" op="equ"/>
-        <dgm:constr type="h" for="des" forName="iconBgRect" op="equ"/>
-      </dgm:constrLst>
-      <dgm:ruleLst>
-        <dgm:rule type="w" for="ch" forName="compNode" val="60" fact="NaN" max="NaN"/>
-      </dgm:ruleLst>
-      <dgm:forEach name="Name6" axis="ch" ptType="node">
-        <dgm:layoutNode name="compNode">
-          <dgm:alg type="composite"/>
-          <dgm:shape xmlns:r="http://schemas.openxmlformats.org/officeDocument/2006/relationships" r:blip="">
-            <dgm:adjLst/>
+      <dgm:constrLst/>
+      <dgm:ruleLst/>
+    </dgm:layoutNode>
+    <dgm:choose name="Name3">
+      <dgm:if name="Name4" axis="ch" ptType="node" func="cnt" op="equ" val="1">
+        <dgm:layoutNode name="OneNode_1">
+          <dgm:varLst>
+            <dgm:bulletEnabled val="1"/>
+          </dgm:varLst>
+          <dgm:alg type="tx"/>
+          <dgm:shape xmlns:r="http://schemas.openxmlformats.org/officeDocument/2006/relationships" type="roundRect" r:blip="">
+            <dgm:adjLst>
+              <dgm:adj idx="1" val="0.1"/>
+            </dgm:adjLst>
           </dgm:shape>
-          <dgm:presOf axis="self"/>
+          <dgm:presOf axis="ch desOrSelf" ptType="node node" st="1 1" cnt="1 0"/>
           <dgm:constrLst>
-            <dgm:constr type="w" for="ch" forName="iconBgRect" refType="w" fact="0.28"/>
-            <dgm:constr type="h" for="ch" forName="iconBgRect" refType="w" refFor="ch" refForName="iconBgRect"/>
-            <dgm:constr type="t" for="ch" forName="iconBgRect"/>
-            <dgm:constr type="l" for="ch" forName="iconBgRect"/>
-            <dgm:constr type="w" for="ch" forName="iconRect" refType="w" refFor="ch" refForName="iconBgRect" fact="0.58"/>
-            <dgm:constr type="h" for="ch" forName="iconRect" refType="w" refFor="ch" refForName="iconRect"/>
-            <dgm:constr type="ctrX" for="ch" forName="iconRect" refType="ctrX" refFor="ch" refForName="iconBgRect"/>
-            <dgm:constr type="ctrY" for="ch" forName="iconRect" refType="ctrY" refFor="ch" refForName="iconBgRect"/>
-            <dgm:constr type="w" for="ch" forName="spaceRect" refType="w" fact="0.06"/>
-            <dgm:constr type="h" for="ch" forName="spaceRect" refType="h" refFor="ch" refForName="iconBgRect"/>
-            <dgm:constr type="t" for="ch" forName="spaceRect" refType="t" refFor="ch" refForName="iconBgRect"/>
-            <dgm:constr type="l" for="ch" forName="spaceRect" refType="r" refFor="ch" refForName="iconBgRect"/>
-            <dgm:constr type="h" for="ch" forName="textRect" refType="h" refFor="ch" refForName="iconBgRect"/>
-            <dgm:constr type="t" for="ch" forName="textRect" refType="t" refFor="ch" refForName="iconBgRect"/>
-            <dgm:constr type="l" for="ch" forName="textRect" refType="r" refFor="ch" refForName="spaceRect"/>
+            <dgm:constr type="lMarg" refType="primFontSz" fact="0.3"/>
+            <dgm:constr type="rMarg" refType="primFontSz" fact="0.3"/>
+            <dgm:constr type="tMarg" refType="primFontSz" fact="0.3"/>
+            <dgm:constr type="bMarg" refType="primFontSz" fact="0.3"/>
           </dgm:constrLst>
-          <dgm:ruleLst/>
-          <dgm:layoutNode name="iconBgRect" styleLbl="bgShp">
-            <dgm:alg type="sp"/>
-            <dgm:shape xmlns:r="http://schemas.openxmlformats.org/officeDocument/2006/relationships" type="ellipse" r:blip="">
-              <dgm:adjLst/>
-            </dgm:shape>
-            <dgm:presOf/>
-            <dgm:constrLst/>
-            <dgm:ruleLst/>
-          </dgm:layoutNode>
-          <dgm:layoutNode name="iconRect" styleLbl="node1">
-            <dgm:alg type="sp"/>
-            <dgm:shape xmlns:r="http://schemas.openxmlformats.org/officeDocument/2006/relationships" type="rect" r:blip="" blipPhldr="1">
-              <dgm:adjLst/>
-            </dgm:shape>
-            <dgm:presOf/>
-            <dgm:constrLst/>
-            <dgm:ruleLst/>
-          </dgm:layoutNode>
-          <dgm:layoutNode name="spaceRect">
-            <dgm:alg type="sp"/>
-            <dgm:shape xmlns:r="http://schemas.openxmlformats.org/officeDocument/2006/relationships" r:blip="">
-              <dgm:adjLst/>
-            </dgm:shape>
-            <dgm:presOf/>
-            <dgm:constrLst/>
-            <dgm:ruleLst/>
-          </dgm:layoutNode>
-          <dgm:layoutNode name="textRect" styleLbl="revTx">
-            <dgm:varLst>
-              <dgm:chMax val="1"/>
-              <dgm:chPref val="1"/>
-            </dgm:varLst>
-            <dgm:choose name="Name7">
-              <dgm:if name="Name8" func="var" arg="dir" op="equ" val="norm">
-                <dgm:alg type="tx">
-                  <dgm:param type="txAnchorVert" val="mid"/>
-                  <dgm:param type="parTxLTRAlign" val="l"/>
-                  <dgm:param type="shpTxLTRAlignCh" val="l"/>
-                  <dgm:param type="parTxRTLAlign" val="l"/>
-                  <dgm:param type="shpTxRTLAlignCh" val="l"/>
-                </dgm:alg>
+          <dgm:ruleLst>
+            <dgm:rule type="primFontSz" val="5" fact="NaN" max="NaN"/>
+          </dgm:ruleLst>
+        </dgm:layoutNode>
+      </dgm:if>
+      <dgm:else name="Name5">
+        <dgm:choose name="Name6">
+          <dgm:if name="Name7" axis="ch" ptType="node" func="cnt" op="equ" val="2">
+            <dgm:layoutNode name="TwoNodes_1">
+              <dgm:varLst>
+                <dgm:bulletEnabled val="1"/>
+              </dgm:varLst>
+              <dgm:alg type="sp"/>
+              <dgm:shape xmlns:r="http://schemas.openxmlformats.org/officeDocument/2006/relationships" type="roundRect" r:blip="">
+                <dgm:adjLst>
+                  <dgm:adj idx="1" val="0.1"/>
+                </dgm:adjLst>
+              </dgm:shape>
+              <dgm:presOf axis="ch desOrSelf" ptType="node node" st="1 1" cnt="1 0"/>
+              <dgm:constrLst/>
+              <dgm:ruleLst/>
+            </dgm:layoutNode>
+            <dgm:layoutNode name="TwoNodes_2">
+              <dgm:varLst>
+                <dgm:bulletEnabled val="1"/>
+              </dgm:varLst>
+              <dgm:alg type="sp"/>
+              <dgm:shape xmlns:r="http://schemas.openxmlformats.org/officeDocument/2006/relationships" type="roundRect" r:blip="">
+                <dgm:adjLst>
+                  <dgm:adj idx="1" val="0.1"/>
+                </dgm:adjLst>
+              </dgm:shape>
+              <dgm:presOf axis="ch desOrSelf" ptType="node node" st="2 1" cnt="1 0"/>
+              <dgm:constrLst/>
+              <dgm:ruleLst/>
+            </dgm:layoutNode>
+            <dgm:layoutNode name="TwoConn_1-2" styleLbl="fgAccFollowNode1">
+              <dgm:varLst>
+                <dgm:bulletEnabled val="1"/>
+              </dgm:varLst>
+              <dgm:alg type="tx"/>
+              <dgm:shape xmlns:r="http://schemas.openxmlformats.org/officeDocument/2006/relationships" type="downArrow" r:blip="">
+                <dgm:adjLst>
+                  <dgm:adj idx="1" val="0.55"/>
+                  <dgm:adj idx="2" val="0.45"/>
+                </dgm:adjLst>
+              </dgm:shape>
+              <dgm:presOf axis="ch" ptType="sibTrans" cnt="1"/>
+              <dgm:constrLst>
+                <dgm:constr type="lMarg" refType="primFontSz" fact="0.1"/>
+                <dgm:constr type="rMarg" refType="primFontSz" fact="0.1"/>
+                <dgm:constr type="tMarg" refType="primFontSz" fact="0.1"/>
+                <dgm:constr type="bMarg" refType="primFontSz" fact="0.1"/>
+              </dgm:constrLst>
+              <dgm:ruleLst>
+                <dgm:rule type="primFontSz" val="5" fact="NaN" max="NaN"/>
+              </dgm:ruleLst>
+            </dgm:layoutNode>
+            <dgm:layoutNode name="TwoNodes_1_text">
+              <dgm:varLst>
+                <dgm:bulletEnabled val="1"/>
+              </dgm:varLst>
+              <dgm:alg type="tx">
+                <dgm:param type="parTxLTRAlign" val="l"/>
+                <dgm:param type="txAnchorVertCh" val="mid"/>
+              </dgm:alg>
+              <dgm:shape xmlns:r="http://schemas.openxmlformats.org/officeDocument/2006/relationships" type="roundRect" r:blip="" hideGeom="1">
+                <dgm:adjLst>
+                  <dgm:adj idx="1" val="0.1"/>
+                </dgm:adjLst>
+              </dgm:shape>
+              <dgm:presOf axis="ch desOrSelf" ptType="node node" st="1 1" cnt="1 0"/>
+              <dgm:constrLst>
+                <dgm:constr type="lMarg" refType="primFontSz" fact="0.3"/>
+                <dgm:constr type="rMarg" refType="primFontSz" fact="0.3"/>
+                <dgm:constr type="tMarg" refType="primFontSz" fact="0.3"/>
+                <dgm:constr type="bMarg" refType="primFontSz" fact="0.3"/>
+              </dgm:constrLst>
+              <dgm:ruleLst>
+                <dgm:rule type="primFontSz" val="5" fact="NaN" max="NaN"/>
+              </dgm:ruleLst>
+            </dgm:layoutNode>
+            <dgm:layoutNode name="TwoNodes_2_text">
+              <dgm:varLst>
+                <dgm:bulletEnabled val="1"/>
+              </dgm:varLst>
+              <dgm:alg type="tx">
+                <dgm:param type="parTxLTRAlign" val="l"/>
+                <dgm:param type="txAnchorVertCh" val="mid"/>
+              </dgm:alg>
+              <dgm:shape xmlns:r="http://schemas.openxmlformats.org/officeDocument/2006/relationships" type="roundRect" r:blip="" hideGeom="1">
+                <dgm:adjLst>
+                  <dgm:adj idx="1" val="0.1"/>
+                </dgm:adjLst>
+              </dgm:shape>
+              <dgm:presOf axis="ch desOrSelf" ptType="node node" st="2 1" cnt="1 0"/>
+              <dgm:constrLst>
+                <dgm:constr type="lMarg" refType="primFontSz" fact="0.3"/>
+                <dgm:constr type="rMarg" refType="primFontSz" fact="0.3"/>
+                <dgm:constr type="tMarg" refType="primFontSz" fact="0.3"/>
+                <dgm:constr type="bMarg" refType="primFontSz" fact="0.3"/>
+              </dgm:constrLst>
+              <dgm:ruleLst>
+                <dgm:rule type="primFontSz" val="5" fact="NaN" max="NaN"/>
+              </dgm:ruleLst>
+            </dgm:layoutNode>
+          </dgm:if>
+          <dgm:else name="Name8">
+            <dgm:choose name="Name9">
+              <dgm:if name="Name10" axis="ch" ptType="node" func="cnt" op="equ" val="3">
+                <dgm:layoutNode name="ThreeNodes_1">
+                  <dgm:varLst>
+                    <dgm:bulletEnabled val="1"/>
+                  </dgm:varLst>
+                  <dgm:alg type="sp"/>
+                  <dgm:shape xmlns:r="http://schemas.openxmlformats.org/officeDocument/2006/relationships" type="roundRect" r:blip="">
+                    <dgm:adjLst>
+                      <dgm:adj idx="1" val="0.1"/>
+                    </dgm:adjLst>
+                  </dgm:shape>
+                  <dgm:presOf axis="ch desOrSelf" ptType="node node" st="1 1" cnt="1 0"/>
+                  <dgm:constrLst/>
+                  <dgm:ruleLst/>
+                </dgm:layoutNode>
+                <dgm:layoutNode name="ThreeNodes_2">
+                  <dgm:varLst>
+                    <dgm:bulletEnabled val="1"/>
+                  </dgm:varLst>
+                  <dgm:alg type="sp"/>
+                  <dgm:shape xmlns:r="http://schemas.openxmlformats.org/officeDocument/2006/relationships" type="roundRect" r:blip="">
+                    <dgm:adjLst>
+                      <dgm:adj idx="1" val="0.1"/>
+                    </dgm:adjLst>
+                  </dgm:shape>
+                  <dgm:presOf axis="ch desOrSelf" ptType="node node" st="2 1" cnt="1 0"/>
+                  <dgm:constrLst/>
+                  <dgm:ruleLst/>
+                </dgm:layoutNode>
+                <dgm:layoutNode name="ThreeNodes_3">
+                  <dgm:varLst>
+                    <dgm:bulletEnabled val="1"/>
+                  </dgm:varLst>
+                  <dgm:alg type="sp"/>
+                  <dgm:shape xmlns:r="http://schemas.openxmlformats.org/officeDocument/2006/relationships" type="roundRect" r:blip="">
+                    <dgm:adjLst>
+                      <dgm:adj idx="1" val="0.1"/>
+                    </dgm:adjLst>
+                  </dgm:shape>
+                  <dgm:presOf axis="ch desOrSelf" ptType="node node" st="3 1" cnt="1 0"/>
+                  <dgm:constrLst/>
+                  <dgm:ruleLst/>
+                </dgm:layoutNode>
+                <dgm:layoutNode name="ThreeConn_1-2" styleLbl="fgAccFollowNode1">
+                  <dgm:varLst>
+                    <dgm:bulletEnabled val="1"/>
+                  </dgm:varLst>
+                  <dgm:alg type="tx"/>
+                  <dgm:shape xmlns:r="http://schemas.openxmlformats.org/officeDocument/2006/relationships" type="downArrow" r:blip="">
+                    <dgm:adjLst>
+                      <dgm:adj idx="1" val="0.55"/>
+                      <dgm:adj idx="2" val="0.45"/>
+                    </dgm:adjLst>
+                  </dgm:shape>
+                  <dgm:presOf axis="ch" ptType="sibTrans" cnt="1"/>
+                  <dgm:constrLst>
+                    <dgm:constr type="lMarg" refType="primFontSz" fact="0.1"/>
+                    <dgm:constr type="rMarg" refType="primFontSz" fact="0.1"/>
+                    <dgm:constr type="tMarg" refType="primFontSz" fact="0.1"/>
+                    <dgm:constr type="bMarg" refType="primFontSz" fact="0.1"/>
+                  </dgm:constrLst>
+                  <dgm:ruleLst>
+                    <dgm:rule type="primFontSz" val="5" fact="NaN" max="NaN"/>
+                  </dgm:ruleLst>
+                </dgm:layoutNode>
+                <dgm:layoutNode name="ThreeConn_2-3" styleLbl="fgAccFollowNode1">
+                  <dgm:varLst>
+                    <dgm:bulletEnabled val="1"/>
+                  </dgm:varLst>
+                  <dgm:alg type="tx"/>
+                  <dgm:shape xmlns:r="http://schemas.openxmlformats.org/officeDocument/2006/relationships" type="downArrow" r:blip="">
+                    <dgm:adjLst>
+                      <dgm:adj idx="1" val="0.55"/>
+                      <dgm:adj idx="2" val="0.45"/>
+                    </dgm:adjLst>
+                  </dgm:shape>
+                  <dgm:presOf axis="ch" ptType="sibTrans" st="2" cnt="1"/>
+                  <dgm:constrLst>
+                    <dgm:constr type="lMarg" refType="primFontSz" fact="0.1"/>
+                    <dgm:constr type="rMarg" refType="primFontSz" fact="0.1"/>
+                    <dgm:constr type="tMarg" refType="primFontSz" fact="0.1"/>
+                    <dgm:constr type="bMarg" refType="primFontSz" fact="0.1"/>
+                  </dgm:constrLst>
+                  <dgm:ruleLst>
+                    <dgm:rule type="primFontSz" val="5" fact="NaN" max="NaN"/>
+                  </dgm:ruleLst>
+                </dgm:layoutNode>
+                <dgm:layoutNode name="ThreeNodes_1_text">
+                  <dgm:varLst>
+                    <dgm:bulletEnabled val="1"/>
+                  </dgm:varLst>
+                  <dgm:alg type="tx">
+                    <dgm:param type="parTxLTRAlign" val="l"/>
+                    <dgm:param type="txAnchorVertCh" val="mid"/>
+                  </dgm:alg>
+                  <dgm:shape xmlns:r="http://schemas.openxmlformats.org/officeDocument/2006/relationships" type="roundRect" r:blip="" hideGeom="1">
+                    <dgm:adjLst>
+                      <dgm:adj idx="1" val="0.1"/>
+                    </dgm:adjLst>
+                  </dgm:shape>
+                  <dgm:presOf axis="ch desOrSelf" ptType="node node" st="1 1" cnt="1 0"/>
+                  <dgm:constrLst>
+                    <dgm:constr type="lMarg" refType="primFontSz" fact="0.3"/>
+                    <dgm:constr type="rMarg" refType="primFontSz" fact="0.3"/>
+                    <dgm:constr type="tMarg" refType="primFontSz" fact="0.3"/>
+                    <dgm:constr type="bMarg" refType="primFontSz" fact="0.3"/>
+                  </dgm:constrLst>
+                  <dgm:ruleLst>
+                    <dgm:rule type="primFontSz" val="5" fact="NaN" max="NaN"/>
+                  </dgm:ruleLst>
+                </dgm:layoutNode>
+                <dgm:layoutNode name="ThreeNodes_2_text">
+                  <dgm:varLst>
+                    <dgm:bulletEnabled val="1"/>
+                  </dgm:varLst>
+                  <dgm:alg type="tx">
+                    <dgm:param type="parTxLTRAlign" val="l"/>
+                    <dgm:param type="txAnchorVertCh" val="mid"/>
+                  </dgm:alg>
+                  <dgm:shape xmlns:r="http://schemas.openxmlformats.org/officeDocument/2006/relationships" type="roundRect" r:blip="" hideGeom="1">
+                    <dgm:adjLst>
+                      <dgm:adj idx="1" val="0.1"/>
+                    </dgm:adjLst>
+                  </dgm:shape>
+                  <dgm:presOf axis="ch desOrSelf" ptType="node node" st="2 1" cnt="1 0"/>
+                  <dgm:constrLst>
+                    <dgm:constr type="lMarg" refType="primFontSz" fact="0.3"/>
+                    <dgm:constr type="rMarg" refType="primFontSz" fact="0.3"/>
+                    <dgm:constr type="tMarg" refType="primFontSz" fact="0.3"/>
+                    <dgm:constr type="bMarg" refType="primFontSz" fact="0.3"/>
+                  </dgm:constrLst>
+                  <dgm:ruleLst>
+                    <dgm:rule type="primFontSz" val="5" fact="NaN" max="NaN"/>
+                  </dgm:ruleLst>
+                </dgm:layoutNode>
+                <dgm:layoutNode name="ThreeNodes_3_text">
+                  <dgm:varLst>
+                    <dgm:bulletEnabled val="1"/>
+                  </dgm:varLst>
+                  <dgm:alg type="tx">
+                    <dgm:param type="parTxLTRAlign" val="l"/>
+                    <dgm:param type="txAnchorVertCh" val="mid"/>
+                  </dgm:alg>
+                  <dgm:shape xmlns:r="http://schemas.openxmlformats.org/officeDocument/2006/relationships" type="roundRect" r:blip="" hideGeom="1">
+                    <dgm:adjLst>
+                      <dgm:adj idx="1" val="0.1"/>
+                    </dgm:adjLst>
+                  </dgm:shape>
+                  <dgm:presOf axis="ch desOrSelf" ptType="node node" st="3 1" cnt="1 0"/>
+                  <dgm:constrLst>
+                    <dgm:constr type="lMarg" refType="primFontSz" fact="0.3"/>
+                    <dgm:constr type="rMarg" refType="primFontSz" fact="0.3"/>
+                    <dgm:constr type="tMarg" refType="primFontSz" fact="0.3"/>
+                    <dgm:constr type="bMarg" refType="primFontSz" fact="0.3"/>
+                  </dgm:constrLst>
+                  <dgm:ruleLst>
+                    <dgm:rule type="primFontSz" val="5" fact="NaN" max="NaN"/>
+                  </dgm:ruleLst>
+                </dgm:layoutNode>
               </dgm:if>
-              <dgm:else name="Name9">
-                <dgm:alg type="tx">
-                  <dgm:param type="txAnchorVert" val="mid"/>
-                  <dgm:param type="parTxLTRAlign" val="r"/>
-                  <dgm:param type="shpTxLTRAlignCh" val="r"/>
-                  <dgm:param type="parTxRTLAlign" val="r"/>
-                  <dgm:param type="shpTxRTLAlignCh" val="r"/>
-                </dgm:alg>
+              <dgm:else name="Name11">
+                <dgm:choose name="Name12">
+                  <dgm:if name="Name13" axis="ch" ptType="node" func="cnt" op="equ" val="4">
+                    <dgm:layoutNode name="FourNodes_1">
+                      <dgm:varLst>
+                        <dgm:bulletEnabled val="1"/>
+                      </dgm:varLst>
+                      <dgm:alg type="sp"/>
+                      <dgm:shape xmlns:r="http://schemas.openxmlformats.org/officeDocument/2006/relationships" type="roundRect" r:blip="">
+                        <dgm:adjLst>
+                          <dgm:adj idx="1" val="0.1"/>
+                        </dgm:adjLst>
+                      </dgm:shape>
+                      <dgm:presOf axis="ch desOrSelf" ptType="node node" st="1 1" cnt="1 0"/>
+                      <dgm:constrLst/>
+                      <dgm:ruleLst/>
+                    </dgm:layoutNode>
+                    <dgm:layoutNode name="FourNodes_2">
+                      <dgm:varLst>
+                        <dgm:bulletEnabled val="1"/>
+                      </dgm:varLst>
+                      <dgm:alg type="sp"/>
+                      <dgm:shape xmlns:r="http://schemas.openxmlformats.org/officeDocument/2006/relationships" type="roundRect" r:blip="">
+                        <dgm:adjLst>
+                          <dgm:adj idx="1" val="0.1"/>
+                        </dgm:adjLst>
+                      </dgm:shape>
+                      <dgm:presOf axis="ch desOrSelf" ptType="node node" st="2 1" cnt="1 0"/>
+                      <dgm:constrLst/>
+                      <dgm:ruleLst/>
+                    </dgm:layoutNode>
+                    <dgm:layoutNode name="FourNodes_3">
+                      <dgm:varLst>
+                        <dgm:bulletEnabled val="1"/>
+                      </dgm:varLst>
+                      <dgm:alg type="sp"/>
+                      <dgm:shape xmlns:r="http://schemas.openxmlformats.org/officeDocument/2006/relationships" type="roundRect" r:blip="">
+                        <dgm:adjLst>
+                          <dgm:adj idx="1" val="0.1"/>
+                        </dgm:adjLst>
+                      </dgm:shape>
+                      <dgm:presOf axis="ch desOrSelf" ptType="node node" st="3 1" cnt="1 0"/>
+                      <dgm:constrLst/>
+                      <dgm:ruleLst/>
+                    </dgm:layoutNode>
+                    <dgm:layoutNode name="FourNodes_4">
+                      <dgm:varLst>
+                        <dgm:bulletEnabled val="1"/>
+                      </dgm:varLst>
+                      <dgm:alg type="sp"/>
+                      <dgm:shape xmlns:r="http://schemas.openxmlformats.org/officeDocument/2006/relationships" type="roundRect" r:blip="">
+                        <dgm:adjLst>
+                          <dgm:adj idx="1" val="0.1"/>
+                        </dgm:adjLst>
+                      </dgm:shape>
+                      <dgm:presOf axis="ch desOrSelf" ptType="node node" st="4 1" cnt="1 0"/>
+                      <dgm:constrLst/>
+                      <dgm:ruleLst/>
+                    </dgm:layoutNode>
+                    <dgm:layoutNode name="FourConn_1-2" styleLbl="fgAccFollowNode1">
+                      <dgm:varLst>
+                        <dgm:bulletEnabled val="1"/>
+                      </dgm:varLst>
+                      <dgm:alg type="tx"/>
+                      <dgm:shape xmlns:r="http://schemas.openxmlformats.org/officeDocument/2006/relationships" type="downArrow" r:blip="">
+                        <dgm:adjLst>
+                          <dgm:adj idx="1" val="0.55"/>
+                          <dgm:adj idx="2" val="0.45"/>
+                        </dgm:adjLst>
+                      </dgm:shape>
+                      <dgm:presOf axis="ch" ptType="sibTrans" cnt="1"/>
+                      <dgm:constrLst>
+                        <dgm:constr type="lMarg" refType="primFontSz" fact="0.1"/>
+                        <dgm:constr type="rMarg" refType="primFontSz" fact="0.1"/>
+                        <dgm:constr type="tMarg" refType="primFontSz" fact="0.1"/>
+                        <dgm:constr type="bMarg" refType="primFontSz" fact="0.1"/>
+                      </dgm:constrLst>
+                      <dgm:ruleLst>
+                        <dgm:rule type="primFontSz" val="5" fact="NaN" max="NaN"/>
+                      </dgm:ruleLst>
+                    </dgm:layoutNode>
+                    <dgm:layoutNode name="FourConn_2-3" styleLbl="fgAccFollowNode1">
+                      <dgm:varLst>
+                        <dgm:bulletEnabled val="1"/>
+                      </dgm:varLst>
+                      <dgm:alg type="tx"/>
+                      <dgm:shape xmlns:r="http://schemas.openxmlformats.org/officeDocument/2006/relationships" type="downArrow" r:blip="">
+                        <dgm:adjLst>
+                          <dgm:adj idx="1" val="0.55"/>
+                          <dgm:adj idx="2" val="0.45"/>
+                        </dgm:adjLst>
+                      </dgm:shape>
+                      <dgm:presOf axis="ch" ptType="sibTrans" st="2" cnt="1"/>
+                      <dgm:constrLst>
+                        <dgm:constr type="lMarg" refType="primFontSz" fact="0.1"/>
+                        <dgm:constr type="rMarg" refType="primFontSz" fact="0.1"/>
+                        <dgm:constr type="tMarg" refType="primFontSz" fact="0.1"/>
+                        <dgm:constr type="bMarg" refType="primFontSz" fact="0.1"/>
+                      </dgm:constrLst>
+                      <dgm:ruleLst>
+                        <dgm:rule type="primFontSz" val="5" fact="NaN" max="NaN"/>
+                      </dgm:ruleLst>
+                    </dgm:layoutNode>
+                    <dgm:layoutNode name="FourConn_3-4" styleLbl="fgAccFollowNode1">
+                      <dgm:varLst>
+                        <dgm:bulletEnabled val="1"/>
+                      </dgm:varLst>
+                      <dgm:alg type="tx"/>
+                      <dgm:shape xmlns:r="http://schemas.openxmlformats.org/officeDocument/2006/relationships" type="downArrow" r:blip="">
+                        <dgm:adjLst>
+                          <dgm:adj idx="1" val="0.55"/>
+                          <dgm:adj idx="2" val="0.45"/>
+                        </dgm:adjLst>
+                      </dgm:shape>
+                      <dgm:presOf axis="ch" ptType="sibTrans" st="3" cnt="1"/>
+                      <dgm:constrLst>
+                        <dgm:constr type="lMarg" refType="primFontSz" fact="0.1"/>
+                        <dgm:constr type="rMarg" refType="primFontSz" fact="0.1"/>
+                        <dgm:constr type="tMarg" refType="primFontSz" fact="0.1"/>
+                        <dgm:constr type="bMarg" refType="primFontSz" fact="0.1"/>
+                      </dgm:constrLst>
+                      <dgm:ruleLst>
+                        <dgm:rule type="primFontSz" val="5" fact="NaN" max="NaN"/>
+                      </dgm:ruleLst>
+                    </dgm:layoutNode>
+                    <dgm:layoutNode name="FourNodes_1_text">
+                      <dgm:varLst>
+                        <dgm:bulletEnabled val="1"/>
+                      </dgm:varLst>
+                      <dgm:alg type="tx">
+                        <dgm:param type="parTxLTRAlign" val="l"/>
+                        <dgm:param type="txAnchorVertCh" val="mid"/>
+                      </dgm:alg>
+                      <dgm:shape xmlns:r="http://schemas.openxmlformats.org/officeDocument/2006/relationships" type="roundRect" r:blip="" hideGeom="1">
+                        <dgm:adjLst>
+                          <dgm:adj idx="1" val="0.1"/>
+                        </dgm:adjLst>
+                      </dgm:shape>
+                      <dgm:presOf axis="ch desOrSelf" ptType="node node" st="1 1" cnt="1 0"/>
+                      <dgm:constrLst>
+                        <dgm:constr type="lMarg" refType="primFontSz" fact="0.3"/>
+                        <dgm:constr type="rMarg" refType="primFontSz" fact="0.3"/>
+                        <dgm:constr type="tMarg" refType="primFontSz" fact="0.3"/>
+                        <dgm:constr type="bMarg" refType="primFontSz" fact="0.3"/>
+                      </dgm:constrLst>
+                      <dgm:ruleLst>
+                        <dgm:rule type="primFontSz" val="5" fact="NaN" max="NaN"/>
+                      </dgm:ruleLst>
+                    </dgm:layoutNode>
+                    <dgm:layoutNode name="FourNodes_2_text">
+                      <dgm:varLst>
+                        <dgm:bulletEnabled val="1"/>
+                      </dgm:varLst>
+                      <dgm:alg type="tx">
+                        <dgm:param type="parTxLTRAlign" val="l"/>
+                        <dgm:param type="txAnchorVertCh" val="mid"/>
+                      </dgm:alg>
+                      <dgm:shape xmlns:r="http://schemas.openxmlformats.org/officeDocument/2006/relationships" type="roundRect" r:blip="" hideGeom="1">
+                        <dgm:adjLst>
+                          <dgm:adj idx="1" val="0.1"/>
+                        </dgm:adjLst>
+                      </dgm:shape>
+                      <dgm:presOf axis="ch desOrSelf" ptType="node node" st="2 1" cnt="1 0"/>
+                      <dgm:constrLst>
+                        <dgm:constr type="lMarg" refType="primFontSz" fact="0.3"/>
+                        <dgm:constr type="rMarg" refType="primFontSz" fact="0.3"/>
+                        <dgm:constr type="tMarg" refType="primFontSz" fact="0.3"/>
+                        <dgm:constr type="bMarg" refType="primFontSz" fact="0.3"/>
+                      </dgm:constrLst>
+                      <dgm:ruleLst>
+                        <dgm:rule type="primFontSz" val="5" fact="NaN" max="NaN"/>
+                      </dgm:ruleLst>
+                    </dgm:layoutNode>
+                    <dgm:layoutNode name="FourNodes_3_text">
+                      <dgm:varLst>
+                        <dgm:bulletEnabled val="1"/>
+                      </dgm:varLst>
+                      <dgm:alg type="tx">
+                        <dgm:param type="parTxLTRAlign" val="l"/>
+                        <dgm:param type="txAnchorVertCh" val="mid"/>
+                      </dgm:alg>
+                      <dgm:shape xmlns:r="http://schemas.openxmlformats.org/officeDocument/2006/relationships" type="roundRect" r:blip="" hideGeom="1">
+                        <dgm:adjLst>
+                          <dgm:adj idx="1" val="0.1"/>
+                        </dgm:adjLst>
+                      </dgm:shape>
+                      <dgm:presOf axis="ch desOrSelf" ptType="node node" st="3 1" cnt="1 0"/>
+                      <dgm:constrLst>
+                        <dgm:constr type="lMarg" refType="primFontSz" fact="0.3"/>
+                        <dgm:constr type="rMarg" refType="primFontSz" fact="0.3"/>
+                        <dgm:constr type="tMarg" refType="primFontSz" fact="0.3"/>
+                        <dgm:constr type="bMarg" refType="primFontSz" fact="0.3"/>
+                      </dgm:constrLst>
+                      <dgm:ruleLst>
+                        <dgm:rule type="primFontSz" val="5" fact="NaN" max="NaN"/>
+                      </dgm:ruleLst>
+                    </dgm:layoutNode>
+                    <dgm:layoutNode name="FourNodes_4_text">
+                      <dgm:varLst>
+                        <dgm:bulletEnabled val="1"/>
+                      </dgm:varLst>
+                      <dgm:alg type="tx">
+                        <dgm:param type="parTxLTRAlign" val="l"/>
+                        <dgm:param type="txAnchorVertCh" val="mid"/>
+                      </dgm:alg>
+                      <dgm:shape xmlns:r="http://schemas.openxmlformats.org/officeDocument/2006/relationships" type="roundRect" r:blip="" hideGeom="1">
+                        <dgm:adjLst>
+                          <dgm:adj idx="1" val="0.1"/>
+                        </dgm:adjLst>
+                      </dgm:shape>
+                      <dgm:presOf axis="ch desOrSelf" ptType="node node" st="4 1" cnt="1 0"/>
+                      <dgm:constrLst>
+                        <dgm:constr type="lMarg" refType="primFontSz" fact="0.3"/>
+                        <dgm:constr type="rMarg" refType="primFontSz" fact="0.3"/>
+                        <dgm:constr type="tMarg" refType="primFontSz" fact="0.3"/>
+                        <dgm:constr type="bMarg" refType="primFontSz" fact="0.3"/>
+                      </dgm:constrLst>
+                      <dgm:ruleLst>
+                        <dgm:rule type="primFontSz" val="5" fact="NaN" max="NaN"/>
+                      </dgm:ruleLst>
+                    </dgm:layoutNode>
+                  </dgm:if>
+                  <dgm:else name="Name14">
+                    <dgm:choose name="Name15">
+                      <dgm:if name="Name16" axis="ch" ptType="node" func="cnt" op="gte" val="5">
+                        <dgm:layoutNode name="FiveNodes_1">
+                          <dgm:varLst>
+                            <dgm:bulletEnabled val="1"/>
+                          </dgm:varLst>
+                          <dgm:alg type="sp"/>
+                          <dgm:shape xmlns:r="http://schemas.openxmlformats.org/officeDocument/2006/relationships" type="roundRect" r:blip="">
+                            <dgm:adjLst>
+                              <dgm:adj idx="1" val="0.1"/>
+                            </dgm:adjLst>
+                          </dgm:shape>
+                          <dgm:presOf axis="ch desOrSelf" ptType="node node" st="1 1" cnt="1 0"/>
+                          <dgm:constrLst/>
+                          <dgm:ruleLst/>
+                        </dgm:layoutNode>
+                        <dgm:layoutNode name="FiveNodes_2">
+                          <dgm:varLst>
+                            <dgm:bulletEnabled val="1"/>
+                          </dgm:varLst>
+                          <dgm:alg type="sp"/>
+                          <dgm:shape xmlns:r="http://schemas.openxmlformats.org/officeDocument/2006/relationships" type="roundRect" r:blip="">
+                            <dgm:adjLst>
+                              <dgm:adj idx="1" val="0.1"/>
+                            </dgm:adjLst>
+                          </dgm:shape>
+                          <dgm:presOf axis="ch desOrSelf" ptType="node node" st="2 1" cnt="1 0"/>
+                          <dgm:constrLst/>
+                          <dgm:ruleLst/>
+                        </dgm:layoutNode>
+                        <dgm:layoutNode name="FiveNodes_3">
+                          <dgm:varLst>
+                            <dgm:bulletEnabled val="1"/>
+                          </dgm:varLst>
+                          <dgm:alg type="sp"/>
+                          <dgm:shape xmlns:r="http://schemas.openxmlformats.org/officeDocument/2006/relationships" type="roundRect" r:blip="">
+                            <dgm:adjLst>
+                              <dgm:adj idx="1" val="0.1"/>
+                            </dgm:adjLst>
+                          </dgm:shape>
+                          <dgm:presOf axis="ch desOrSelf" ptType="node node" st="3 1" cnt="1 0"/>
+                          <dgm:constrLst/>
+                          <dgm:ruleLst/>
+                        </dgm:layoutNode>
+                        <dgm:layoutNode name="FiveNodes_4">
+                          <dgm:varLst>
+                            <dgm:bulletEnabled val="1"/>
+                          </dgm:varLst>
+                          <dgm:alg type="sp"/>
+                          <dgm:shape xmlns:r="http://schemas.openxmlformats.org/officeDocument/2006/relationships" type="roundRect" r:blip="">
+                            <dgm:adjLst>
+                              <dgm:adj idx="1" val="0.1"/>
+                            </dgm:adjLst>
+                          </dgm:shape>
+                          <dgm:presOf axis="ch desOrSelf" ptType="node node" st="4 1" cnt="1 0"/>
+                          <dgm:constrLst/>
+                          <dgm:ruleLst/>
+                        </dgm:layoutNode>
+                        <dgm:layoutNode name="FiveNodes_5">
+                          <dgm:varLst>
+                            <dgm:bulletEnabled val="1"/>
+                          </dgm:varLst>
+                          <dgm:alg type="sp"/>
+                          <dgm:shape xmlns:r="http://schemas.openxmlformats.org/officeDocument/2006/relationships" type="roundRect" r:blip="">
+                            <dgm:adjLst>
+                              <dgm:adj idx="1" val="0.1"/>
+                            </dgm:adjLst>
+                          </dgm:shape>
+                          <dgm:presOf axis="ch desOrSelf" ptType="node node" st="5 1" cnt="1 0"/>
+                          <dgm:constrLst/>
+                          <dgm:ruleLst/>
+                        </dgm:layoutNode>
+                        <dgm:layoutNode name="FiveConn_1-2" styleLbl="fgAccFollowNode1">
+                          <dgm:varLst>
+                            <dgm:bulletEnabled val="1"/>
+                          </dgm:varLst>
+                          <dgm:alg type="tx"/>
+                          <dgm:shape xmlns:r="http://schemas.openxmlformats.org/officeDocument/2006/relationships" type="downArrow" r:blip="">
+                            <dgm:adjLst>
+                              <dgm:adj idx="1" val="0.55"/>
+                              <dgm:adj idx="2" val="0.45"/>
+                            </dgm:adjLst>
+                          </dgm:shape>
+                          <dgm:presOf axis="ch" ptType="sibTrans" cnt="1"/>
+                          <dgm:constrLst>
+                            <dgm:constr type="lMarg" refType="primFontSz" fact="0.1"/>
+                            <dgm:constr type="rMarg" refType="primFontSz" fact="0.1"/>
+                            <dgm:constr type="tMarg" refType="primFontSz" fact="0.1"/>
+                            <dgm:constr type="bMarg" refType="primFontSz" fact="0.1"/>
+                          </dgm:constrLst>
+                          <dgm:ruleLst>
+                            <dgm:rule type="primFontSz" val="5" fact="NaN" max="NaN"/>
+                          </dgm:ruleLst>
+                        </dgm:layoutNode>
+                        <dgm:layoutNode name="FiveConn_2-3" styleLbl="fgAccFollowNode1">
+                          <dgm:varLst>
+                            <dgm:bulletEnabled val="1"/>
+                          </dgm:varLst>
+                          <dgm:alg type="tx"/>
+                          <dgm:shape xmlns:r="http://schemas.openxmlformats.org/officeDocument/2006/relationships" type="downArrow" r:blip="">
+                            <dgm:adjLst>
+                              <dgm:adj idx="1" val="0.55"/>
+                              <dgm:adj idx="2" val="0.45"/>
+                            </dgm:adjLst>
+                          </dgm:shape>
+                          <dgm:presOf axis="ch" ptType="sibTrans" st="2" cnt="1"/>
+                          <dgm:constrLst>
+                            <dgm:constr type="lMarg" refType="primFontSz" fact="0.1"/>
+                            <dgm:constr type="rMarg" refType="primFontSz" fact="0.1"/>
+                            <dgm:constr type="tMarg" refType="primFontSz" fact="0.1"/>
+                            <dgm:constr type="bMarg" refType="primFontSz" fact="0.1"/>
+                          </dgm:constrLst>
+                          <dgm:ruleLst>
+                            <dgm:rule type="primFontSz" val="5" fact="NaN" max="NaN"/>
+                          </dgm:ruleLst>
+                        </dgm:layoutNode>
+                        <dgm:layoutNode name="FiveConn_3-4" styleLbl="fgAccFollowNode1">
+                          <dgm:varLst>
+                            <dgm:bulletEnabled val="1"/>
+                          </dgm:varLst>
+                          <dgm:alg type="tx"/>
+                          <dgm:shape xmlns:r="http://schemas.openxmlformats.org/officeDocument/2006/relationships" type="downArrow" r:blip="">
+                            <dgm:adjLst>
+                              <dgm:adj idx="1" val="0.55"/>
+                              <dgm:adj idx="2" val="0.45"/>
+                            </dgm:adjLst>
+                          </dgm:shape>
+                          <dgm:presOf axis="ch" ptType="sibTrans" st="3" cnt="1"/>
+                          <dgm:constrLst>
+                            <dgm:constr type="lMarg" refType="primFontSz" fact="0.1"/>
+                            <dgm:constr type="rMarg" refType="primFontSz" fact="0.1"/>
+                            <dgm:constr type="tMarg" refType="primFontSz" fact="0.1"/>
+                            <dgm:constr type="bMarg" refType="primFontSz" fact="0.1"/>
+                          </dgm:constrLst>
+                          <dgm:ruleLst>
+                            <dgm:rule type="primFontSz" val="5" fact="NaN" max="NaN"/>
+                          </dgm:ruleLst>
+                        </dgm:layoutNode>
+                        <dgm:layoutNode name="FiveConn_4-5" styleLbl="fgAccFollowNode1">
+                          <dgm:varLst>
+                            <dgm:bulletEnabled val="1"/>
+                          </dgm:varLst>
+                          <dgm:alg type="tx"/>
+                          <dgm:shape xmlns:r="http://schemas.openxmlformats.org/officeDocument/2006/relationships" type="downArrow" r:blip="">
+                            <dgm:adjLst>
+                              <dgm:adj idx="1" val="0.55"/>
+                              <dgm:adj idx="2" val="0.45"/>
+                            </dgm:adjLst>
+                          </dgm:shape>
+                          <dgm:presOf axis="ch" ptType="sibTrans" st="4" cnt="1"/>
+                          <dgm:constrLst>
+                            <dgm:constr type="lMarg" refType="primFontSz" fact="0.1"/>
+                            <dgm:constr type="rMarg" refType="primFontSz" fact="0.1"/>
+                            <dgm:constr type="tMarg" refType="primFontSz" fact="0.1"/>
+                            <dgm:constr type="bMarg" refType="primFontSz" fact="0.1"/>
+                          </dgm:constrLst>
+                          <dgm:ruleLst>
+                            <dgm:rule type="primFontSz" val="5" fact="NaN" max="NaN"/>
+                          </dgm:ruleLst>
+                        </dgm:layoutNode>
+                        <dgm:layoutNode name="FiveNodes_1_text">
+                          <dgm:varLst>
+                            <dgm:bulletEnabled val="1"/>
+                          </dgm:varLst>
+                          <dgm:alg type="tx">
+                            <dgm:param type="parTxLTRAlign" val="l"/>
+                            <dgm:param type="txAnchorVertCh" val="mid"/>
+                          </dgm:alg>
+                          <dgm:shape xmlns:r="http://schemas.openxmlformats.org/officeDocument/2006/relationships" type="roundRect" r:blip="" hideGeom="1">
+                            <dgm:adjLst>
+                              <dgm:adj idx="1" val="0.1"/>
+                            </dgm:adjLst>
+                          </dgm:shape>
+                          <dgm:presOf axis="ch desOrSelf" ptType="node node" st="1 1" cnt="1 0"/>
+                          <dgm:constrLst>
+                            <dgm:constr type="lMarg" refType="primFontSz" fact="0.3"/>
+                            <dgm:constr type="rMarg" refType="primFontSz" fact="0.3"/>
+                            <dgm:constr type="tMarg" refType="primFontSz" fact="0.3"/>
+                            <dgm:constr type="bMarg" refType="primFontSz" fact="0.3"/>
+                          </dgm:constrLst>
+                          <dgm:ruleLst>
+                            <dgm:rule type="primFontSz" val="5" fact="NaN" max="NaN"/>
+                          </dgm:ruleLst>
+                        </dgm:layoutNode>
+                        <dgm:layoutNode name="FiveNodes_2_text">
+                          <dgm:varLst>
+                            <dgm:bulletEnabled val="1"/>
+                          </dgm:varLst>
+                          <dgm:alg type="tx">
+                            <dgm:param type="parTxLTRAlign" val="l"/>
+                            <dgm:param type="txAnchorVertCh" val="mid"/>
+                          </dgm:alg>
+                          <dgm:shape xmlns:r="http://schemas.openxmlformats.org/officeDocument/2006/relationships" type="roundRect" r:blip="" hideGeom="1">
+                            <dgm:adjLst>
+                              <dgm:adj idx="1" val="0.1"/>
+                            </dgm:adjLst>
+                          </dgm:shape>
+                          <dgm:presOf axis="ch desOrSelf" ptType="node node" st="2 1" cnt="1 0"/>
+                          <dgm:constrLst>
+                            <dgm:constr type="lMarg" refType="primFontSz" fact="0.3"/>
+                            <dgm:constr type="rMarg" refType="primFontSz" fact="0.3"/>
+                            <dgm:constr type="tMarg" refType="primFontSz" fact="0.3"/>
+                            <dgm:constr type="bMarg" refType="primFontSz" fact="0.3"/>
+                          </dgm:constrLst>
+                          <dgm:ruleLst>
+                            <dgm:rule type="primFontSz" val="5" fact="NaN" max="NaN"/>
+                          </dgm:ruleLst>
+                        </dgm:layoutNode>
+                        <dgm:layoutNode name="FiveNodes_3_text">
+                          <dgm:varLst>
+                            <dgm:bulletEnabled val="1"/>
+                          </dgm:varLst>
+                          <dgm:alg type="tx">
+                            <dgm:param type="parTxLTRAlign" val="l"/>
+                            <dgm:param type="txAnchorVertCh" val="mid"/>
+                          </dgm:alg>
+                          <dgm:shape xmlns:r="http://schemas.openxmlformats.org/officeDocument/2006/relationships" type="roundRect" r:blip="" hideGeom="1">
+                            <dgm:adjLst>
+                              <dgm:adj idx="1" val="0.1"/>
+                            </dgm:adjLst>
+                          </dgm:shape>
+                          <dgm:presOf axis="ch desOrSelf" ptType="node node" st="3 1" cnt="1 0"/>
+                          <dgm:constrLst>
+                            <dgm:constr type="lMarg" refType="primFontSz" fact="0.3"/>
+                            <dgm:constr type="rMarg" refType="primFontSz" fact="0.3"/>
+                            <dgm:constr type="tMarg" refType="primFontSz" fact="0.3"/>
+                            <dgm:constr type="bMarg" refType="primFontSz" fact="0.3"/>
+                          </dgm:constrLst>
+                          <dgm:ruleLst>
+                            <dgm:rule type="primFontSz" val="5" fact="NaN" max="NaN"/>
+                          </dgm:ruleLst>
+                        </dgm:layoutNode>
+                        <dgm:layoutNode name="FiveNodes_4_text">
+                          <dgm:varLst>
+                            <dgm:bulletEnabled val="1"/>
+                          </dgm:varLst>
+                          <dgm:alg type="tx">
+                            <dgm:param type="parTxLTRAlign" val="l"/>
+                            <dgm:param type="txAnchorVertCh" val="mid"/>
+                          </dgm:alg>
+                          <dgm:shape xmlns:r="http://schemas.openxmlformats.org/officeDocument/2006/relationships" type="roundRect" r:blip="" hideGeom="1">
+                            <dgm:adjLst>
+                              <dgm:adj idx="1" val="0.1"/>
+                            </dgm:adjLst>
+                          </dgm:shape>
+                          <dgm:presOf axis="ch desOrSelf" ptType="node node" st="4 1" cnt="1 0"/>
+                          <dgm:constrLst>
+                            <dgm:constr type="lMarg" refType="primFontSz" fact="0.3"/>
+                            <dgm:constr type="rMarg" refType="primFontSz" fact="0.3"/>
+                            <dgm:constr type="tMarg" refType="primFontSz" fact="0.3"/>
+                            <dgm:constr type="bMarg" refType="primFontSz" fact="0.3"/>
+                          </dgm:constrLst>
+                          <dgm:ruleLst>
+                            <dgm:rule type="primFontSz" val="5" fact="NaN" max="NaN"/>
+                          </dgm:ruleLst>
+                        </dgm:layoutNode>
+                        <dgm:layoutNode name="FiveNodes_5_text">
+                          <dgm:varLst>
+                            <dgm:bulletEnabled val="1"/>
+                          </dgm:varLst>
+                          <dgm:alg type="tx">
+                            <dgm:param type="parTxLTRAlign" val="l"/>
+                            <dgm:param type="txAnchorVertCh" val="mid"/>
+                          </dgm:alg>
+                          <dgm:shape xmlns:r="http://schemas.openxmlformats.org/officeDocument/2006/relationships" type="roundRect" r:blip="" hideGeom="1">
+                            <dgm:adjLst>
+                              <dgm:adj idx="1" val="0.1"/>
+                            </dgm:adjLst>
+                          </dgm:shape>
+                          <dgm:presOf axis="ch desOrSelf" ptType="node node" st="5 1" cnt="1 0"/>
+                          <dgm:constrLst>
+                            <dgm:constr type="lMarg" refType="primFontSz" fact="0.3"/>
+                            <dgm:constr type="rMarg" refType="primFontSz" fact="0.3"/>
+                            <dgm:constr type="tMarg" refType="primFontSz" fact="0.3"/>
+                            <dgm:constr type="bMarg" refType="primFontSz" fact="0.3"/>
+                          </dgm:constrLst>
+                          <dgm:ruleLst>
+                            <dgm:rule type="primFontSz" val="5" fact="NaN" max="NaN"/>
+                          </dgm:ruleLst>
+                        </dgm:layoutNode>
+                      </dgm:if>
+                      <dgm:else name="Name17"/>
+                    </dgm:choose>
+                  </dgm:else>
+                </dgm:choose>
               </dgm:else>
             </dgm:choose>
-            <dgm:shape xmlns:r="http://schemas.openxmlformats.org/officeDocument/2006/relationships" type="rect" r:blip="">
-              <dgm:adjLst/>
-            </dgm:shape>
-            <dgm:presOf axis="self" ptType="node"/>
-            <dgm:constrLst>
-              <dgm:constr type="lMarg"/>
-              <dgm:constr type="rMarg"/>
-              <dgm:constr type="tMarg"/>
-              <dgm:constr type="bMarg"/>
-            </dgm:constrLst>
-            <dgm:ruleLst>
-              <dgm:rule type="primFontSz" val="11" fact="NaN" max="NaN"/>
-            </dgm:ruleLst>
-          </dgm:layoutNode>
-        </dgm:layoutNode>
-        <dgm:forEach name="Name10" axis="followSib" ptType="sibTrans" cnt="1">
-          <dgm:layoutNode name="sibTrans">
-            <dgm:alg type="sp"/>
-            <dgm:shape xmlns:r="http://schemas.openxmlformats.org/officeDocument/2006/relationships" type="rect" r:blip="" hideGeom="1">
-              <dgm:adjLst/>
-            </dgm:shape>
-            <dgm:presOf axis="self"/>
-            <dgm:constrLst/>
-            <dgm:ruleLst/>
-          </dgm:layoutNode>
-        </dgm:forEach>
-      </dgm:forEach>
-    </dgm:layoutNode>
+          </dgm:else>
+        </dgm:choose>
+      </dgm:else>
+    </dgm:choose>
   </dgm:layoutNode>
-  <dgm:extLst>
-    <a:ext uri="{68A01E43-0DF5-4B5B-8FA6-DAF915123BFB}">
-      <dgm1612:lstStyle xmlns:dgm1612="http://schemas.microsoft.com/office/drawing/2016/12/diagram">
-        <a:lvl1pPr>
-          <a:lnSpc>
-            <a:spcPct val="100000"/>
-          </a:lnSpc>
-        </a:lvl1pPr>
-      </dgm1612:lstStyle>
-    </a:ext>
-  </dgm:extLst>
 </dgm:layoutDef>
 </file>
 
@@ -21688,7 +22131,7 @@
       </p:grpSpPr>
       <p:sp useBgFill="1">
         <p:nvSpPr>
-          <p:cNvPr id="10" name="Rectangle 9">
+          <p:cNvPr id="21" name="Rectangle 20">
             <a:extLst>
               <a:ext uri="{FF2B5EF4-FFF2-40B4-BE49-F238E27FC236}">
                 <a16:creationId xmlns:a16="http://schemas.microsoft.com/office/drawing/2014/main" id="{BACC6370-2D7E-4714-9D71-7542949D7D5D}"/>
@@ -21764,407 +22207,7 @@
       </p:sp>
       <p:sp>
         <p:nvSpPr>
-          <p:cNvPr id="12" name="Rectangle 11">
-            <a:extLst>
-              <a:ext uri="{FF2B5EF4-FFF2-40B4-BE49-F238E27FC236}">
-                <a16:creationId xmlns:a16="http://schemas.microsoft.com/office/drawing/2014/main" id="{F68B3F68-107C-434F-AA38-110D5EA91B85}"/>
-              </a:ext>
-              <a:ext uri="{C183D7F6-B498-43B3-948B-1728B52AA6E4}">
-                <adec:decorative xmlns:adec="http://schemas.microsoft.com/office/drawing/2017/decorative" val="1"/>
-              </a:ext>
-            </a:extLst>
-          </p:cNvPr>
-          <p:cNvSpPr>
-            <a:spLocks noGrp="1" noRot="1" noChangeAspect="1" noMove="1" noResize="1" noEditPoints="1" noAdjustHandles="1" noChangeArrowheads="1" noChangeShapeType="1" noTextEdit="1"/>
-          </p:cNvSpPr>
-          <p:nvPr>
-            <p:extLst>
-              <p:ext uri="{386F3935-93C4-4BCD-93E2-E3B085C9AB24}">
-                <p16:designElem xmlns:p16="http://schemas.microsoft.com/office/powerpoint/2015/main" val="1"/>
-              </p:ext>
-            </p:extLst>
-          </p:nvPr>
-        </p:nvSpPr>
-        <p:spPr>
-          <a:xfrm flipH="1">
-            <a:off x="1" y="0"/>
-            <a:ext cx="9143999" cy="2170031"/>
-          </a:xfrm>
-          <a:prstGeom prst="rect">
-            <a:avLst/>
-          </a:prstGeom>
-          <a:gradFill>
-            <a:gsLst>
-              <a:gs pos="0">
-                <a:srgbClr val="000000">
-                  <a:alpha val="96000"/>
-                </a:srgbClr>
-              </a:gs>
-              <a:gs pos="100000">
-                <a:schemeClr val="accent1">
-                  <a:lumMod val="75000"/>
-                </a:schemeClr>
-              </a:gs>
-            </a:gsLst>
-            <a:lin ang="19800000" scaled="0"/>
-          </a:gradFill>
-          <a:ln>
-            <a:noFill/>
-          </a:ln>
-        </p:spPr>
-        <p:style>
-          <a:lnRef idx="2">
-            <a:schemeClr val="accent1">
-              <a:shade val="50000"/>
-            </a:schemeClr>
-          </a:lnRef>
-          <a:fillRef idx="1">
-            <a:schemeClr val="accent1"/>
-          </a:fillRef>
-          <a:effectRef idx="0">
-            <a:schemeClr val="accent1"/>
-          </a:effectRef>
-          <a:fontRef idx="minor">
-            <a:schemeClr val="lt1"/>
-          </a:fontRef>
-        </p:style>
-        <p:txBody>
-          <a:bodyPr rtlCol="0" anchor="ctr"/>
-          <a:lstStyle/>
-          <a:p>
-            <a:pPr algn="ctr"/>
-            <a:endParaRPr lang="en-US"/>
-          </a:p>
-        </p:txBody>
-      </p:sp>
-      <p:sp>
-        <p:nvSpPr>
-          <p:cNvPr id="14" name="Rectangle 13">
-            <a:extLst>
-              <a:ext uri="{FF2B5EF4-FFF2-40B4-BE49-F238E27FC236}">
-                <a16:creationId xmlns:a16="http://schemas.microsoft.com/office/drawing/2014/main" id="{AAD0DBB9-1A4B-4391-81D4-CB19F9AB918A}"/>
-              </a:ext>
-              <a:ext uri="{C183D7F6-B498-43B3-948B-1728B52AA6E4}">
-                <adec:decorative xmlns:adec="http://schemas.microsoft.com/office/drawing/2017/decorative" val="1"/>
-              </a:ext>
-            </a:extLst>
-          </p:cNvPr>
-          <p:cNvSpPr>
-            <a:spLocks noGrp="1" noRot="1" noChangeAspect="1" noMove="1" noResize="1" noEditPoints="1" noAdjustHandles="1" noChangeArrowheads="1" noChangeShapeType="1" noTextEdit="1"/>
-          </p:cNvSpPr>
-          <p:nvPr>
-            <p:extLst>
-              <p:ext uri="{386F3935-93C4-4BCD-93E2-E3B085C9AB24}">
-                <p16:designElem xmlns:p16="http://schemas.microsoft.com/office/powerpoint/2015/main" val="1"/>
-              </p:ext>
-            </p:extLst>
-          </p:nvPr>
-        </p:nvSpPr>
-        <p:spPr>
-          <a:xfrm flipH="1">
-            <a:off x="6062114" y="0"/>
-            <a:ext cx="3072908" cy="2170661"/>
-          </a:xfrm>
-          <a:prstGeom prst="rect">
-            <a:avLst/>
-          </a:prstGeom>
-          <a:gradFill>
-            <a:gsLst>
-              <a:gs pos="19000">
-                <a:schemeClr val="accent1">
-                  <a:lumMod val="50000"/>
-                  <a:alpha val="68000"/>
-                </a:schemeClr>
-              </a:gs>
-              <a:gs pos="100000">
-                <a:schemeClr val="accent1">
-                  <a:alpha val="48000"/>
-                </a:schemeClr>
-              </a:gs>
-            </a:gsLst>
-            <a:lin ang="19200000" scaled="0"/>
-          </a:gradFill>
-          <a:ln>
-            <a:noFill/>
-          </a:ln>
-        </p:spPr>
-        <p:style>
-          <a:lnRef idx="2">
-            <a:schemeClr val="accent1">
-              <a:shade val="50000"/>
-            </a:schemeClr>
-          </a:lnRef>
-          <a:fillRef idx="1">
-            <a:schemeClr val="accent1"/>
-          </a:fillRef>
-          <a:effectRef idx="0">
-            <a:schemeClr val="accent1"/>
-          </a:effectRef>
-          <a:fontRef idx="minor">
-            <a:schemeClr val="lt1"/>
-          </a:fontRef>
-        </p:style>
-        <p:txBody>
-          <a:bodyPr rtlCol="0" anchor="ctr"/>
-          <a:lstStyle/>
-          <a:p>
-            <a:pPr algn="ctr"/>
-            <a:endParaRPr lang="en-US"/>
-          </a:p>
-        </p:txBody>
-      </p:sp>
-      <p:sp>
-        <p:nvSpPr>
-          <p:cNvPr id="16" name="Rectangle 15">
-            <a:extLst>
-              <a:ext uri="{FF2B5EF4-FFF2-40B4-BE49-F238E27FC236}">
-                <a16:creationId xmlns:a16="http://schemas.microsoft.com/office/drawing/2014/main" id="{063BBA22-50EA-4C4D-BE05-F1CE4E63AA56}"/>
-              </a:ext>
-              <a:ext uri="{C183D7F6-B498-43B3-948B-1728B52AA6E4}">
-                <adec:decorative xmlns:adec="http://schemas.microsoft.com/office/drawing/2017/decorative" val="1"/>
-              </a:ext>
-            </a:extLst>
-          </p:cNvPr>
-          <p:cNvSpPr>
-            <a:spLocks noGrp="1" noRot="1" noChangeAspect="1" noMove="1" noResize="1" noEditPoints="1" noAdjustHandles="1" noChangeArrowheads="1" noChangeShapeType="1" noTextEdit="1"/>
-          </p:cNvSpPr>
-          <p:nvPr>
-            <p:extLst>
-              <p:ext uri="{386F3935-93C4-4BCD-93E2-E3B085C9AB24}">
-                <p16:designElem xmlns:p16="http://schemas.microsoft.com/office/powerpoint/2015/main" val="1"/>
-              </p:ext>
-            </p:extLst>
-          </p:nvPr>
-        </p:nvSpPr>
-        <p:spPr>
-          <a:xfrm rot="16200000" flipH="1">
-            <a:off x="3486646" y="-3486043"/>
-            <a:ext cx="2170709" cy="9144000"/>
-          </a:xfrm>
-          <a:prstGeom prst="rect">
-            <a:avLst/>
-          </a:prstGeom>
-          <a:gradFill>
-            <a:gsLst>
-              <a:gs pos="23000">
-                <a:schemeClr val="accent1">
-                  <a:lumMod val="75000"/>
-                  <a:alpha val="16000"/>
-                </a:schemeClr>
-              </a:gs>
-              <a:gs pos="99000">
-                <a:srgbClr val="000000">
-                  <a:alpha val="45000"/>
-                </a:srgbClr>
-              </a:gs>
-            </a:gsLst>
-            <a:lin ang="21000000" scaled="0"/>
-          </a:gradFill>
-          <a:ln>
-            <a:noFill/>
-          </a:ln>
-        </p:spPr>
-        <p:style>
-          <a:lnRef idx="2">
-            <a:schemeClr val="accent1">
-              <a:shade val="50000"/>
-            </a:schemeClr>
-          </a:lnRef>
-          <a:fillRef idx="1">
-            <a:schemeClr val="accent1"/>
-          </a:fillRef>
-          <a:effectRef idx="0">
-            <a:schemeClr val="accent1"/>
-          </a:effectRef>
-          <a:fontRef idx="minor">
-            <a:schemeClr val="lt1"/>
-          </a:fontRef>
-        </p:style>
-        <p:txBody>
-          <a:bodyPr rtlCol="0" anchor="ctr"/>
-          <a:lstStyle/>
-          <a:p>
-            <a:pPr algn="ctr"/>
-            <a:endParaRPr lang="en-US" dirty="0"/>
-          </a:p>
-        </p:txBody>
-      </p:sp>
-      <p:sp>
-        <p:nvSpPr>
-          <p:cNvPr id="2" name="Title 1"/>
-          <p:cNvSpPr>
-            <a:spLocks noGrp="1"/>
-          </p:cNvSpPr>
-          <p:nvPr>
-            <p:ph type="title"/>
-          </p:nvPr>
-        </p:nvSpPr>
-        <p:spPr>
-          <a:xfrm>
-            <a:off x="1037673" y="348865"/>
-            <a:ext cx="7288583" cy="1576446"/>
-          </a:xfrm>
-        </p:spPr>
-        <p:txBody>
-          <a:bodyPr anchor="ctr">
-            <a:normAutofit/>
-          </a:bodyPr>
-          <a:lstStyle/>
-          <a:p>
-            <a:r>
-              <a:rPr lang="en-US" sz="3500" dirty="0">
-                <a:solidFill>
-                  <a:srgbClr val="FFFFFF"/>
-                </a:solidFill>
-              </a:rPr>
-              <a:t>Agenda</a:t>
-            </a:r>
-          </a:p>
-        </p:txBody>
-      </p:sp>
-      <p:graphicFrame>
-        <p:nvGraphicFramePr>
-          <p:cNvPr id="5" name="Content Placeholder 2">
-            <a:extLst>
-              <a:ext uri="{FF2B5EF4-FFF2-40B4-BE49-F238E27FC236}">
-                <a16:creationId xmlns:a16="http://schemas.microsoft.com/office/drawing/2014/main" id="{066F53F1-7531-BE5F-8E58-405012EED44D}"/>
-              </a:ext>
-            </a:extLst>
-          </p:cNvPr>
-          <p:cNvGraphicFramePr>
-            <a:graphicFrameLocks noGrp="1"/>
-          </p:cNvGraphicFramePr>
-          <p:nvPr>
-            <p:ph idx="1"/>
-            <p:extLst>
-              <p:ext uri="{D42A27DB-BD31-4B8C-83A1-F6EECF244321}">
-                <p14:modId xmlns:p14="http://schemas.microsoft.com/office/powerpoint/2010/main" val="196759531"/>
-              </p:ext>
-            </p:extLst>
-          </p:nvPr>
-        </p:nvGraphicFramePr>
-        <p:xfrm>
-          <a:off x="483042" y="2615979"/>
-          <a:ext cx="8195871" cy="3689405"/>
-        </p:xfrm>
-        <a:graphic>
-          <a:graphicData uri="http://schemas.openxmlformats.org/drawingml/2006/diagram">
-            <dgm:relIds xmlns:dgm="http://schemas.openxmlformats.org/drawingml/2006/diagram" xmlns:r="http://schemas.openxmlformats.org/officeDocument/2006/relationships" r:dm="rId2" r:lo="rId3" r:qs="rId4" r:cs="rId5"/>
-          </a:graphicData>
-        </a:graphic>
-      </p:graphicFrame>
-    </p:spTree>
-  </p:cSld>
-  <p:clrMapOvr>
-    <a:masterClrMapping/>
-  </p:clrMapOvr>
-</p:sld>
-</file>
-
-<file path=ppt/slides/slide10.xml><?xml version="1.0" encoding="utf-8"?>
-<p:sld xmlns:a="http://schemas.openxmlformats.org/drawingml/2006/main" xmlns:r="http://schemas.openxmlformats.org/officeDocument/2006/relationships" xmlns:p="http://schemas.openxmlformats.org/presentationml/2006/main">
-  <p:cSld>
-    <p:bg>
-      <p:bgPr>
-        <a:solidFill>
-          <a:schemeClr val="bg1"/>
-        </a:solidFill>
-        <a:effectLst/>
-      </p:bgPr>
-    </p:bg>
-    <p:spTree>
-      <p:nvGrpSpPr>
-        <p:cNvPr id="1" name=""/>
-        <p:cNvGrpSpPr/>
-        <p:nvPr/>
-      </p:nvGrpSpPr>
-      <p:grpSpPr>
-        <a:xfrm>
-          <a:off x="0" y="0"/>
-          <a:ext cx="0" cy="0"/>
-          <a:chOff x="0" y="0"/>
-          <a:chExt cx="0" cy="0"/>
-        </a:xfrm>
-      </p:grpSpPr>
-      <p:sp useBgFill="1">
-        <p:nvSpPr>
-          <p:cNvPr id="9" name="Rectangle 8">
-            <a:extLst>
-              <a:ext uri="{FF2B5EF4-FFF2-40B4-BE49-F238E27FC236}">
-                <a16:creationId xmlns:a16="http://schemas.microsoft.com/office/drawing/2014/main" id="{BACC6370-2D7E-4714-9D71-7542949D7D5D}"/>
-              </a:ext>
-              <a:ext uri="{C183D7F6-B498-43B3-948B-1728B52AA6E4}">
-                <adec:decorative xmlns:adec="http://schemas.microsoft.com/office/drawing/2017/decorative" val="1"/>
-              </a:ext>
-            </a:extLst>
-          </p:cNvPr>
-          <p:cNvSpPr>
-            <a:spLocks noGrp="1" noRot="1" noChangeAspect="1" noMove="1" noResize="1" noEditPoints="1" noAdjustHandles="1" noChangeArrowheads="1" noChangeShapeType="1" noTextEdit="1"/>
-          </p:cNvSpPr>
-          <p:nvPr>
-            <p:extLst>
-              <p:ext uri="{386F3935-93C4-4BCD-93E2-E3B085C9AB24}">
-                <p16:designElem xmlns:p16="http://schemas.microsoft.com/office/powerpoint/2015/main" val="1"/>
-              </p:ext>
-            </p:extLst>
-          </p:nvPr>
-        </p:nvSpPr>
-        <p:spPr>
-          <a:xfrm>
-            <a:off x="0" y="0"/>
-            <a:ext cx="9144000" cy="6858000"/>
-          </a:xfrm>
-          <a:prstGeom prst="rect">
-            <a:avLst/>
-          </a:prstGeom>
-          <a:ln w="12700" cap="flat" cmpd="sng" algn="ctr">
-            <a:noFill/>
-            <a:prstDash val="solid"/>
-            <a:miter lim="800000"/>
-          </a:ln>
-          <a:effectLst/>
-          <a:extLst>
-            <a:ext uri="{91240B29-F687-4F45-9708-019B960494DF}">
-              <a14:hiddenLine xmlns:a14="http://schemas.microsoft.com/office/drawing/2010/main" w="12700" cap="flat" cmpd="sng" algn="ctr">
-                <a:solidFill>
-                  <a:schemeClr val="accent1">
-                    <a:shade val="50000"/>
-                  </a:schemeClr>
-                </a:solidFill>
-                <a:prstDash val="solid"/>
-                <a:miter lim="800000"/>
-              </a14:hiddenLine>
-            </a:ext>
-          </a:extLst>
-        </p:spPr>
-        <p:style>
-          <a:lnRef idx="2">
-            <a:schemeClr val="accent1">
-              <a:shade val="50000"/>
-            </a:schemeClr>
-          </a:lnRef>
-          <a:fillRef idx="1">
-            <a:schemeClr val="accent1"/>
-          </a:fillRef>
-          <a:effectRef idx="0">
-            <a:schemeClr val="accent1"/>
-          </a:effectRef>
-          <a:fontRef idx="minor">
-            <a:schemeClr val="lt1"/>
-          </a:fontRef>
-        </p:style>
-        <p:txBody>
-          <a:bodyPr rtlCol="0" anchor="ctr"/>
-          <a:lstStyle/>
-          <a:p>
-            <a:pPr algn="ctr"/>
-            <a:endParaRPr lang="en-US"/>
-          </a:p>
-        </p:txBody>
-      </p:sp>
-      <p:sp>
-        <p:nvSpPr>
-          <p:cNvPr id="11" name="Rectangle 10">
+          <p:cNvPr id="23" name="Rectangle 22">
             <a:extLst>
               <a:ext uri="{FF2B5EF4-FFF2-40B4-BE49-F238E27FC236}">
                 <a16:creationId xmlns:a16="http://schemas.microsoft.com/office/drawing/2014/main" id="{F68B3F68-107C-434F-AA38-110D5EA91B85}"/>
@@ -22239,7 +22282,7 @@
       </p:sp>
       <p:sp>
         <p:nvSpPr>
-          <p:cNvPr id="13" name="Rectangle 12">
+          <p:cNvPr id="25" name="Rectangle 24">
             <a:extLst>
               <a:ext uri="{FF2B5EF4-FFF2-40B4-BE49-F238E27FC236}">
                 <a16:creationId xmlns:a16="http://schemas.microsoft.com/office/drawing/2014/main" id="{AAD0DBB9-1A4B-4391-81D4-CB19F9AB918A}"/>
@@ -22315,7 +22358,7 @@
       </p:sp>
       <p:sp>
         <p:nvSpPr>
-          <p:cNvPr id="15" name="Rectangle 14">
+          <p:cNvPr id="27" name="Rectangle 26">
             <a:extLst>
               <a:ext uri="{FF2B5EF4-FFF2-40B4-BE49-F238E27FC236}">
                 <a16:creationId xmlns:a16="http://schemas.microsoft.com/office/drawing/2014/main" id="{063BBA22-50EA-4C4D-BE05-F1CE4E63AA56}"/>
@@ -22410,18 +22453,13 @@
           </a:bodyPr>
           <a:lstStyle/>
           <a:p>
-            <a:pPr>
-              <a:lnSpc>
-                <a:spcPct val="90000"/>
-              </a:lnSpc>
-            </a:pPr>
             <a:r>
-              <a:rPr lang="en-US" sz="3000">
+              <a:rPr lang="en-US" sz="3500" dirty="0">
                 <a:solidFill>
                   <a:srgbClr val="FFFFFF"/>
                 </a:solidFill>
               </a:rPr>
-              <a:t>OpenAI GPT-5 — Overview for Study Assistance</a:t>
+              <a:t>Agenda</a:t>
             </a:r>
           </a:p>
         </p:txBody>
@@ -22431,7 +22469,7 @@
           <p:cNvPr id="5" name="Content Placeholder 2">
             <a:extLst>
               <a:ext uri="{FF2B5EF4-FFF2-40B4-BE49-F238E27FC236}">
-                <a16:creationId xmlns:a16="http://schemas.microsoft.com/office/drawing/2014/main" id="{DA89603E-F85F-A6C2-31E0-155B6C12E57C}"/>
+                <a16:creationId xmlns:a16="http://schemas.microsoft.com/office/drawing/2014/main" id="{066F53F1-7531-BE5F-8E58-405012EED44D}"/>
               </a:ext>
             </a:extLst>
           </p:cNvPr>
@@ -22442,7 +22480,7 @@
             <p:ph idx="1"/>
             <p:extLst>
               <p:ext uri="{D42A27DB-BD31-4B8C-83A1-F6EECF244321}">
-                <p14:modId xmlns:p14="http://schemas.microsoft.com/office/powerpoint/2010/main" val="3005587318"/>
+                <p14:modId xmlns:p14="http://schemas.microsoft.com/office/powerpoint/2010/main" val="2233861585"/>
               </p:ext>
             </p:extLst>
           </p:nvPr>
@@ -22465,7 +22503,7 @@
 </p:sld>
 </file>
 
-<file path=ppt/slides/slide11.xml><?xml version="1.0" encoding="utf-8"?>
+<file path=ppt/slides/slide10.xml><?xml version="1.0" encoding="utf-8"?>
 <p:sld xmlns:a="http://schemas.openxmlformats.org/drawingml/2006/main" xmlns:r="http://schemas.openxmlformats.org/officeDocument/2006/relationships" xmlns:p="http://schemas.openxmlformats.org/presentationml/2006/main">
   <p:cSld>
     <p:bg>
@@ -22872,7 +22910,7 @@
 </p:sld>
 </file>
 
-<file path=ppt/slides/slide12.xml><?xml version="1.0" encoding="utf-8"?>
+<file path=ppt/slides/slide11.xml><?xml version="1.0" encoding="utf-8"?>
 <p:sld xmlns:a="http://schemas.openxmlformats.org/drawingml/2006/main" xmlns:r="http://schemas.openxmlformats.org/officeDocument/2006/relationships" xmlns:p="http://schemas.openxmlformats.org/presentationml/2006/main">
   <p:cSld>
     <p:bg>
@@ -23272,628 +23310,6 @@
 </file>
 
 <file path=ppt/slides/slide2.xml><?xml version="1.0" encoding="utf-8"?>
-<p:sld xmlns:a="http://schemas.openxmlformats.org/drawingml/2006/main" xmlns:r="http://schemas.openxmlformats.org/officeDocument/2006/relationships" xmlns:p="http://schemas.openxmlformats.org/presentationml/2006/main">
-  <p:cSld>
-    <p:bg>
-      <p:bgPr>
-        <a:solidFill>
-          <a:schemeClr val="bg1"/>
-        </a:solidFill>
-        <a:effectLst/>
-      </p:bgPr>
-    </p:bg>
-    <p:spTree>
-      <p:nvGrpSpPr>
-        <p:cNvPr id="1" name=""/>
-        <p:cNvGrpSpPr/>
-        <p:nvPr/>
-      </p:nvGrpSpPr>
-      <p:grpSpPr>
-        <a:xfrm>
-          <a:off x="0" y="0"/>
-          <a:ext cx="0" cy="0"/>
-          <a:chOff x="0" y="0"/>
-          <a:chExt cx="0" cy="0"/>
-        </a:xfrm>
-      </p:grpSpPr>
-      <p:sp useBgFill="1">
-        <p:nvSpPr>
-          <p:cNvPr id="8" name="Rectangle 7">
-            <a:extLst>
-              <a:ext uri="{FF2B5EF4-FFF2-40B4-BE49-F238E27FC236}">
-                <a16:creationId xmlns:a16="http://schemas.microsoft.com/office/drawing/2014/main" id="{0E30439A-8A5B-46EC-8283-9B6B031D40D0}"/>
-              </a:ext>
-              <a:ext uri="{C183D7F6-B498-43B3-948B-1728B52AA6E4}">
-                <adec:decorative xmlns:adec="http://schemas.microsoft.com/office/drawing/2017/decorative" val="1"/>
-              </a:ext>
-            </a:extLst>
-          </p:cNvPr>
-          <p:cNvSpPr>
-            <a:spLocks noGrp="1" noRot="1" noChangeAspect="1" noMove="1" noResize="1" noEditPoints="1" noAdjustHandles="1" noChangeArrowheads="1" noChangeShapeType="1" noTextEdit="1"/>
-          </p:cNvSpPr>
-          <p:nvPr>
-            <p:extLst>
-              <p:ext uri="{386F3935-93C4-4BCD-93E2-E3B085C9AB24}">
-                <p16:designElem xmlns:p16="http://schemas.microsoft.com/office/powerpoint/2015/main" val="1"/>
-              </p:ext>
-            </p:extLst>
-          </p:nvPr>
-        </p:nvSpPr>
-        <p:spPr>
-          <a:xfrm>
-            <a:off x="0" y="0"/>
-            <a:ext cx="9144000" cy="6858000"/>
-          </a:xfrm>
-          <a:prstGeom prst="rect">
-            <a:avLst/>
-          </a:prstGeom>
-          <a:ln w="12700" cap="flat" cmpd="sng" algn="ctr">
-            <a:noFill/>
-            <a:prstDash val="solid"/>
-            <a:miter lim="800000"/>
-          </a:ln>
-          <a:effectLst/>
-          <a:extLst>
-            <a:ext uri="{91240B29-F687-4F45-9708-019B960494DF}">
-              <a14:hiddenLine xmlns:a14="http://schemas.microsoft.com/office/drawing/2010/main" w="12700" cap="flat" cmpd="sng" algn="ctr">
-                <a:solidFill>
-                  <a:schemeClr val="accent1">
-                    <a:shade val="50000"/>
-                  </a:schemeClr>
-                </a:solidFill>
-                <a:prstDash val="solid"/>
-                <a:miter lim="800000"/>
-              </a14:hiddenLine>
-            </a:ext>
-          </a:extLst>
-        </p:spPr>
-        <p:style>
-          <a:lnRef idx="2">
-            <a:schemeClr val="accent1">
-              <a:shade val="50000"/>
-            </a:schemeClr>
-          </a:lnRef>
-          <a:fillRef idx="1">
-            <a:schemeClr val="accent1"/>
-          </a:fillRef>
-          <a:effectRef idx="0">
-            <a:schemeClr val="accent1"/>
-          </a:effectRef>
-          <a:fontRef idx="minor">
-            <a:schemeClr val="lt1"/>
-          </a:fontRef>
-        </p:style>
-        <p:txBody>
-          <a:bodyPr rtlCol="0" anchor="ctr"/>
-          <a:lstStyle/>
-          <a:p>
-            <a:pPr algn="ctr"/>
-            <a:endParaRPr lang="en-US"/>
-          </a:p>
-        </p:txBody>
-      </p:sp>
-      <p:sp>
-        <p:nvSpPr>
-          <p:cNvPr id="10" name="Rectangle 9">
-            <a:extLst>
-              <a:ext uri="{FF2B5EF4-FFF2-40B4-BE49-F238E27FC236}">
-                <a16:creationId xmlns:a16="http://schemas.microsoft.com/office/drawing/2014/main" id="{5CEAD642-85CF-4750-8432-7C80C901F001}"/>
-              </a:ext>
-              <a:ext uri="{C183D7F6-B498-43B3-948B-1728B52AA6E4}">
-                <adec:decorative xmlns:adec="http://schemas.microsoft.com/office/drawing/2017/decorative" val="1"/>
-              </a:ext>
-            </a:extLst>
-          </p:cNvPr>
-          <p:cNvSpPr>
-            <a:spLocks noGrp="1" noRot="1" noChangeAspect="1" noMove="1" noResize="1" noEditPoints="1" noAdjustHandles="1" noChangeArrowheads="1" noChangeShapeType="1" noTextEdit="1"/>
-          </p:cNvSpPr>
-          <p:nvPr>
-            <p:extLst>
-              <p:ext uri="{386F3935-93C4-4BCD-93E2-E3B085C9AB24}">
-                <p16:designElem xmlns:p16="http://schemas.microsoft.com/office/powerpoint/2015/main" val="1"/>
-              </p:ext>
-            </p:extLst>
-          </p:nvPr>
-        </p:nvSpPr>
-        <p:spPr>
-          <a:xfrm>
-            <a:off x="0" y="-427"/>
-            <a:ext cx="9144000" cy="6858000"/>
-          </a:xfrm>
-          <a:prstGeom prst="rect">
-            <a:avLst/>
-          </a:prstGeom>
-          <a:gradFill>
-            <a:gsLst>
-              <a:gs pos="0">
-                <a:srgbClr val="000000"/>
-              </a:gs>
-              <a:gs pos="100000">
-                <a:schemeClr val="accent1">
-                  <a:lumMod val="75000"/>
-                </a:schemeClr>
-              </a:gs>
-            </a:gsLst>
-            <a:lin ang="15000000" scaled="0"/>
-          </a:gradFill>
-          <a:ln>
-            <a:noFill/>
-          </a:ln>
-        </p:spPr>
-        <p:style>
-          <a:lnRef idx="2">
-            <a:schemeClr val="accent1">
-              <a:shade val="50000"/>
-            </a:schemeClr>
-          </a:lnRef>
-          <a:fillRef idx="1">
-            <a:schemeClr val="accent1"/>
-          </a:fillRef>
-          <a:effectRef idx="0">
-            <a:schemeClr val="accent1"/>
-          </a:effectRef>
-          <a:fontRef idx="minor">
-            <a:schemeClr val="lt1"/>
-          </a:fontRef>
-        </p:style>
-        <p:txBody>
-          <a:bodyPr rtlCol="0" anchor="ctr"/>
-          <a:lstStyle/>
-          <a:p>
-            <a:pPr algn="ctr"/>
-            <a:endParaRPr lang="en-US"/>
-          </a:p>
-        </p:txBody>
-      </p:sp>
-      <p:sp>
-        <p:nvSpPr>
-          <p:cNvPr id="12" name="Rectangle 11">
-            <a:extLst>
-              <a:ext uri="{FF2B5EF4-FFF2-40B4-BE49-F238E27FC236}">
-                <a16:creationId xmlns:a16="http://schemas.microsoft.com/office/drawing/2014/main" id="{FA33EEAE-15D5-4119-8C1E-89D943F911EF}"/>
-              </a:ext>
-              <a:ext uri="{C183D7F6-B498-43B3-948B-1728B52AA6E4}">
-                <adec:decorative xmlns:adec="http://schemas.microsoft.com/office/drawing/2017/decorative" val="1"/>
-              </a:ext>
-            </a:extLst>
-          </p:cNvPr>
-          <p:cNvSpPr>
-            <a:spLocks noGrp="1" noRot="1" noChangeAspect="1" noMove="1" noResize="1" noEditPoints="1" noAdjustHandles="1" noChangeArrowheads="1" noChangeShapeType="1" noTextEdit="1"/>
-          </p:cNvSpPr>
-          <p:nvPr>
-            <p:extLst>
-              <p:ext uri="{386F3935-93C4-4BCD-93E2-E3B085C9AB24}">
-                <p16:designElem xmlns:p16="http://schemas.microsoft.com/office/powerpoint/2015/main" val="1"/>
-              </p:ext>
-            </p:extLst>
-          </p:nvPr>
-        </p:nvSpPr>
-        <p:spPr>
-          <a:xfrm rot="10800000" flipH="1">
-            <a:off x="341640" y="-1720"/>
-            <a:ext cx="8812530" cy="6840685"/>
-          </a:xfrm>
-          <a:prstGeom prst="rect">
-            <a:avLst/>
-          </a:prstGeom>
-          <a:gradFill>
-            <a:gsLst>
-              <a:gs pos="21000">
-                <a:schemeClr val="accent1">
-                  <a:lumMod val="50000"/>
-                  <a:alpha val="61000"/>
-                </a:schemeClr>
-              </a:gs>
-              <a:gs pos="100000">
-                <a:schemeClr val="accent1">
-                  <a:alpha val="0"/>
-                </a:schemeClr>
-              </a:gs>
-            </a:gsLst>
-            <a:lin ang="21594000" scaled="0"/>
-          </a:gradFill>
-          <a:ln>
-            <a:noFill/>
-          </a:ln>
-        </p:spPr>
-        <p:style>
-          <a:lnRef idx="2">
-            <a:schemeClr val="accent1">
-              <a:shade val="50000"/>
-            </a:schemeClr>
-          </a:lnRef>
-          <a:fillRef idx="1">
-            <a:schemeClr val="accent1"/>
-          </a:fillRef>
-          <a:effectRef idx="0">
-            <a:schemeClr val="accent1"/>
-          </a:effectRef>
-          <a:fontRef idx="minor">
-            <a:schemeClr val="lt1"/>
-          </a:fontRef>
-        </p:style>
-        <p:txBody>
-          <a:bodyPr rtlCol="0" anchor="ctr"/>
-          <a:lstStyle/>
-          <a:p>
-            <a:pPr algn="ctr"/>
-            <a:endParaRPr lang="en-US"/>
-          </a:p>
-        </p:txBody>
-      </p:sp>
-      <p:sp>
-        <p:nvSpPr>
-          <p:cNvPr id="14" name="Rectangle 13">
-            <a:extLst>
-              <a:ext uri="{FF2B5EF4-FFF2-40B4-BE49-F238E27FC236}">
-                <a16:creationId xmlns:a16="http://schemas.microsoft.com/office/drawing/2014/main" id="{730D8B3B-9B80-4025-B934-26DC7D7CD231}"/>
-              </a:ext>
-              <a:ext uri="{C183D7F6-B498-43B3-948B-1728B52AA6E4}">
-                <adec:decorative xmlns:adec="http://schemas.microsoft.com/office/drawing/2017/decorative" val="1"/>
-              </a:ext>
-            </a:extLst>
-          </p:cNvPr>
-          <p:cNvSpPr>
-            <a:spLocks noGrp="1" noRot="1" noChangeAspect="1" noMove="1" noResize="1" noEditPoints="1" noAdjustHandles="1" noChangeArrowheads="1" noChangeShapeType="1" noTextEdit="1"/>
-          </p:cNvSpPr>
-          <p:nvPr>
-            <p:extLst>
-              <p:ext uri="{386F3935-93C4-4BCD-93E2-E3B085C9AB24}">
-                <p16:designElem xmlns:p16="http://schemas.microsoft.com/office/powerpoint/2015/main" val="1"/>
-              </p:ext>
-            </p:extLst>
-          </p:nvPr>
-        </p:nvSpPr>
-        <p:spPr>
-          <a:xfrm>
-            <a:off x="6454540" y="-1291"/>
-            <a:ext cx="2706134" cy="6858864"/>
-          </a:xfrm>
-          <a:prstGeom prst="rect">
-            <a:avLst/>
-          </a:prstGeom>
-          <a:gradFill>
-            <a:gsLst>
-              <a:gs pos="0">
-                <a:schemeClr val="accent1">
-                  <a:lumMod val="75000"/>
-                  <a:alpha val="0"/>
-                </a:schemeClr>
-              </a:gs>
-              <a:gs pos="99000">
-                <a:srgbClr val="000000">
-                  <a:alpha val="41000"/>
-                </a:srgbClr>
-              </a:gs>
-            </a:gsLst>
-            <a:lin ang="16200000" scaled="0"/>
-          </a:gradFill>
-          <a:ln>
-            <a:noFill/>
-          </a:ln>
-        </p:spPr>
-        <p:style>
-          <a:lnRef idx="2">
-            <a:schemeClr val="accent1">
-              <a:shade val="50000"/>
-            </a:schemeClr>
-          </a:lnRef>
-          <a:fillRef idx="1">
-            <a:schemeClr val="accent1"/>
-          </a:fillRef>
-          <a:effectRef idx="0">
-            <a:schemeClr val="accent1"/>
-          </a:effectRef>
-          <a:fontRef idx="minor">
-            <a:schemeClr val="lt1"/>
-          </a:fontRef>
-        </p:style>
-        <p:txBody>
-          <a:bodyPr rtlCol="0" anchor="ctr"/>
-          <a:lstStyle/>
-          <a:p>
-            <a:pPr algn="ctr"/>
-            <a:endParaRPr lang="en-US"/>
-          </a:p>
-        </p:txBody>
-      </p:sp>
-      <p:sp>
-        <p:nvSpPr>
-          <p:cNvPr id="16" name="Oval 15">
-            <a:extLst>
-              <a:ext uri="{FF2B5EF4-FFF2-40B4-BE49-F238E27FC236}">
-                <a16:creationId xmlns:a16="http://schemas.microsoft.com/office/drawing/2014/main" id="{B5A1B09C-1565-46F8-B70F-621C5EB48A09}"/>
-              </a:ext>
-              <a:ext uri="{C183D7F6-B498-43B3-948B-1728B52AA6E4}">
-                <adec:decorative xmlns:adec="http://schemas.microsoft.com/office/drawing/2017/decorative" val="1"/>
-              </a:ext>
-            </a:extLst>
-          </p:cNvPr>
-          <p:cNvSpPr>
-            <a:spLocks noGrp="1" noRot="1" noChangeAspect="1" noMove="1" noResize="1" noEditPoints="1" noAdjustHandles="1" noChangeArrowheads="1" noChangeShapeType="1" noTextEdit="1"/>
-          </p:cNvSpPr>
-          <p:nvPr>
-            <p:extLst>
-              <p:ext uri="{386F3935-93C4-4BCD-93E2-E3B085C9AB24}">
-                <p16:designElem xmlns:p16="http://schemas.microsoft.com/office/powerpoint/2015/main" val="1"/>
-              </p:ext>
-            </p:extLst>
-          </p:nvPr>
-        </p:nvSpPr>
-        <p:spPr>
-          <a:xfrm rot="15274173">
-            <a:off x="3923854" y="1402819"/>
-            <a:ext cx="4967533" cy="3741293"/>
-          </a:xfrm>
-          <a:prstGeom prst="ellipse">
-            <a:avLst/>
-          </a:prstGeom>
-          <a:gradFill>
-            <a:gsLst>
-              <a:gs pos="0">
-                <a:schemeClr val="accent1">
-                  <a:alpha val="24000"/>
-                </a:schemeClr>
-              </a:gs>
-              <a:gs pos="79000">
-                <a:schemeClr val="accent1">
-                  <a:lumMod val="60000"/>
-                  <a:lumOff val="40000"/>
-                  <a:alpha val="0"/>
-                </a:schemeClr>
-              </a:gs>
-            </a:gsLst>
-            <a:lin ang="14400000" scaled="0"/>
-          </a:gradFill>
-          <a:ln>
-            <a:noFill/>
-          </a:ln>
-        </p:spPr>
-        <p:style>
-          <a:lnRef idx="2">
-            <a:schemeClr val="accent1">
-              <a:shade val="50000"/>
-            </a:schemeClr>
-          </a:lnRef>
-          <a:fillRef idx="1">
-            <a:schemeClr val="accent1"/>
-          </a:fillRef>
-          <a:effectRef idx="0">
-            <a:schemeClr val="accent1"/>
-          </a:effectRef>
-          <a:fontRef idx="minor">
-            <a:schemeClr val="lt1"/>
-          </a:fontRef>
-        </p:style>
-        <p:txBody>
-          <a:bodyPr rtlCol="0" anchor="ctr"/>
-          <a:lstStyle/>
-          <a:p>
-            <a:pPr algn="ctr"/>
-            <a:endParaRPr lang="en-US" dirty="0"/>
-          </a:p>
-        </p:txBody>
-      </p:sp>
-      <p:sp>
-        <p:nvSpPr>
-          <p:cNvPr id="2" name="Title 1"/>
-          <p:cNvSpPr>
-            <a:spLocks noGrp="1"/>
-          </p:cNvSpPr>
-          <p:nvPr>
-            <p:ph type="ctrTitle"/>
-          </p:nvPr>
-        </p:nvSpPr>
-        <p:spPr>
-          <a:xfrm>
-            <a:off x="1040148" y="818984"/>
-            <a:ext cx="4947184" cy="3268520"/>
-          </a:xfrm>
-        </p:spPr>
-        <p:txBody>
-          <a:bodyPr>
-            <a:normAutofit/>
-          </a:bodyPr>
-          <a:lstStyle/>
-          <a:p>
-            <a:pPr algn="r"/>
-            <a:r>
-              <a:rPr lang="en-US" sz="4200" dirty="0">
-                <a:solidFill>
-                  <a:srgbClr val="FFFFFF"/>
-                </a:solidFill>
-              </a:rPr>
-              <a:t>Database and  Architecture</a:t>
-            </a:r>
-          </a:p>
-        </p:txBody>
-      </p:sp>
-      <p:sp>
-        <p:nvSpPr>
-          <p:cNvPr id="18" name="Rectangle 17">
-            <a:extLst>
-              <a:ext uri="{FF2B5EF4-FFF2-40B4-BE49-F238E27FC236}">
-                <a16:creationId xmlns:a16="http://schemas.microsoft.com/office/drawing/2014/main" id="{8C516CC8-80AC-446C-A56E-9F54B7210402}"/>
-              </a:ext>
-              <a:ext uri="{C183D7F6-B498-43B3-948B-1728B52AA6E4}">
-                <adec:decorative xmlns:adec="http://schemas.microsoft.com/office/drawing/2017/decorative" val="1"/>
-              </a:ext>
-            </a:extLst>
-          </p:cNvPr>
-          <p:cNvSpPr>
-            <a:spLocks noGrp="1" noRot="1" noChangeAspect="1" noMove="1" noResize="1" noEditPoints="1" noAdjustHandles="1" noChangeArrowheads="1" noChangeShapeType="1" noTextEdit="1"/>
-          </p:cNvSpPr>
-          <p:nvPr>
-            <p:extLst>
-              <p:ext uri="{386F3935-93C4-4BCD-93E2-E3B085C9AB24}">
-                <p16:designElem xmlns:p16="http://schemas.microsoft.com/office/powerpoint/2015/main" val="1"/>
-              </p:ext>
-            </p:extLst>
-          </p:nvPr>
-        </p:nvSpPr>
-        <p:spPr>
-          <a:xfrm rot="10800000" flipH="1">
-            <a:off x="4735" y="4480038"/>
-            <a:ext cx="9134528" cy="2377962"/>
-          </a:xfrm>
-          <a:prstGeom prst="rect">
-            <a:avLst/>
-          </a:prstGeom>
-          <a:gradFill>
-            <a:gsLst>
-              <a:gs pos="0">
-                <a:schemeClr val="accent1">
-                  <a:lumMod val="75000"/>
-                  <a:alpha val="50000"/>
-                </a:schemeClr>
-              </a:gs>
-              <a:gs pos="99000">
-                <a:srgbClr val="000000">
-                  <a:alpha val="34000"/>
-                </a:srgbClr>
-              </a:gs>
-            </a:gsLst>
-            <a:lin ang="17400000" scaled="0"/>
-          </a:gradFill>
-          <a:ln>
-            <a:noFill/>
-          </a:ln>
-        </p:spPr>
-        <p:style>
-          <a:lnRef idx="2">
-            <a:schemeClr val="accent1">
-              <a:shade val="50000"/>
-            </a:schemeClr>
-          </a:lnRef>
-          <a:fillRef idx="1">
-            <a:schemeClr val="accent1"/>
-          </a:fillRef>
-          <a:effectRef idx="0">
-            <a:schemeClr val="accent1"/>
-          </a:effectRef>
-          <a:fontRef idx="minor">
-            <a:schemeClr val="lt1"/>
-          </a:fontRef>
-        </p:style>
-        <p:txBody>
-          <a:bodyPr rtlCol="0" anchor="ctr"/>
-          <a:lstStyle/>
-          <a:p>
-            <a:pPr algn="ctr"/>
-            <a:endParaRPr lang="en-US"/>
-          </a:p>
-        </p:txBody>
-      </p:sp>
-      <p:sp>
-        <p:nvSpPr>
-          <p:cNvPr id="20" name="Rectangle 19">
-            <a:extLst>
-              <a:ext uri="{FF2B5EF4-FFF2-40B4-BE49-F238E27FC236}">
-                <a16:creationId xmlns:a16="http://schemas.microsoft.com/office/drawing/2014/main" id="{53947E58-F088-49F1-A3D1-DEA690192E84}"/>
-              </a:ext>
-              <a:ext uri="{C183D7F6-B498-43B3-948B-1728B52AA6E4}">
-                <adec:decorative xmlns:adec="http://schemas.microsoft.com/office/drawing/2017/decorative" val="1"/>
-              </a:ext>
-            </a:extLst>
-          </p:cNvPr>
-          <p:cNvSpPr>
-            <a:spLocks noGrp="1" noRot="1" noChangeAspect="1" noMove="1" noResize="1" noEditPoints="1" noAdjustHandles="1" noChangeArrowheads="1" noChangeShapeType="1" noTextEdit="1"/>
-          </p:cNvSpPr>
-          <p:nvPr>
-            <p:extLst>
-              <p:ext uri="{386F3935-93C4-4BCD-93E2-E3B085C9AB24}">
-                <p16:designElem xmlns:p16="http://schemas.microsoft.com/office/powerpoint/2015/main" val="1"/>
-              </p:ext>
-            </p:extLst>
-          </p:nvPr>
-        </p:nvSpPr>
-        <p:spPr>
-          <a:xfrm rot="16200000" flipH="1">
-            <a:off x="4368117" y="2081692"/>
-            <a:ext cx="6857572" cy="2694194"/>
-          </a:xfrm>
-          <a:prstGeom prst="rect">
-            <a:avLst/>
-          </a:prstGeom>
-          <a:gradFill>
-            <a:gsLst>
-              <a:gs pos="0">
-                <a:schemeClr val="accent1">
-                  <a:lumMod val="75000"/>
-                  <a:alpha val="50000"/>
-                </a:schemeClr>
-              </a:gs>
-              <a:gs pos="99000">
-                <a:srgbClr val="000000">
-                  <a:alpha val="0"/>
-                </a:srgbClr>
-              </a:gs>
-            </a:gsLst>
-            <a:lin ang="15600000" scaled="0"/>
-          </a:gradFill>
-          <a:ln>
-            <a:noFill/>
-          </a:ln>
-        </p:spPr>
-        <p:style>
-          <a:lnRef idx="2">
-            <a:schemeClr val="accent1">
-              <a:shade val="50000"/>
-            </a:schemeClr>
-          </a:lnRef>
-          <a:fillRef idx="1">
-            <a:schemeClr val="accent1"/>
-          </a:fillRef>
-          <a:effectRef idx="0">
-            <a:schemeClr val="accent1"/>
-          </a:effectRef>
-          <a:fontRef idx="minor">
-            <a:schemeClr val="lt1"/>
-          </a:fontRef>
-        </p:style>
-        <p:txBody>
-          <a:bodyPr rtlCol="0" anchor="ctr"/>
-          <a:lstStyle/>
-          <a:p>
-            <a:pPr algn="ctr"/>
-            <a:endParaRPr lang="en-US"/>
-          </a:p>
-        </p:txBody>
-      </p:sp>
-      <p:sp>
-        <p:nvSpPr>
-          <p:cNvPr id="5" name="Subtitle 4">
-            <a:extLst>
-              <a:ext uri="{FF2B5EF4-FFF2-40B4-BE49-F238E27FC236}">
-                <a16:creationId xmlns:a16="http://schemas.microsoft.com/office/drawing/2014/main" id="{806871B7-99E0-649D-23B9-6480B96124A3}"/>
-              </a:ext>
-            </a:extLst>
-          </p:cNvPr>
-          <p:cNvSpPr>
-            <a:spLocks noGrp="1"/>
-          </p:cNvSpPr>
-          <p:nvPr>
-            <p:ph type="subTitle" idx="1"/>
-          </p:nvPr>
-        </p:nvSpPr>
-        <p:spPr/>
-        <p:txBody>
-          <a:bodyPr/>
-          <a:lstStyle/>
-          <a:p>
-            <a:endParaRPr lang="en-US"/>
-          </a:p>
-        </p:txBody>
-      </p:sp>
-    </p:spTree>
-  </p:cSld>
-  <p:clrMapOvr>
-    <a:masterClrMapping/>
-  </p:clrMapOvr>
-</p:sld>
-</file>
-
-<file path=ppt/slides/slide3.xml><?xml version="1.0" encoding="utf-8"?>
 <p:sld xmlns:a="http://schemas.openxmlformats.org/drawingml/2006/main" xmlns:r="http://schemas.openxmlformats.org/officeDocument/2006/relationships" xmlns:p="http://schemas.openxmlformats.org/presentationml/2006/main">
   <p:cSld>
     <p:bg>
@@ -24532,7 +23948,7 @@
 </p:sld>
 </file>
 
-<file path=ppt/slides/slide4.xml><?xml version="1.0" encoding="utf-8"?>
+<file path=ppt/slides/slide3.xml><?xml version="1.0" encoding="utf-8"?>
 <p:sld xmlns:a="http://schemas.openxmlformats.org/drawingml/2006/main" xmlns:r="http://schemas.openxmlformats.org/officeDocument/2006/relationships" xmlns:p="http://schemas.openxmlformats.org/presentationml/2006/main">
   <p:cSld>
     <p:bg>
@@ -25103,7 +24519,7 @@
 </p:sld>
 </file>
 
-<file path=ppt/slides/slide5.xml><?xml version="1.0" encoding="utf-8"?>
+<file path=ppt/slides/slide4.xml><?xml version="1.0" encoding="utf-8"?>
 <p:sld xmlns:a="http://schemas.openxmlformats.org/drawingml/2006/main" xmlns:r="http://schemas.openxmlformats.org/officeDocument/2006/relationships" xmlns:p="http://schemas.openxmlformats.org/presentationml/2006/main">
   <p:cSld>
     <p:bg>
@@ -25742,7 +25158,7 @@
 </p:sld>
 </file>
 
-<file path=ppt/slides/slide6.xml><?xml version="1.0" encoding="utf-8"?>
+<file path=ppt/slides/slide5.xml><?xml version="1.0" encoding="utf-8"?>
 <p:sld xmlns:a="http://schemas.openxmlformats.org/drawingml/2006/main" xmlns:r="http://schemas.openxmlformats.org/officeDocument/2006/relationships" xmlns:p="http://schemas.openxmlformats.org/presentationml/2006/main">
   <p:cSld>
     <p:bg>
@@ -26386,7 +25802,7 @@
 </p:sld>
 </file>
 
-<file path=ppt/slides/slide7.xml><?xml version="1.0" encoding="utf-8"?>
+<file path=ppt/slides/slide6.xml><?xml version="1.0" encoding="utf-8"?>
 <p:sld xmlns:a="http://schemas.openxmlformats.org/drawingml/2006/main" xmlns:r="http://schemas.openxmlformats.org/officeDocument/2006/relationships" xmlns:p="http://schemas.openxmlformats.org/presentationml/2006/main">
   <p:cSld>
     <p:spTree>
@@ -26458,7 +25874,7 @@
 </p:sld>
 </file>
 
-<file path=ppt/slides/slide8.xml><?xml version="1.0" encoding="utf-8"?>
+<file path=ppt/slides/slide7.xml><?xml version="1.0" encoding="utf-8"?>
 <p:sld xmlns:a="http://schemas.openxmlformats.org/drawingml/2006/main" xmlns:r="http://schemas.openxmlformats.org/officeDocument/2006/relationships" xmlns:p="http://schemas.openxmlformats.org/presentationml/2006/main">
   <p:cSld>
     <p:bg>
@@ -27169,7 +26585,7 @@
 </p:sld>
 </file>
 
-<file path=ppt/slides/slide9.xml><?xml version="1.0" encoding="utf-8"?>
+<file path=ppt/slides/slide8.xml><?xml version="1.0" encoding="utf-8"?>
 <p:sld xmlns:a="http://schemas.openxmlformats.org/drawingml/2006/main" xmlns:r="http://schemas.openxmlformats.org/officeDocument/2006/relationships" xmlns:p="http://schemas.openxmlformats.org/presentationml/2006/main">
   <p:cSld>
     <p:bg>
@@ -27729,6 +27145,410 @@
 </p:sld>
 </file>
 
+<file path=ppt/slides/slide9.xml><?xml version="1.0" encoding="utf-8"?>
+<p:sld xmlns:a="http://schemas.openxmlformats.org/drawingml/2006/main" xmlns:r="http://schemas.openxmlformats.org/officeDocument/2006/relationships" xmlns:p="http://schemas.openxmlformats.org/presentationml/2006/main">
+  <p:cSld>
+    <p:bg>
+      <p:bgPr>
+        <a:solidFill>
+          <a:schemeClr val="bg1"/>
+        </a:solidFill>
+        <a:effectLst/>
+      </p:bgPr>
+    </p:bg>
+    <p:spTree>
+      <p:nvGrpSpPr>
+        <p:cNvPr id="1" name=""/>
+        <p:cNvGrpSpPr/>
+        <p:nvPr/>
+      </p:nvGrpSpPr>
+      <p:grpSpPr>
+        <a:xfrm>
+          <a:off x="0" y="0"/>
+          <a:ext cx="0" cy="0"/>
+          <a:chOff x="0" y="0"/>
+          <a:chExt cx="0" cy="0"/>
+        </a:xfrm>
+      </p:grpSpPr>
+      <p:sp useBgFill="1">
+        <p:nvSpPr>
+          <p:cNvPr id="9" name="Rectangle 8">
+            <a:extLst>
+              <a:ext uri="{FF2B5EF4-FFF2-40B4-BE49-F238E27FC236}">
+                <a16:creationId xmlns:a16="http://schemas.microsoft.com/office/drawing/2014/main" id="{BACC6370-2D7E-4714-9D71-7542949D7D5D}"/>
+              </a:ext>
+              <a:ext uri="{C183D7F6-B498-43B3-948B-1728B52AA6E4}">
+                <adec:decorative xmlns:adec="http://schemas.microsoft.com/office/drawing/2017/decorative" val="1"/>
+              </a:ext>
+            </a:extLst>
+          </p:cNvPr>
+          <p:cNvSpPr>
+            <a:spLocks noGrp="1" noRot="1" noChangeAspect="1" noMove="1" noResize="1" noEditPoints="1" noAdjustHandles="1" noChangeArrowheads="1" noChangeShapeType="1" noTextEdit="1"/>
+          </p:cNvSpPr>
+          <p:nvPr>
+            <p:extLst>
+              <p:ext uri="{386F3935-93C4-4BCD-93E2-E3B085C9AB24}">
+                <p16:designElem xmlns:p16="http://schemas.microsoft.com/office/powerpoint/2015/main" val="1"/>
+              </p:ext>
+            </p:extLst>
+          </p:nvPr>
+        </p:nvSpPr>
+        <p:spPr>
+          <a:xfrm>
+            <a:off x="0" y="0"/>
+            <a:ext cx="9144000" cy="6858000"/>
+          </a:xfrm>
+          <a:prstGeom prst="rect">
+            <a:avLst/>
+          </a:prstGeom>
+          <a:ln w="12700" cap="flat" cmpd="sng" algn="ctr">
+            <a:noFill/>
+            <a:prstDash val="solid"/>
+            <a:miter lim="800000"/>
+          </a:ln>
+          <a:effectLst/>
+          <a:extLst>
+            <a:ext uri="{91240B29-F687-4F45-9708-019B960494DF}">
+              <a14:hiddenLine xmlns:a14="http://schemas.microsoft.com/office/drawing/2010/main" w="12700" cap="flat" cmpd="sng" algn="ctr">
+                <a:solidFill>
+                  <a:schemeClr val="accent1">
+                    <a:shade val="50000"/>
+                  </a:schemeClr>
+                </a:solidFill>
+                <a:prstDash val="solid"/>
+                <a:miter lim="800000"/>
+              </a14:hiddenLine>
+            </a:ext>
+          </a:extLst>
+        </p:spPr>
+        <p:style>
+          <a:lnRef idx="2">
+            <a:schemeClr val="accent1">
+              <a:shade val="50000"/>
+            </a:schemeClr>
+          </a:lnRef>
+          <a:fillRef idx="1">
+            <a:schemeClr val="accent1"/>
+          </a:fillRef>
+          <a:effectRef idx="0">
+            <a:schemeClr val="accent1"/>
+          </a:effectRef>
+          <a:fontRef idx="minor">
+            <a:schemeClr val="lt1"/>
+          </a:fontRef>
+        </p:style>
+        <p:txBody>
+          <a:bodyPr rtlCol="0" anchor="ctr"/>
+          <a:lstStyle/>
+          <a:p>
+            <a:pPr algn="ctr"/>
+            <a:endParaRPr lang="en-US"/>
+          </a:p>
+        </p:txBody>
+      </p:sp>
+      <p:sp>
+        <p:nvSpPr>
+          <p:cNvPr id="11" name="Rectangle 10">
+            <a:extLst>
+              <a:ext uri="{FF2B5EF4-FFF2-40B4-BE49-F238E27FC236}">
+                <a16:creationId xmlns:a16="http://schemas.microsoft.com/office/drawing/2014/main" id="{F68B3F68-107C-434F-AA38-110D5EA91B85}"/>
+              </a:ext>
+              <a:ext uri="{C183D7F6-B498-43B3-948B-1728B52AA6E4}">
+                <adec:decorative xmlns:adec="http://schemas.microsoft.com/office/drawing/2017/decorative" val="1"/>
+              </a:ext>
+            </a:extLst>
+          </p:cNvPr>
+          <p:cNvSpPr>
+            <a:spLocks noGrp="1" noRot="1" noChangeAspect="1" noMove="1" noResize="1" noEditPoints="1" noAdjustHandles="1" noChangeArrowheads="1" noChangeShapeType="1" noTextEdit="1"/>
+          </p:cNvSpPr>
+          <p:nvPr>
+            <p:extLst>
+              <p:ext uri="{386F3935-93C4-4BCD-93E2-E3B085C9AB24}">
+                <p16:designElem xmlns:p16="http://schemas.microsoft.com/office/powerpoint/2015/main" val="1"/>
+              </p:ext>
+            </p:extLst>
+          </p:nvPr>
+        </p:nvSpPr>
+        <p:spPr>
+          <a:xfrm flipH="1">
+            <a:off x="1" y="0"/>
+            <a:ext cx="9143999" cy="1575955"/>
+          </a:xfrm>
+          <a:prstGeom prst="rect">
+            <a:avLst/>
+          </a:prstGeom>
+          <a:gradFill>
+            <a:gsLst>
+              <a:gs pos="0">
+                <a:srgbClr val="000000">
+                  <a:alpha val="96000"/>
+                </a:srgbClr>
+              </a:gs>
+              <a:gs pos="100000">
+                <a:schemeClr val="accent1">
+                  <a:lumMod val="75000"/>
+                </a:schemeClr>
+              </a:gs>
+            </a:gsLst>
+            <a:lin ang="8400000" scaled="0"/>
+          </a:gradFill>
+          <a:ln>
+            <a:noFill/>
+          </a:ln>
+        </p:spPr>
+        <p:style>
+          <a:lnRef idx="2">
+            <a:schemeClr val="accent1">
+              <a:shade val="50000"/>
+            </a:schemeClr>
+          </a:lnRef>
+          <a:fillRef idx="1">
+            <a:schemeClr val="accent1"/>
+          </a:fillRef>
+          <a:effectRef idx="0">
+            <a:schemeClr val="accent1"/>
+          </a:effectRef>
+          <a:fontRef idx="minor">
+            <a:schemeClr val="lt1"/>
+          </a:fontRef>
+        </p:style>
+        <p:txBody>
+          <a:bodyPr rtlCol="0" anchor="ctr"/>
+          <a:lstStyle/>
+          <a:p>
+            <a:pPr algn="ctr"/>
+            <a:endParaRPr lang="en-US"/>
+          </a:p>
+        </p:txBody>
+      </p:sp>
+      <p:sp>
+        <p:nvSpPr>
+          <p:cNvPr id="13" name="Rectangle 12">
+            <a:extLst>
+              <a:ext uri="{FF2B5EF4-FFF2-40B4-BE49-F238E27FC236}">
+                <a16:creationId xmlns:a16="http://schemas.microsoft.com/office/drawing/2014/main" id="{AAD0DBB9-1A4B-4391-81D4-CB19F9AB918A}"/>
+              </a:ext>
+              <a:ext uri="{C183D7F6-B498-43B3-948B-1728B52AA6E4}">
+                <adec:decorative xmlns:adec="http://schemas.microsoft.com/office/drawing/2017/decorative" val="1"/>
+              </a:ext>
+            </a:extLst>
+          </p:cNvPr>
+          <p:cNvSpPr>
+            <a:spLocks noGrp="1" noRot="1" noChangeAspect="1" noMove="1" noResize="1" noEditPoints="1" noAdjustHandles="1" noChangeArrowheads="1" noChangeShapeType="1" noTextEdit="1"/>
+          </p:cNvSpPr>
+          <p:nvPr>
+            <p:extLst>
+              <p:ext uri="{386F3935-93C4-4BCD-93E2-E3B085C9AB24}">
+                <p16:designElem xmlns:p16="http://schemas.microsoft.com/office/powerpoint/2015/main" val="1"/>
+              </p:ext>
+            </p:extLst>
+          </p:nvPr>
+        </p:nvSpPr>
+        <p:spPr>
+          <a:xfrm rot="10800000" flipH="1">
+            <a:off x="6096642" y="0"/>
+            <a:ext cx="3047358" cy="1576412"/>
+          </a:xfrm>
+          <a:prstGeom prst="rect">
+            <a:avLst/>
+          </a:prstGeom>
+          <a:gradFill>
+            <a:gsLst>
+              <a:gs pos="19000">
+                <a:schemeClr val="accent1">
+                  <a:lumMod val="50000"/>
+                  <a:alpha val="68000"/>
+                </a:schemeClr>
+              </a:gs>
+              <a:gs pos="100000">
+                <a:schemeClr val="accent1">
+                  <a:alpha val="79000"/>
+                </a:schemeClr>
+              </a:gs>
+            </a:gsLst>
+            <a:lin ang="19200000" scaled="0"/>
+          </a:gradFill>
+          <a:ln>
+            <a:noFill/>
+          </a:ln>
+        </p:spPr>
+        <p:style>
+          <a:lnRef idx="2">
+            <a:schemeClr val="accent1">
+              <a:shade val="50000"/>
+            </a:schemeClr>
+          </a:lnRef>
+          <a:fillRef idx="1">
+            <a:schemeClr val="accent1"/>
+          </a:fillRef>
+          <a:effectRef idx="0">
+            <a:schemeClr val="accent1"/>
+          </a:effectRef>
+          <a:fontRef idx="minor">
+            <a:schemeClr val="lt1"/>
+          </a:fontRef>
+        </p:style>
+        <p:txBody>
+          <a:bodyPr rtlCol="0" anchor="ctr"/>
+          <a:lstStyle/>
+          <a:p>
+            <a:pPr algn="ctr"/>
+            <a:endParaRPr lang="en-US"/>
+          </a:p>
+        </p:txBody>
+      </p:sp>
+      <p:sp>
+        <p:nvSpPr>
+          <p:cNvPr id="15" name="Rectangle 14">
+            <a:extLst>
+              <a:ext uri="{FF2B5EF4-FFF2-40B4-BE49-F238E27FC236}">
+                <a16:creationId xmlns:a16="http://schemas.microsoft.com/office/drawing/2014/main" id="{063BBA22-50EA-4C4D-BE05-F1CE4E63AA56}"/>
+              </a:ext>
+              <a:ext uri="{C183D7F6-B498-43B3-948B-1728B52AA6E4}">
+                <adec:decorative xmlns:adec="http://schemas.microsoft.com/office/drawing/2017/decorative" val="1"/>
+              </a:ext>
+            </a:extLst>
+          </p:cNvPr>
+          <p:cNvSpPr>
+            <a:spLocks noGrp="1" noRot="1" noChangeAspect="1" noMove="1" noResize="1" noEditPoints="1" noAdjustHandles="1" noChangeArrowheads="1" noChangeShapeType="1" noTextEdit="1"/>
+          </p:cNvSpPr>
+          <p:nvPr>
+            <p:extLst>
+              <p:ext uri="{386F3935-93C4-4BCD-93E2-E3B085C9AB24}">
+                <p16:designElem xmlns:p16="http://schemas.microsoft.com/office/powerpoint/2015/main" val="1"/>
+              </p:ext>
+            </p:extLst>
+          </p:nvPr>
+        </p:nvSpPr>
+        <p:spPr>
+          <a:xfrm rot="5400000">
+            <a:off x="3783777" y="-3783778"/>
+            <a:ext cx="1576446" cy="9144002"/>
+          </a:xfrm>
+          <a:prstGeom prst="rect">
+            <a:avLst/>
+          </a:prstGeom>
+          <a:gradFill>
+            <a:gsLst>
+              <a:gs pos="23000">
+                <a:schemeClr val="accent1">
+                  <a:alpha val="0"/>
+                </a:schemeClr>
+              </a:gs>
+              <a:gs pos="99000">
+                <a:srgbClr val="000000">
+                  <a:alpha val="74000"/>
+                </a:srgbClr>
+              </a:gs>
+            </a:gsLst>
+            <a:lin ang="20400000" scaled="0"/>
+          </a:gradFill>
+          <a:ln>
+            <a:noFill/>
+          </a:ln>
+        </p:spPr>
+        <p:style>
+          <a:lnRef idx="2">
+            <a:schemeClr val="accent1">
+              <a:shade val="50000"/>
+            </a:schemeClr>
+          </a:lnRef>
+          <a:fillRef idx="1">
+            <a:schemeClr val="accent1"/>
+          </a:fillRef>
+          <a:effectRef idx="0">
+            <a:schemeClr val="accent1"/>
+          </a:effectRef>
+          <a:fontRef idx="minor">
+            <a:schemeClr val="lt1"/>
+          </a:fontRef>
+        </p:style>
+        <p:txBody>
+          <a:bodyPr rtlCol="0" anchor="ctr"/>
+          <a:lstStyle/>
+          <a:p>
+            <a:pPr algn="ctr"/>
+            <a:endParaRPr lang="en-US" dirty="0"/>
+          </a:p>
+        </p:txBody>
+      </p:sp>
+      <p:sp>
+        <p:nvSpPr>
+          <p:cNvPr id="2" name="Title 1"/>
+          <p:cNvSpPr>
+            <a:spLocks noGrp="1"/>
+          </p:cNvSpPr>
+          <p:nvPr>
+            <p:ph type="title"/>
+          </p:nvPr>
+        </p:nvSpPr>
+        <p:spPr>
+          <a:xfrm>
+            <a:off x="1028697" y="348865"/>
+            <a:ext cx="7533018" cy="877729"/>
+          </a:xfrm>
+        </p:spPr>
+        <p:txBody>
+          <a:bodyPr anchor="ctr">
+            <a:normAutofit/>
+          </a:bodyPr>
+          <a:lstStyle/>
+          <a:p>
+            <a:pPr>
+              <a:lnSpc>
+                <a:spcPct val="90000"/>
+              </a:lnSpc>
+            </a:pPr>
+            <a:r>
+              <a:rPr lang="en-US" sz="3000">
+                <a:solidFill>
+                  <a:srgbClr val="FFFFFF"/>
+                </a:solidFill>
+              </a:rPr>
+              <a:t>OpenAI GPT-5 — Overview for Study Assistance</a:t>
+            </a:r>
+          </a:p>
+        </p:txBody>
+      </p:sp>
+      <p:graphicFrame>
+        <p:nvGraphicFramePr>
+          <p:cNvPr id="5" name="Content Placeholder 2">
+            <a:extLst>
+              <a:ext uri="{FF2B5EF4-FFF2-40B4-BE49-F238E27FC236}">
+                <a16:creationId xmlns:a16="http://schemas.microsoft.com/office/drawing/2014/main" id="{DA89603E-F85F-A6C2-31E0-155B6C12E57C}"/>
+              </a:ext>
+            </a:extLst>
+          </p:cNvPr>
+          <p:cNvGraphicFramePr>
+            <a:graphicFrameLocks noGrp="1"/>
+          </p:cNvGraphicFramePr>
+          <p:nvPr>
+            <p:ph idx="1"/>
+            <p:extLst>
+              <p:ext uri="{D42A27DB-BD31-4B8C-83A1-F6EECF244321}">
+                <p14:modId xmlns:p14="http://schemas.microsoft.com/office/powerpoint/2010/main" val="3005587318"/>
+              </p:ext>
+            </p:extLst>
+          </p:nvPr>
+        </p:nvGraphicFramePr>
+        <p:xfrm>
+          <a:off x="483042" y="2112579"/>
+          <a:ext cx="8195871" cy="4192805"/>
+        </p:xfrm>
+        <a:graphic>
+          <a:graphicData uri="http://schemas.openxmlformats.org/drawingml/2006/diagram">
+            <dgm:relIds xmlns:dgm="http://schemas.openxmlformats.org/drawingml/2006/diagram" xmlns:r="http://schemas.openxmlformats.org/officeDocument/2006/relationships" r:dm="rId2" r:lo="rId3" r:qs="rId4" r:cs="rId5"/>
+          </a:graphicData>
+        </a:graphic>
+      </p:graphicFrame>
+    </p:spTree>
+  </p:cSld>
+  <p:clrMapOvr>
+    <a:masterClrMapping/>
+  </p:clrMapOvr>
+</p:sld>
+</file>
+
 <file path=ppt/theme/theme1.xml><?xml version="1.0" encoding="utf-8"?>
 <a:theme xmlns:a="http://schemas.openxmlformats.org/drawingml/2006/main" name="Office Theme">
   <a:themeElements>

</xml_diff>